<commit_message>
Finalized A01 and C01 for SS 2023
</commit_message>
<xml_diff>
--- a/Lecture slides/NYT A01 - Introduction.pptx
+++ b/Lecture slides/NYT A01 - Introduction.pptx
@@ -29,7 +29,6 @@
     <p:sldId id="274" r:id="rId24"/>
     <p:sldId id="275" r:id="rId25"/>
     <p:sldId id="276" r:id="rId26"/>
-    <p:sldId id="277" r:id="rId27"/>
   </p:sldIdLst>
   <p:sldSz cy="5143500" cx="9144000"/>
   <p:notesSz cx="6858000" cy="9144000"/>
@@ -1601,7 +1600,7 @@
       </p:grpSpPr>
       <p:sp>
         <p:nvSpPr>
-          <p:cNvPr id="155" name="Google Shape;155;g12f961c4d52_0_2:notes"/>
+          <p:cNvPr id="155" name="Google Shape;155;g108fe332759_2_61:notes"/>
           <p:cNvSpPr/>
           <p:nvPr>
             <p:ph idx="2" type="sldImg"/>
@@ -1636,7 +1635,7 @@
       </p:sp>
       <p:sp>
         <p:nvSpPr>
-          <p:cNvPr id="156" name="Google Shape;156;g12f961c4d52_0_2:notes"/>
+          <p:cNvPr id="156" name="Google Shape;156;g108fe332759_2_61:notes"/>
           <p:cNvSpPr txBox="1"/>
           <p:nvPr>
             <p:ph idx="1" type="body"/>
@@ -1700,7 +1699,7 @@
       </p:grpSpPr>
       <p:sp>
         <p:nvSpPr>
-          <p:cNvPr id="162" name="Google Shape;162;g108fe332759_2_61:notes"/>
+          <p:cNvPr id="162" name="Google Shape;162;g108fe332759_2_67:notes"/>
           <p:cNvSpPr/>
           <p:nvPr>
             <p:ph idx="2" type="sldImg"/>
@@ -1735,7 +1734,7 @@
       </p:sp>
       <p:sp>
         <p:nvSpPr>
-          <p:cNvPr id="163" name="Google Shape;163;g108fe332759_2_61:notes"/>
+          <p:cNvPr id="163" name="Google Shape;163;g108fe332759_2_67:notes"/>
           <p:cNvSpPr txBox="1"/>
           <p:nvPr>
             <p:ph idx="1" type="body"/>
@@ -1898,7 +1897,7 @@
       </p:grpSpPr>
       <p:sp>
         <p:nvSpPr>
-          <p:cNvPr id="169" name="Google Shape;169;g108fe332759_2_67:notes"/>
+          <p:cNvPr id="169" name="Google Shape;169;gf5a950148e_0_0:notes"/>
           <p:cNvSpPr/>
           <p:nvPr>
             <p:ph idx="2" type="sldImg"/>
@@ -1933,7 +1932,7 @@
       </p:sp>
       <p:sp>
         <p:nvSpPr>
-          <p:cNvPr id="170" name="Google Shape;170;g108fe332759_2_67:notes"/>
+          <p:cNvPr id="170" name="Google Shape;170;gf5a950148e_0_0:notes"/>
           <p:cNvSpPr txBox="1"/>
           <p:nvPr>
             <p:ph idx="1" type="body"/>
@@ -1983,7 +1982,7 @@
   <p:cSld>
     <p:spTree>
       <p:nvGrpSpPr>
-        <p:cNvPr id="175" name="Shape 175"/>
+        <p:cNvPr id="174" name="Shape 174"/>
         <p:cNvGrpSpPr/>
         <p:nvPr/>
       </p:nvGrpSpPr>
@@ -1997,7 +1996,7 @@
       </p:grpSpPr>
       <p:sp>
         <p:nvSpPr>
-          <p:cNvPr id="176" name="Google Shape;176;gf5a950148e_0_0:notes"/>
+          <p:cNvPr id="175" name="Google Shape;175;gf5a950148e_0_6:notes"/>
           <p:cNvSpPr/>
           <p:nvPr>
             <p:ph idx="2" type="sldImg"/>
@@ -2032,106 +2031,7 @@
       </p:sp>
       <p:sp>
         <p:nvSpPr>
-          <p:cNvPr id="177" name="Google Shape;177;gf5a950148e_0_0:notes"/>
-          <p:cNvSpPr txBox="1"/>
-          <p:nvPr>
-            <p:ph idx="1" type="body"/>
-          </p:nvPr>
-        </p:nvSpPr>
-        <p:spPr>
-          <a:xfrm>
-            <a:off x="685800" y="4343400"/>
-            <a:ext cx="5486400" cy="4114800"/>
-          </a:xfrm>
-          <a:prstGeom prst="rect">
-            <a:avLst/>
-          </a:prstGeom>
-        </p:spPr>
-        <p:txBody>
-          <a:bodyPr anchorCtr="0" anchor="t" bIns="91425" lIns="91425" spcFirstLastPara="1" rIns="91425" wrap="square" tIns="91425">
-            <a:noAutofit/>
-          </a:bodyPr>
-          <a:lstStyle/>
-          <a:p>
-            <a:pPr indent="0" lvl="0" marL="0" rtl="0" algn="l">
-              <a:spcBef>
-                <a:spcPts val="0"/>
-              </a:spcBef>
-              <a:spcAft>
-                <a:spcPts val="0"/>
-              </a:spcAft>
-              <a:buNone/>
-            </a:pPr>
-            <a:r>
-              <a:t/>
-            </a:r>
-            <a:endParaRPr/>
-          </a:p>
-        </p:txBody>
-      </p:sp>
-    </p:spTree>
-  </p:cSld>
-  <p:clrMapOvr>
-    <a:masterClrMapping/>
-  </p:clrMapOvr>
-</p:notes>
-</file>
-
-<file path=ppt/notesSlides/notesSlide22.xml><?xml version="1.0" encoding="utf-8"?>
-<p:notes xmlns:a="http://schemas.openxmlformats.org/drawingml/2006/main" xmlns:r="http://schemas.openxmlformats.org/officeDocument/2006/relationships" xmlns:mc="http://schemas.openxmlformats.org/markup-compatibility/2006" xmlns:mv="urn:schemas-microsoft-com:mac:vml" xmlns:p="http://schemas.openxmlformats.org/presentationml/2006/main" xmlns:c="http://schemas.openxmlformats.org/drawingml/2006/chart" xmlns:dgm="http://schemas.openxmlformats.org/drawingml/2006/diagram" xmlns:o="urn:schemas-microsoft-com:office:office" xmlns:v="urn:schemas-microsoft-com:vml" xmlns:pvml="urn:schemas-microsoft-com:office:powerpoint" xmlns:com="http://schemas.openxmlformats.org/drawingml/2006/compatibility" xmlns:p14="http://schemas.microsoft.com/office/powerpoint/2010/main" xmlns:p15="http://schemas.microsoft.com/office/powerpoint/2012/main" xmlns:ahyp="http://schemas.microsoft.com/office/drawing/2018/hyperlinkcolor" showMasterPhAnim="0" showMasterSp="0">
-  <p:cSld>
-    <p:spTree>
-      <p:nvGrpSpPr>
-        <p:cNvPr id="181" name="Shape 181"/>
-        <p:cNvGrpSpPr/>
-        <p:nvPr/>
-      </p:nvGrpSpPr>
-      <p:grpSpPr>
-        <a:xfrm>
-          <a:off x="0" y="0"/>
-          <a:ext cx="0" cy="0"/>
-          <a:chOff x="0" y="0"/>
-          <a:chExt cx="0" cy="0"/>
-        </a:xfrm>
-      </p:grpSpPr>
-      <p:sp>
-        <p:nvSpPr>
-          <p:cNvPr id="182" name="Google Shape;182;gf5a950148e_0_6:notes"/>
-          <p:cNvSpPr/>
-          <p:nvPr>
-            <p:ph idx="2" type="sldImg"/>
-          </p:nvPr>
-        </p:nvSpPr>
-        <p:spPr>
-          <a:xfrm>
-            <a:off x="381300" y="685800"/>
-            <a:ext cx="6096000" cy="3429000"/>
-          </a:xfrm>
-          <a:custGeom>
-            <a:rect b="b" l="l" r="r" t="t"/>
-            <a:pathLst>
-              <a:path extrusionOk="0" h="120000" w="120000">
-                <a:moveTo>
-                  <a:pt x="0" y="0"/>
-                </a:moveTo>
-                <a:lnTo>
-                  <a:pt x="120000" y="0"/>
-                </a:lnTo>
-                <a:lnTo>
-                  <a:pt x="120000" y="120000"/>
-                </a:lnTo>
-                <a:lnTo>
-                  <a:pt x="0" y="120000"/>
-                </a:lnTo>
-                <a:close/>
-              </a:path>
-            </a:pathLst>
-          </a:custGeom>
-        </p:spPr>
-      </p:sp>
-      <p:sp>
-        <p:nvSpPr>
-          <p:cNvPr id="183" name="Google Shape;183;gf5a950148e_0_6:notes"/>
+          <p:cNvPr id="176" name="Google Shape;176;gf5a950148e_0_6:notes"/>
           <p:cNvSpPr txBox="1"/>
           <p:nvPr>
             <p:ph idx="1" type="body"/>
@@ -3186,7 +3086,7 @@
             <a:avLst/>
           </a:prstGeom>
           <a:solidFill>
-            <a:schemeClr val="accent1"/>
+            <a:schemeClr val="accent5"/>
           </a:solidFill>
           <a:ln>
             <a:noFill/>
@@ -3379,7 +3279,7 @@
             <a:avLst/>
           </a:prstGeom>
           <a:solidFill>
-            <a:schemeClr val="accent1"/>
+            <a:schemeClr val="accent5"/>
           </a:solidFill>
           <a:ln>
             <a:noFill/>
@@ -3843,7 +3743,7 @@
             <a:avLst/>
           </a:prstGeom>
           <a:solidFill>
-            <a:schemeClr val="accent1"/>
+            <a:schemeClr val="accent5"/>
           </a:solidFill>
           <a:ln>
             <a:noFill/>
@@ -4435,7 +4335,7 @@
             <a:avLst/>
           </a:prstGeom>
           <a:solidFill>
-            <a:schemeClr val="accent1"/>
+            <a:schemeClr val="accent5"/>
           </a:solidFill>
           <a:ln>
             <a:noFill/>
@@ -4774,7 +4674,7 @@
             <a:avLst/>
           </a:prstGeom>
           <a:solidFill>
-            <a:schemeClr val="accent1"/>
+            <a:schemeClr val="accent5"/>
           </a:solidFill>
           <a:ln>
             <a:noFill/>
@@ -6421,7 +6321,7 @@
             </a:pPr>
             <a:r>
               <a:rPr lang="en"/>
-              <a:t>A quiz will test your understanding of last session’s lecture(s)</a:t>
+              <a:t>A quiz will test your understanding of last session’s topic</a:t>
             </a:r>
             <a:endParaRPr/>
           </a:p>
@@ -6547,21 +6447,7 @@
               <a:buNone/>
             </a:pPr>
             <a:r>
-              <a:rPr lang="en"/>
-              <a:t>Please see the class quiz FAQ at </a:t>
-            </a:r>
-            <a:r>
-              <a:rPr lang="en" u="sng">
-                <a:solidFill>
-                  <a:schemeClr val="hlink"/>
-                </a:solidFill>
-                <a:hlinkClick r:id="rId3"/>
-              </a:rPr>
-              <a:t>https://bit.ly/2JpgjnQ</a:t>
-            </a:r>
-            <a:r>
-              <a:rPr lang="en"/>
-              <a:t>  </a:t>
+              <a:t/>
             </a:r>
             <a:endParaRPr/>
           </a:p>
@@ -6620,7 +6506,7 @@
                 <a:solidFill>
                   <a:schemeClr val="hlink"/>
                 </a:solidFill>
-                <a:hlinkClick r:id="rId4"/>
+                <a:hlinkClick r:id="rId3"/>
               </a:rPr>
               <a:t>https://profriehle.com</a:t>
             </a:r>
@@ -6793,7 +6679,7 @@
             <a:tbl>
               <a:tblPr>
                 <a:noFill/>
-                <a:tableStyleId>{14B4BF16-B9DC-46FC-A811-A1A9D4ED67F8}</a:tableStyleId>
+                <a:tableStyleId>{289D13A9-D2F7-4F60-86CA-BBA6726F6D71}</a:tableStyleId>
               </a:tblPr>
               <a:tblGrid>
                 <a:gridCol w="1227850"/>
@@ -6872,7 +6758,7 @@
                       <a:tailEnd len="sm" w="sm" type="none"/>
                     </a:lnB>
                     <a:solidFill>
-                      <a:schemeClr val="accent4"/>
+                      <a:schemeClr val="dk2"/>
                     </a:solidFill>
                   </a:tcPr>
                 </a:tc>
@@ -6943,7 +6829,7 @@
                       <a:tailEnd len="sm" w="sm" type="none"/>
                     </a:lnB>
                     <a:solidFill>
-                      <a:schemeClr val="accent4"/>
+                      <a:schemeClr val="dk2"/>
                     </a:solidFill>
                   </a:tcPr>
                 </a:tc>
@@ -7018,7 +6904,7 @@
                       <a:tailEnd len="sm" w="sm" type="none"/>
                     </a:lnB>
                     <a:solidFill>
-                      <a:schemeClr val="accent4"/>
+                      <a:schemeClr val="dk2"/>
                     </a:solidFill>
                   </a:tcPr>
                 </a:tc>
@@ -7092,7 +6978,7 @@
                       <a:tailEnd len="sm" w="sm" type="none"/>
                     </a:lnB>
                     <a:solidFill>
-                      <a:schemeClr val="dk2"/>
+                      <a:schemeClr val="lt2"/>
                     </a:solidFill>
                   </a:tcPr>
                 </a:tc>
@@ -7163,7 +7049,7 @@
                       <a:tailEnd len="sm" w="sm" type="none"/>
                     </a:lnB>
                     <a:solidFill>
-                      <a:schemeClr val="dk2"/>
+                      <a:schemeClr val="lt2"/>
                     </a:solidFill>
                   </a:tcPr>
                 </a:tc>
@@ -7234,7 +7120,7 @@
                       <a:tailEnd len="sm" w="sm" type="none"/>
                     </a:lnB>
                     <a:solidFill>
-                      <a:schemeClr val="dk2"/>
+                      <a:schemeClr val="lt2"/>
                     </a:solidFill>
                   </a:tcPr>
                 </a:tc>
@@ -7320,7 +7206,7 @@
                       <a:tailEnd len="sm" w="sm" type="none"/>
                     </a:lnB>
                     <a:solidFill>
-                      <a:schemeClr val="dk2"/>
+                      <a:schemeClr val="lt2"/>
                     </a:solidFill>
                   </a:tcPr>
                 </a:tc>
@@ -7391,7 +7277,7 @@
                       <a:tailEnd len="sm" w="sm" type="none"/>
                     </a:lnB>
                     <a:solidFill>
-                      <a:schemeClr val="dk2"/>
+                      <a:schemeClr val="lt2"/>
                     </a:solidFill>
                   </a:tcPr>
                 </a:tc>
@@ -7785,7 +7671,7 @@
                       <a:tailEnd len="sm" w="sm" type="none"/>
                     </a:lnB>
                     <a:solidFill>
-                      <a:schemeClr val="accent6"/>
+                      <a:schemeClr val="accent1"/>
                     </a:solidFill>
                   </a:tcPr>
                 </a:tc>
@@ -7860,7 +7746,7 @@
                       <a:tailEnd len="sm" w="sm" type="none"/>
                     </a:lnB>
                     <a:solidFill>
-                      <a:schemeClr val="accent6"/>
+                      <a:schemeClr val="accent1"/>
                     </a:solidFill>
                   </a:tcPr>
                 </a:tc>
@@ -8271,7 +8157,7 @@
                       <a:tailEnd len="sm" w="sm" type="none"/>
                     </a:lnB>
                     <a:solidFill>
-                      <a:schemeClr val="accent6"/>
+                      <a:schemeClr val="accent1"/>
                     </a:solidFill>
                   </a:tcPr>
                 </a:tc>
@@ -8346,7 +8232,7 @@
                       <a:tailEnd len="sm" w="sm" type="none"/>
                     </a:lnB>
                     <a:solidFill>
-                      <a:schemeClr val="accent6"/>
+                      <a:schemeClr val="accent1"/>
                     </a:solidFill>
                   </a:tcPr>
                 </a:tc>
@@ -8766,7 +8652,7 @@
             </a:pPr>
             <a:r>
               <a:rPr lang="en"/>
-              <a:t>None, sorry!</a:t>
+              <a:t>Let’s see…</a:t>
             </a:r>
             <a:endParaRPr/>
           </a:p>
@@ -10117,7 +10003,7 @@
             </a:pPr>
             <a:r>
               <a:rPr lang="en"/>
-              <a:t>Interpretation of Schedule</a:t>
+              <a:t>Work Rhythm</a:t>
             </a:r>
             <a:endParaRPr/>
           </a:p>
@@ -10224,13 +10110,162 @@
                 <a:spcPts val="0"/>
               </a:spcBef>
               <a:spcAft>
+                <a:spcPts val="0"/>
+              </a:spcAft>
+              <a:buNone/>
+            </a:pPr>
+            <a:r>
+              <a:rPr b="1" lang="en"/>
+              <a:t>Lecture (class)</a:t>
+            </a:r>
+            <a:endParaRPr b="1"/>
+          </a:p>
+          <a:p>
+            <a:pPr indent="-342900" lvl="0" marL="457200" rtl="0" algn="l">
+              <a:spcBef>
                 <a:spcPts val="1200"/>
-              </a:spcAft>
-              <a:buNone/>
+              </a:spcBef>
+              <a:spcAft>
+                <a:spcPts val="0"/>
+              </a:spcAft>
+              <a:buSzPts val="1800"/>
+              <a:buChar char="●"/>
             </a:pPr>
             <a:r>
               <a:rPr lang="en"/>
-              <a:t>TBD</a:t>
+              <a:t>Review of last week (quiz)</a:t>
+            </a:r>
+            <a:endParaRPr/>
+          </a:p>
+          <a:p>
+            <a:pPr indent="-342900" lvl="0" marL="457200" rtl="0" algn="l">
+              <a:spcBef>
+                <a:spcPts val="0"/>
+              </a:spcBef>
+              <a:spcAft>
+                <a:spcPts val="0"/>
+              </a:spcAft>
+              <a:buSzPts val="1800"/>
+              <a:buChar char="●"/>
+            </a:pPr>
+            <a:r>
+              <a:rPr lang="en"/>
+              <a:t>Presentation of this week’s topic</a:t>
+            </a:r>
+            <a:endParaRPr/>
+          </a:p>
+          <a:p>
+            <a:pPr indent="0" lvl="0" marL="0" rtl="0" algn="l">
+              <a:spcBef>
+                <a:spcPts val="1200"/>
+              </a:spcBef>
+              <a:spcAft>
+                <a:spcPts val="0"/>
+              </a:spcAft>
+              <a:buNone/>
+            </a:pPr>
+            <a:r>
+              <a:rPr b="1" lang="en"/>
+              <a:t>Method exercise</a:t>
+            </a:r>
+            <a:endParaRPr b="1"/>
+          </a:p>
+          <a:p>
+            <a:pPr indent="-342900" lvl="0" marL="457200" rtl="0" algn="l">
+              <a:spcBef>
+                <a:spcPts val="1200"/>
+              </a:spcBef>
+              <a:spcAft>
+                <a:spcPts val="0"/>
+              </a:spcAft>
+              <a:buSzPts val="1800"/>
+              <a:buChar char="●"/>
+            </a:pPr>
+            <a:r>
+              <a:rPr lang="en"/>
+              <a:t>Discussion of articles</a:t>
+            </a:r>
+            <a:endParaRPr/>
+          </a:p>
+          <a:p>
+            <a:pPr indent="-342900" lvl="0" marL="457200" rtl="0" algn="l">
+              <a:spcBef>
+                <a:spcPts val="0"/>
+              </a:spcBef>
+              <a:spcAft>
+                <a:spcPts val="0"/>
+              </a:spcAft>
+              <a:buSzPts val="1800"/>
+              <a:buChar char="●"/>
+            </a:pPr>
+            <a:r>
+              <a:rPr lang="en"/>
+              <a:t>Discussion of homework</a:t>
+            </a:r>
+            <a:endParaRPr/>
+          </a:p>
+          <a:p>
+            <a:pPr indent="0" lvl="0" marL="0" rtl="0" algn="l">
+              <a:spcBef>
+                <a:spcPts val="1200"/>
+              </a:spcBef>
+              <a:spcAft>
+                <a:spcPts val="0"/>
+              </a:spcAft>
+              <a:buNone/>
+            </a:pPr>
+            <a:r>
+              <a:rPr b="1" lang="en"/>
+              <a:t>Written homework</a:t>
+            </a:r>
+            <a:endParaRPr b="1"/>
+          </a:p>
+          <a:p>
+            <a:pPr indent="-342900" lvl="0" marL="457200" rtl="0" algn="l">
+              <a:spcBef>
+                <a:spcPts val="1200"/>
+              </a:spcBef>
+              <a:spcAft>
+                <a:spcPts val="0"/>
+              </a:spcAft>
+              <a:buSzPts val="1800"/>
+              <a:buChar char="●"/>
+            </a:pPr>
+            <a:r>
+              <a:rPr lang="en"/>
+              <a:t>See Course organization doc</a:t>
+            </a:r>
+            <a:endParaRPr/>
+          </a:p>
+          <a:p>
+            <a:pPr indent="-342900" lvl="0" marL="457200" rtl="0" algn="l">
+              <a:spcBef>
+                <a:spcPts val="0"/>
+              </a:spcBef>
+              <a:spcAft>
+                <a:spcPts val="0"/>
+              </a:spcAft>
+              <a:buSzPts val="1800"/>
+              <a:buChar char="●"/>
+            </a:pPr>
+            <a:r>
+              <a:rPr lang="en"/>
+              <a:t>Self-organized</a:t>
+            </a:r>
+            <a:endParaRPr/>
+          </a:p>
+          <a:p>
+            <a:pPr indent="0" lvl="0" marL="0" rtl="0" algn="l">
+              <a:spcBef>
+                <a:spcPts val="1200"/>
+              </a:spcBef>
+              <a:spcAft>
+                <a:spcPts val="1200"/>
+              </a:spcAft>
+              <a:buNone/>
+            </a:pPr>
+            <a:r>
+              <a:t/>
             </a:r>
             <a:endParaRPr/>
           </a:p>
@@ -10295,7 +10330,7 @@
             </a:pPr>
             <a:r>
               <a:rPr lang="en"/>
-              <a:t>Work Rhythm</a:t>
+              <a:t>Course Communication</a:t>
             </a:r>
             <a:endParaRPr/>
           </a:p>
@@ -10304,6 +10339,153 @@
       <p:sp>
         <p:nvSpPr>
           <p:cNvPr id="166" name="Google Shape;166;p26"/>
+          <p:cNvSpPr txBox="1"/>
+          <p:nvPr>
+            <p:ph idx="1" type="body"/>
+          </p:nvPr>
+        </p:nvSpPr>
+        <p:spPr>
+          <a:xfrm>
+            <a:off x="274320" y="914400"/>
+            <a:ext cx="8595300" cy="4114800"/>
+          </a:xfrm>
+          <a:prstGeom prst="rect">
+            <a:avLst/>
+          </a:prstGeom>
+        </p:spPr>
+        <p:txBody>
+          <a:bodyPr anchorCtr="0" anchor="t" bIns="0" lIns="0" spcFirstLastPara="1" rIns="0" wrap="square" tIns="0">
+            <a:noAutofit/>
+          </a:bodyPr>
+          <a:lstStyle/>
+          <a:p>
+            <a:pPr indent="0" lvl="0" marL="0" rtl="0" algn="l">
+              <a:spcBef>
+                <a:spcPts val="0"/>
+              </a:spcBef>
+              <a:spcAft>
+                <a:spcPts val="0"/>
+              </a:spcAft>
+              <a:buClr>
+                <a:schemeClr val="dk1"/>
+              </a:buClr>
+              <a:buSzPts val="1100"/>
+              <a:buFont typeface="Arial"/>
+              <a:buNone/>
+            </a:pPr>
+            <a:r>
+              <a:rPr lang="en"/>
+              <a:t>Announcements by email</a:t>
+            </a:r>
+            <a:endParaRPr/>
+          </a:p>
+          <a:p>
+            <a:pPr indent="-342900" lvl="0" marL="457200" rtl="0" algn="l">
+              <a:spcBef>
+                <a:spcPts val="1200"/>
+              </a:spcBef>
+              <a:spcAft>
+                <a:spcPts val="0"/>
+              </a:spcAft>
+              <a:buSzPts val="1800"/>
+              <a:buChar char="●"/>
+            </a:pPr>
+            <a:r>
+              <a:rPr lang="en"/>
+              <a:t>Through course management system</a:t>
+            </a:r>
+            <a:endParaRPr/>
+          </a:p>
+          <a:p>
+            <a:pPr indent="0" lvl="0" marL="0" rtl="0" algn="l">
+              <a:spcBef>
+                <a:spcPts val="1200"/>
+              </a:spcBef>
+              <a:spcAft>
+                <a:spcPts val="0"/>
+              </a:spcAft>
+              <a:buNone/>
+            </a:pPr>
+            <a:r>
+              <a:rPr lang="en"/>
+              <a:t>Questions to teaching team</a:t>
+            </a:r>
+            <a:endParaRPr/>
+          </a:p>
+          <a:p>
+            <a:pPr indent="-342900" lvl="0" marL="457200" rtl="0" algn="l">
+              <a:spcBef>
+                <a:spcPts val="1200"/>
+              </a:spcBef>
+              <a:spcAft>
+                <a:spcPts val="0"/>
+              </a:spcAft>
+              <a:buSzPts val="1800"/>
+              <a:buChar char="●"/>
+            </a:pPr>
+            <a:r>
+              <a:rPr lang="en"/>
+              <a:t>Please ask your question in the course forum</a:t>
+            </a:r>
+            <a:endParaRPr/>
+          </a:p>
+          <a:p>
+            <a:pPr indent="-342900" lvl="0" marL="457200" rtl="0" algn="l">
+              <a:spcBef>
+                <a:spcPts val="0"/>
+              </a:spcBef>
+              <a:spcAft>
+                <a:spcPts val="0"/>
+              </a:spcAft>
+              <a:buSzPts val="1800"/>
+              <a:buChar char="●"/>
+            </a:pPr>
+            <a:r>
+              <a:rPr lang="en"/>
+              <a:t>For private questions, use the teaching team email alias</a:t>
+            </a:r>
+            <a:endParaRPr/>
+          </a:p>
+          <a:p>
+            <a:pPr indent="0" lvl="0" marL="0" rtl="0" algn="l">
+              <a:spcBef>
+                <a:spcPts val="1200"/>
+              </a:spcBef>
+              <a:spcAft>
+                <a:spcPts val="0"/>
+              </a:spcAft>
+              <a:buClr>
+                <a:schemeClr val="dk1"/>
+              </a:buClr>
+              <a:buSzPts val="1100"/>
+              <a:buFont typeface="Arial"/>
+              <a:buNone/>
+            </a:pPr>
+            <a:r>
+              <a:t/>
+            </a:r>
+            <a:endParaRPr/>
+          </a:p>
+          <a:p>
+            <a:pPr indent="0" lvl="0" marL="0" rtl="0" algn="l">
+              <a:spcBef>
+                <a:spcPts val="1200"/>
+              </a:spcBef>
+              <a:spcAft>
+                <a:spcPts val="1200"/>
+              </a:spcAft>
+              <a:buNone/>
+            </a:pPr>
+            <a:r>
+              <a:t/>
+            </a:r>
+            <a:endParaRPr/>
+          </a:p>
+        </p:txBody>
+      </p:sp>
+      <p:sp>
+        <p:nvSpPr>
+          <p:cNvPr id="167" name="Google Shape;167;p26"/>
           <p:cNvSpPr txBox="1"/>
           <p:nvPr>
             <p:ph idx="12" type="sldNum"/>
@@ -10371,195 +10553,6 @@
                 <a:schemeClr val="dk2"/>
               </a:solidFill>
             </a:endParaRPr>
-          </a:p>
-        </p:txBody>
-      </p:sp>
-      <p:sp>
-        <p:nvSpPr>
-          <p:cNvPr id="167" name="Google Shape;167;p26"/>
-          <p:cNvSpPr txBox="1"/>
-          <p:nvPr>
-            <p:ph idx="1" type="body"/>
-          </p:nvPr>
-        </p:nvSpPr>
-        <p:spPr>
-          <a:xfrm>
-            <a:off x="274320" y="914400"/>
-            <a:ext cx="8595300" cy="4114800"/>
-          </a:xfrm>
-          <a:prstGeom prst="rect">
-            <a:avLst/>
-          </a:prstGeom>
-        </p:spPr>
-        <p:txBody>
-          <a:bodyPr anchorCtr="0" anchor="t" bIns="0" lIns="0" spcFirstLastPara="1" rIns="0" wrap="square" tIns="0">
-            <a:noAutofit/>
-          </a:bodyPr>
-          <a:lstStyle/>
-          <a:p>
-            <a:pPr indent="0" lvl="0" marL="0" rtl="0" algn="l">
-              <a:spcBef>
-                <a:spcPts val="0"/>
-              </a:spcBef>
-              <a:spcAft>
-                <a:spcPts val="0"/>
-              </a:spcAft>
-              <a:buNone/>
-            </a:pPr>
-            <a:r>
-              <a:rPr b="1" lang="en"/>
-              <a:t>Lecture (class)</a:t>
-            </a:r>
-            <a:endParaRPr b="1"/>
-          </a:p>
-          <a:p>
-            <a:pPr indent="-342900" lvl="0" marL="457200" rtl="0" algn="l">
-              <a:spcBef>
-                <a:spcPts val="1200"/>
-              </a:spcBef>
-              <a:spcAft>
-                <a:spcPts val="0"/>
-              </a:spcAft>
-              <a:buSzPts val="1800"/>
-              <a:buChar char="●"/>
-            </a:pPr>
-            <a:r>
-              <a:rPr lang="en"/>
-              <a:t>Review of last week (quiz)</a:t>
-            </a:r>
-            <a:endParaRPr/>
-          </a:p>
-          <a:p>
-            <a:pPr indent="-342900" lvl="0" marL="457200" rtl="0" algn="l">
-              <a:spcBef>
-                <a:spcPts val="0"/>
-              </a:spcBef>
-              <a:spcAft>
-                <a:spcPts val="0"/>
-              </a:spcAft>
-              <a:buSzPts val="1800"/>
-              <a:buChar char="●"/>
-            </a:pPr>
-            <a:r>
-              <a:rPr lang="en"/>
-              <a:t>Presentation of this week’s topic</a:t>
-            </a:r>
-            <a:endParaRPr/>
-          </a:p>
-          <a:p>
-            <a:pPr indent="0" lvl="0" marL="0" rtl="0" algn="l">
-              <a:spcBef>
-                <a:spcPts val="1200"/>
-              </a:spcBef>
-              <a:spcAft>
-                <a:spcPts val="0"/>
-              </a:spcAft>
-              <a:buNone/>
-            </a:pPr>
-            <a:r>
-              <a:rPr b="1" lang="en"/>
-              <a:t>Method exercise</a:t>
-            </a:r>
-            <a:endParaRPr b="1"/>
-          </a:p>
-          <a:p>
-            <a:pPr indent="-342900" lvl="0" marL="457200" rtl="0" algn="l">
-              <a:spcBef>
-                <a:spcPts val="1200"/>
-              </a:spcBef>
-              <a:spcAft>
-                <a:spcPts val="0"/>
-              </a:spcAft>
-              <a:buSzPts val="1800"/>
-              <a:buChar char="●"/>
-            </a:pPr>
-            <a:r>
-              <a:rPr lang="en"/>
-              <a:t>Discussion of articles</a:t>
-            </a:r>
-            <a:endParaRPr/>
-          </a:p>
-          <a:p>
-            <a:pPr indent="-342900" lvl="0" marL="457200" rtl="0" algn="l">
-              <a:spcBef>
-                <a:spcPts val="0"/>
-              </a:spcBef>
-              <a:spcAft>
-                <a:spcPts val="0"/>
-              </a:spcAft>
-              <a:buSzPts val="1800"/>
-              <a:buChar char="●"/>
-            </a:pPr>
-            <a:r>
-              <a:rPr lang="en"/>
-              <a:t>Discussion of homework</a:t>
-            </a:r>
-            <a:endParaRPr/>
-          </a:p>
-          <a:p>
-            <a:pPr indent="0" lvl="0" marL="0" rtl="0" algn="l">
-              <a:spcBef>
-                <a:spcPts val="1200"/>
-              </a:spcBef>
-              <a:spcAft>
-                <a:spcPts val="0"/>
-              </a:spcAft>
-              <a:buNone/>
-            </a:pPr>
-            <a:r>
-              <a:rPr b="1" lang="en"/>
-              <a:t>Written homework</a:t>
-            </a:r>
-            <a:endParaRPr b="1"/>
-          </a:p>
-          <a:p>
-            <a:pPr indent="-342900" lvl="0" marL="457200" rtl="0" algn="l">
-              <a:spcBef>
-                <a:spcPts val="1200"/>
-              </a:spcBef>
-              <a:spcAft>
-                <a:spcPts val="0"/>
-              </a:spcAft>
-              <a:buSzPts val="1800"/>
-              <a:buChar char="●"/>
-            </a:pPr>
-            <a:r>
-              <a:rPr lang="en"/>
-              <a:t>See Course organization doc</a:t>
-            </a:r>
-            <a:endParaRPr/>
-          </a:p>
-          <a:p>
-            <a:pPr indent="-342900" lvl="0" marL="457200" rtl="0" algn="l">
-              <a:spcBef>
-                <a:spcPts val="0"/>
-              </a:spcBef>
-              <a:spcAft>
-                <a:spcPts val="0"/>
-              </a:spcAft>
-              <a:buSzPts val="1800"/>
-              <a:buChar char="●"/>
-            </a:pPr>
-            <a:r>
-              <a:rPr lang="en"/>
-              <a:t>Self-organized</a:t>
-            </a:r>
-            <a:endParaRPr/>
-          </a:p>
-          <a:p>
-            <a:pPr indent="0" lvl="0" marL="0" rtl="0" algn="l">
-              <a:spcBef>
-                <a:spcPts val="1200"/>
-              </a:spcBef>
-              <a:spcAft>
-                <a:spcPts val="1200"/>
-              </a:spcAft>
-              <a:buNone/>
-            </a:pPr>
-            <a:r>
-              <a:t/>
-            </a:r>
-            <a:endParaRPr/>
           </a:p>
         </p:txBody>
       </p:sp>
@@ -10906,6 +10899,190 @@
           <p:cNvPr id="172" name="Google Shape;172;p27"/>
           <p:cNvSpPr txBox="1"/>
           <p:nvPr>
+            <p:ph type="ctrTitle"/>
+          </p:nvPr>
+        </p:nvSpPr>
+        <p:spPr>
+          <a:xfrm>
+            <a:off x="0" y="0"/>
+            <a:ext cx="9144000" cy="2388900"/>
+          </a:xfrm>
+          <a:prstGeom prst="rect">
+            <a:avLst/>
+          </a:prstGeom>
+        </p:spPr>
+        <p:txBody>
+          <a:bodyPr anchorCtr="0" anchor="b" bIns="274300" lIns="91425" spcFirstLastPara="1" rIns="91425" wrap="square" tIns="91425">
+            <a:noAutofit/>
+          </a:bodyPr>
+          <a:lstStyle/>
+          <a:p>
+            <a:pPr indent="0" lvl="0" marL="0" rtl="0" algn="ctr">
+              <a:spcBef>
+                <a:spcPts val="0"/>
+              </a:spcBef>
+              <a:spcAft>
+                <a:spcPts val="0"/>
+              </a:spcAft>
+              <a:buNone/>
+            </a:pPr>
+            <a:r>
+              <a:rPr lang="en"/>
+              <a:t>Thank you! Any questions?</a:t>
+            </a:r>
+            <a:endParaRPr/>
+          </a:p>
+        </p:txBody>
+      </p:sp>
+      <p:sp>
+        <p:nvSpPr>
+          <p:cNvPr id="173" name="Google Shape;173;p27"/>
+          <p:cNvSpPr txBox="1"/>
+          <p:nvPr>
+            <p:ph idx="1" type="subTitle"/>
+          </p:nvPr>
+        </p:nvSpPr>
+        <p:spPr>
+          <a:xfrm>
+            <a:off x="0" y="2569475"/>
+            <a:ext cx="9144000" cy="2574000"/>
+          </a:xfrm>
+          <a:prstGeom prst="rect">
+            <a:avLst/>
+          </a:prstGeom>
+        </p:spPr>
+        <p:txBody>
+          <a:bodyPr anchorCtr="0" anchor="t" bIns="91425" lIns="91425" spcFirstLastPara="1" rIns="91425" wrap="square" tIns="274300">
+            <a:noAutofit/>
+          </a:bodyPr>
+          <a:lstStyle/>
+          <a:p>
+            <a:pPr indent="0" lvl="0" marL="0" rtl="0" algn="ctr">
+              <a:lnSpc>
+                <a:spcPct val="150000"/>
+              </a:lnSpc>
+              <a:spcBef>
+                <a:spcPts val="0"/>
+              </a:spcBef>
+              <a:spcAft>
+                <a:spcPts val="0"/>
+              </a:spcAft>
+              <a:buNone/>
+            </a:pPr>
+            <a:r>
+              <a:rPr lang="en" u="sng">
+                <a:solidFill>
+                  <a:schemeClr val="hlink"/>
+                </a:solidFill>
+                <a:hlinkClick r:id="rId3"/>
+              </a:rPr>
+              <a:t>dirk.riehle@fau.de</a:t>
+            </a:r>
+            <a:r>
+              <a:rPr lang="en"/>
+              <a:t> </a:t>
+            </a:r>
+            <a:r>
+              <a:rPr lang="en" sz="2400"/>
+              <a:t>–</a:t>
+            </a:r>
+            <a:r>
+              <a:rPr lang="en"/>
+              <a:t> </a:t>
+            </a:r>
+            <a:r>
+              <a:rPr lang="en" u="sng">
+                <a:solidFill>
+                  <a:schemeClr val="hlink"/>
+                </a:solidFill>
+                <a:hlinkClick r:id="rId4"/>
+              </a:rPr>
+              <a:t>https://oss.cs.fau.de</a:t>
+            </a:r>
+            <a:endParaRPr/>
+          </a:p>
+          <a:p>
+            <a:pPr indent="0" lvl="0" marL="0" rtl="0" algn="ctr">
+              <a:lnSpc>
+                <a:spcPct val="150000"/>
+              </a:lnSpc>
+              <a:spcBef>
+                <a:spcPts val="0"/>
+              </a:spcBef>
+              <a:spcAft>
+                <a:spcPts val="0"/>
+              </a:spcAft>
+              <a:buNone/>
+            </a:pPr>
+            <a:r>
+              <a:rPr lang="en" sz="2400" u="sng">
+                <a:solidFill>
+                  <a:schemeClr val="hlink"/>
+                </a:solidFill>
+                <a:hlinkClick r:id="rId5"/>
+              </a:rPr>
+              <a:t>dirk@riehle.org</a:t>
+            </a:r>
+            <a:r>
+              <a:rPr lang="en" sz="2400"/>
+              <a:t> – </a:t>
+            </a:r>
+            <a:r>
+              <a:rPr lang="en" sz="2400" u="sng">
+                <a:solidFill>
+                  <a:schemeClr val="hlink"/>
+                </a:solidFill>
+                <a:hlinkClick r:id="rId6"/>
+              </a:rPr>
+              <a:t>https://dirkriehle.com</a:t>
+            </a:r>
+            <a:r>
+              <a:rPr lang="en" sz="2400"/>
+              <a:t> – </a:t>
+            </a:r>
+            <a:r>
+              <a:rPr lang="en" sz="2400" u="sng">
+                <a:solidFill>
+                  <a:schemeClr val="hlink"/>
+                </a:solidFill>
+                <a:hlinkClick r:id="rId7"/>
+              </a:rPr>
+              <a:t>@dirkriehle</a:t>
+            </a:r>
+            <a:endParaRPr sz="2400"/>
+          </a:p>
+        </p:txBody>
+      </p:sp>
+    </p:spTree>
+  </p:cSld>
+  <p:clrMapOvr>
+    <a:masterClrMapping/>
+  </p:clrMapOvr>
+</p:sld>
+</file>
+
+<file path=ppt/slides/slide21.xml><?xml version="1.0" encoding="utf-8"?>
+<p:sld xmlns:a="http://schemas.openxmlformats.org/drawingml/2006/main" xmlns:r="http://schemas.openxmlformats.org/officeDocument/2006/relationships" xmlns:mc="http://schemas.openxmlformats.org/markup-compatibility/2006" xmlns:mv="urn:schemas-microsoft-com:mac:vml" xmlns:p="http://schemas.openxmlformats.org/presentationml/2006/main" xmlns:c="http://schemas.openxmlformats.org/drawingml/2006/chart" xmlns:dgm="http://schemas.openxmlformats.org/drawingml/2006/diagram" xmlns:o="urn:schemas-microsoft-com:office:office" xmlns:v="urn:schemas-microsoft-com:vml" xmlns:pvml="urn:schemas-microsoft-com:office:powerpoint" xmlns:com="http://schemas.openxmlformats.org/drawingml/2006/compatibility" xmlns:p14="http://schemas.microsoft.com/office/powerpoint/2010/main" xmlns:p15="http://schemas.microsoft.com/office/powerpoint/2012/main" xmlns:ahyp="http://schemas.microsoft.com/office/drawing/2018/hyperlinkcolor">
+  <p:cSld>
+    <p:spTree>
+      <p:nvGrpSpPr>
+        <p:cNvPr id="177" name="Shape 177"/>
+        <p:cNvGrpSpPr/>
+        <p:nvPr/>
+      </p:nvGrpSpPr>
+      <p:grpSpPr>
+        <a:xfrm>
+          <a:off x="0" y="0"/>
+          <a:ext cx="0" cy="0"/>
+          <a:chOff x="0" y="0"/>
+          <a:chExt cx="0" cy="0"/>
+        </a:xfrm>
+      </p:grpSpPr>
+      <p:sp>
+        <p:nvSpPr>
+          <p:cNvPr id="178" name="Google Shape;178;p28"/>
+          <p:cNvSpPr txBox="1"/>
+          <p:nvPr>
             <p:ph type="title"/>
           </p:nvPr>
         </p:nvSpPr>
@@ -10935,7 +11112,7 @@
             </a:pPr>
             <a:r>
               <a:rPr lang="en"/>
-              <a:t>Course Communication</a:t>
+              <a:t>Legal Notices</a:t>
             </a:r>
             <a:endParaRPr/>
           </a:p>
@@ -10943,154 +11120,7 @@
       </p:sp>
       <p:sp>
         <p:nvSpPr>
-          <p:cNvPr id="173" name="Google Shape;173;p27"/>
-          <p:cNvSpPr txBox="1"/>
-          <p:nvPr>
-            <p:ph idx="1" type="body"/>
-          </p:nvPr>
-        </p:nvSpPr>
-        <p:spPr>
-          <a:xfrm>
-            <a:off x="274320" y="914400"/>
-            <a:ext cx="8595300" cy="4114800"/>
-          </a:xfrm>
-          <a:prstGeom prst="rect">
-            <a:avLst/>
-          </a:prstGeom>
-        </p:spPr>
-        <p:txBody>
-          <a:bodyPr anchorCtr="0" anchor="t" bIns="0" lIns="0" spcFirstLastPara="1" rIns="0" wrap="square" tIns="0">
-            <a:noAutofit/>
-          </a:bodyPr>
-          <a:lstStyle/>
-          <a:p>
-            <a:pPr indent="0" lvl="0" marL="0" rtl="0" algn="l">
-              <a:spcBef>
-                <a:spcPts val="0"/>
-              </a:spcBef>
-              <a:spcAft>
-                <a:spcPts val="0"/>
-              </a:spcAft>
-              <a:buClr>
-                <a:schemeClr val="dk1"/>
-              </a:buClr>
-              <a:buSzPts val="1100"/>
-              <a:buFont typeface="Arial"/>
-              <a:buNone/>
-            </a:pPr>
-            <a:r>
-              <a:rPr lang="en"/>
-              <a:t>Announcements by email</a:t>
-            </a:r>
-            <a:endParaRPr/>
-          </a:p>
-          <a:p>
-            <a:pPr indent="-342900" lvl="0" marL="457200" rtl="0" algn="l">
-              <a:spcBef>
-                <a:spcPts val="1200"/>
-              </a:spcBef>
-              <a:spcAft>
-                <a:spcPts val="0"/>
-              </a:spcAft>
-              <a:buSzPts val="1800"/>
-              <a:buChar char="●"/>
-            </a:pPr>
-            <a:r>
-              <a:rPr lang="en"/>
-              <a:t>Through course management system</a:t>
-            </a:r>
-            <a:endParaRPr/>
-          </a:p>
-          <a:p>
-            <a:pPr indent="0" lvl="0" marL="0" rtl="0" algn="l">
-              <a:spcBef>
-                <a:spcPts val="1200"/>
-              </a:spcBef>
-              <a:spcAft>
-                <a:spcPts val="0"/>
-              </a:spcAft>
-              <a:buNone/>
-            </a:pPr>
-            <a:r>
-              <a:rPr lang="en"/>
-              <a:t>Questions to teaching team</a:t>
-            </a:r>
-            <a:endParaRPr/>
-          </a:p>
-          <a:p>
-            <a:pPr indent="-342900" lvl="0" marL="457200" rtl="0" algn="l">
-              <a:spcBef>
-                <a:spcPts val="1200"/>
-              </a:spcBef>
-              <a:spcAft>
-                <a:spcPts val="0"/>
-              </a:spcAft>
-              <a:buSzPts val="1800"/>
-              <a:buChar char="●"/>
-            </a:pPr>
-            <a:r>
-              <a:rPr lang="en"/>
-              <a:t>Please ask your question in the course forum</a:t>
-            </a:r>
-            <a:endParaRPr/>
-          </a:p>
-          <a:p>
-            <a:pPr indent="-342900" lvl="0" marL="457200" rtl="0" algn="l">
-              <a:spcBef>
-                <a:spcPts val="0"/>
-              </a:spcBef>
-              <a:spcAft>
-                <a:spcPts val="0"/>
-              </a:spcAft>
-              <a:buSzPts val="1800"/>
-              <a:buChar char="●"/>
-            </a:pPr>
-            <a:r>
-              <a:rPr lang="en"/>
-              <a:t>For private questions, use the teaching team email alias</a:t>
-            </a:r>
-            <a:endParaRPr/>
-          </a:p>
-          <a:p>
-            <a:pPr indent="0" lvl="0" marL="0" rtl="0" algn="l">
-              <a:spcBef>
-                <a:spcPts val="1200"/>
-              </a:spcBef>
-              <a:spcAft>
-                <a:spcPts val="0"/>
-              </a:spcAft>
-              <a:buClr>
-                <a:schemeClr val="dk1"/>
-              </a:buClr>
-              <a:buSzPts val="1100"/>
-              <a:buFont typeface="Arial"/>
-              <a:buNone/>
-            </a:pPr>
-            <a:r>
-              <a:t/>
-            </a:r>
-            <a:endParaRPr/>
-          </a:p>
-          <a:p>
-            <a:pPr indent="0" lvl="0" marL="0" rtl="0" algn="l">
-              <a:spcBef>
-                <a:spcPts val="1200"/>
-              </a:spcBef>
-              <a:spcAft>
-                <a:spcPts val="1200"/>
-              </a:spcAft>
-              <a:buNone/>
-            </a:pPr>
-            <a:r>
-              <a:t/>
-            </a:r>
-            <a:endParaRPr/>
-          </a:p>
-        </p:txBody>
-      </p:sp>
-      <p:sp>
-        <p:nvSpPr>
-          <p:cNvPr id="174" name="Google Shape;174;p27"/>
+          <p:cNvPr id="179" name="Google Shape;179;p28"/>
           <p:cNvSpPr txBox="1"/>
           <p:nvPr>
             <p:ph idx="12" type="sldNum"/>
@@ -11161,331 +11191,9 @@
           </a:p>
         </p:txBody>
       </p:sp>
-    </p:spTree>
-  </p:cSld>
-  <p:clrMapOvr>
-    <a:masterClrMapping/>
-  </p:clrMapOvr>
-</p:sld>
-</file>
-
-<file path=ppt/slides/slide21.xml><?xml version="1.0" encoding="utf-8"?>
-<p:sld xmlns:a="http://schemas.openxmlformats.org/drawingml/2006/main" xmlns:r="http://schemas.openxmlformats.org/officeDocument/2006/relationships" xmlns:mc="http://schemas.openxmlformats.org/markup-compatibility/2006" xmlns:mv="urn:schemas-microsoft-com:mac:vml" xmlns:p="http://schemas.openxmlformats.org/presentationml/2006/main" xmlns:c="http://schemas.openxmlformats.org/drawingml/2006/chart" xmlns:dgm="http://schemas.openxmlformats.org/drawingml/2006/diagram" xmlns:o="urn:schemas-microsoft-com:office:office" xmlns:v="urn:schemas-microsoft-com:vml" xmlns:pvml="urn:schemas-microsoft-com:office:powerpoint" xmlns:com="http://schemas.openxmlformats.org/drawingml/2006/compatibility" xmlns:p14="http://schemas.microsoft.com/office/powerpoint/2010/main" xmlns:p15="http://schemas.microsoft.com/office/powerpoint/2012/main" xmlns:ahyp="http://schemas.microsoft.com/office/drawing/2018/hyperlinkcolor">
-  <p:cSld>
-    <p:spTree>
-      <p:nvGrpSpPr>
-        <p:cNvPr id="178" name="Shape 178"/>
-        <p:cNvGrpSpPr/>
-        <p:nvPr/>
-      </p:nvGrpSpPr>
-      <p:grpSpPr>
-        <a:xfrm>
-          <a:off x="0" y="0"/>
-          <a:ext cx="0" cy="0"/>
-          <a:chOff x="0" y="0"/>
-          <a:chExt cx="0" cy="0"/>
-        </a:xfrm>
-      </p:grpSpPr>
-      <p:sp>
-        <p:nvSpPr>
-          <p:cNvPr id="179" name="Google Shape;179;p28"/>
-          <p:cNvSpPr txBox="1"/>
-          <p:nvPr>
-            <p:ph type="ctrTitle"/>
-          </p:nvPr>
-        </p:nvSpPr>
-        <p:spPr>
-          <a:xfrm>
-            <a:off x="0" y="0"/>
-            <a:ext cx="9144000" cy="2388900"/>
-          </a:xfrm>
-          <a:prstGeom prst="rect">
-            <a:avLst/>
-          </a:prstGeom>
-        </p:spPr>
-        <p:txBody>
-          <a:bodyPr anchorCtr="0" anchor="b" bIns="274300" lIns="91425" spcFirstLastPara="1" rIns="91425" wrap="square" tIns="91425">
-            <a:noAutofit/>
-          </a:bodyPr>
-          <a:lstStyle/>
-          <a:p>
-            <a:pPr indent="0" lvl="0" marL="0" rtl="0" algn="ctr">
-              <a:spcBef>
-                <a:spcPts val="0"/>
-              </a:spcBef>
-              <a:spcAft>
-                <a:spcPts val="0"/>
-              </a:spcAft>
-              <a:buNone/>
-            </a:pPr>
-            <a:r>
-              <a:rPr lang="en"/>
-              <a:t>Thank you! Any questions?</a:t>
-            </a:r>
-            <a:endParaRPr/>
-          </a:p>
-        </p:txBody>
-      </p:sp>
       <p:sp>
         <p:nvSpPr>
           <p:cNvPr id="180" name="Google Shape;180;p28"/>
-          <p:cNvSpPr txBox="1"/>
-          <p:nvPr>
-            <p:ph idx="1" type="subTitle"/>
-          </p:nvPr>
-        </p:nvSpPr>
-        <p:spPr>
-          <a:xfrm>
-            <a:off x="0" y="2569475"/>
-            <a:ext cx="9144000" cy="2574000"/>
-          </a:xfrm>
-          <a:prstGeom prst="rect">
-            <a:avLst/>
-          </a:prstGeom>
-        </p:spPr>
-        <p:txBody>
-          <a:bodyPr anchorCtr="0" anchor="t" bIns="91425" lIns="91425" spcFirstLastPara="1" rIns="91425" wrap="square" tIns="274300">
-            <a:noAutofit/>
-          </a:bodyPr>
-          <a:lstStyle/>
-          <a:p>
-            <a:pPr indent="0" lvl="0" marL="0" rtl="0" algn="ctr">
-              <a:lnSpc>
-                <a:spcPct val="150000"/>
-              </a:lnSpc>
-              <a:spcBef>
-                <a:spcPts val="0"/>
-              </a:spcBef>
-              <a:spcAft>
-                <a:spcPts val="0"/>
-              </a:spcAft>
-              <a:buNone/>
-            </a:pPr>
-            <a:r>
-              <a:rPr lang="en" u="sng">
-                <a:solidFill>
-                  <a:schemeClr val="hlink"/>
-                </a:solidFill>
-                <a:hlinkClick r:id="rId3"/>
-              </a:rPr>
-              <a:t>dirk.riehle@fau.de</a:t>
-            </a:r>
-            <a:r>
-              <a:rPr lang="en"/>
-              <a:t> </a:t>
-            </a:r>
-            <a:r>
-              <a:rPr lang="en" sz="2400"/>
-              <a:t>–</a:t>
-            </a:r>
-            <a:r>
-              <a:rPr lang="en"/>
-              <a:t> </a:t>
-            </a:r>
-            <a:r>
-              <a:rPr lang="en" u="sng">
-                <a:solidFill>
-                  <a:schemeClr val="hlink"/>
-                </a:solidFill>
-                <a:hlinkClick r:id="rId4"/>
-              </a:rPr>
-              <a:t>https://oss.cs.fau.de</a:t>
-            </a:r>
-            <a:endParaRPr/>
-          </a:p>
-          <a:p>
-            <a:pPr indent="0" lvl="0" marL="0" rtl="0" algn="ctr">
-              <a:lnSpc>
-                <a:spcPct val="150000"/>
-              </a:lnSpc>
-              <a:spcBef>
-                <a:spcPts val="0"/>
-              </a:spcBef>
-              <a:spcAft>
-                <a:spcPts val="0"/>
-              </a:spcAft>
-              <a:buNone/>
-            </a:pPr>
-            <a:r>
-              <a:rPr lang="en" sz="2400" u="sng">
-                <a:solidFill>
-                  <a:schemeClr val="hlink"/>
-                </a:solidFill>
-                <a:hlinkClick r:id="rId5"/>
-              </a:rPr>
-              <a:t>dirk@riehle.org</a:t>
-            </a:r>
-            <a:r>
-              <a:rPr lang="en" sz="2400"/>
-              <a:t> – </a:t>
-            </a:r>
-            <a:r>
-              <a:rPr lang="en" sz="2400" u="sng">
-                <a:solidFill>
-                  <a:schemeClr val="hlink"/>
-                </a:solidFill>
-                <a:hlinkClick r:id="rId6"/>
-              </a:rPr>
-              <a:t>https://dirkriehle.com</a:t>
-            </a:r>
-            <a:r>
-              <a:rPr lang="en" sz="2400"/>
-              <a:t> – </a:t>
-            </a:r>
-            <a:r>
-              <a:rPr lang="en" sz="2400" u="sng">
-                <a:solidFill>
-                  <a:schemeClr val="hlink"/>
-                </a:solidFill>
-                <a:hlinkClick r:id="rId7"/>
-              </a:rPr>
-              <a:t>@dirkriehle</a:t>
-            </a:r>
-            <a:endParaRPr sz="2400"/>
-          </a:p>
-        </p:txBody>
-      </p:sp>
-    </p:spTree>
-  </p:cSld>
-  <p:clrMapOvr>
-    <a:masterClrMapping/>
-  </p:clrMapOvr>
-</p:sld>
-</file>
-
-<file path=ppt/slides/slide22.xml><?xml version="1.0" encoding="utf-8"?>
-<p:sld xmlns:a="http://schemas.openxmlformats.org/drawingml/2006/main" xmlns:r="http://schemas.openxmlformats.org/officeDocument/2006/relationships" xmlns:mc="http://schemas.openxmlformats.org/markup-compatibility/2006" xmlns:mv="urn:schemas-microsoft-com:mac:vml" xmlns:p="http://schemas.openxmlformats.org/presentationml/2006/main" xmlns:c="http://schemas.openxmlformats.org/drawingml/2006/chart" xmlns:dgm="http://schemas.openxmlformats.org/drawingml/2006/diagram" xmlns:o="urn:schemas-microsoft-com:office:office" xmlns:v="urn:schemas-microsoft-com:vml" xmlns:pvml="urn:schemas-microsoft-com:office:powerpoint" xmlns:com="http://schemas.openxmlformats.org/drawingml/2006/compatibility" xmlns:p14="http://schemas.microsoft.com/office/powerpoint/2010/main" xmlns:p15="http://schemas.microsoft.com/office/powerpoint/2012/main" xmlns:ahyp="http://schemas.microsoft.com/office/drawing/2018/hyperlinkcolor">
-  <p:cSld>
-    <p:spTree>
-      <p:nvGrpSpPr>
-        <p:cNvPr id="184" name="Shape 184"/>
-        <p:cNvGrpSpPr/>
-        <p:nvPr/>
-      </p:nvGrpSpPr>
-      <p:grpSpPr>
-        <a:xfrm>
-          <a:off x="0" y="0"/>
-          <a:ext cx="0" cy="0"/>
-          <a:chOff x="0" y="0"/>
-          <a:chExt cx="0" cy="0"/>
-        </a:xfrm>
-      </p:grpSpPr>
-      <p:sp>
-        <p:nvSpPr>
-          <p:cNvPr id="185" name="Google Shape;185;p29"/>
-          <p:cNvSpPr txBox="1"/>
-          <p:nvPr>
-            <p:ph type="title"/>
-          </p:nvPr>
-        </p:nvSpPr>
-        <p:spPr>
-          <a:xfrm>
-            <a:off x="0" y="0"/>
-            <a:ext cx="9144000" cy="685800"/>
-          </a:xfrm>
-          <a:prstGeom prst="rect">
-            <a:avLst/>
-          </a:prstGeom>
-        </p:spPr>
-        <p:txBody>
-          <a:bodyPr anchorCtr="0" anchor="ctr" bIns="91425" lIns="274300" spcFirstLastPara="1" rIns="91425" wrap="square" tIns="91425">
-            <a:noAutofit/>
-          </a:bodyPr>
-          <a:lstStyle/>
-          <a:p>
-            <a:pPr indent="0" lvl="0" marL="0" rtl="0" algn="l">
-              <a:spcBef>
-                <a:spcPts val="0"/>
-              </a:spcBef>
-              <a:spcAft>
-                <a:spcPts val="0"/>
-              </a:spcAft>
-              <a:buNone/>
-            </a:pPr>
-            <a:r>
-              <a:rPr lang="en"/>
-              <a:t>Legal Notices</a:t>
-            </a:r>
-            <a:endParaRPr/>
-          </a:p>
-        </p:txBody>
-      </p:sp>
-      <p:sp>
-        <p:nvSpPr>
-          <p:cNvPr id="186" name="Google Shape;186;p29"/>
-          <p:cNvSpPr txBox="1"/>
-          <p:nvPr>
-            <p:ph idx="12" type="sldNum"/>
-          </p:nvPr>
-        </p:nvSpPr>
-        <p:spPr>
-          <a:xfrm>
-            <a:off x="7315202" y="4416550"/>
-            <a:ext cx="1828800" cy="731400"/>
-          </a:xfrm>
-          <a:prstGeom prst="rect">
-            <a:avLst/>
-          </a:prstGeom>
-        </p:spPr>
-        <p:txBody>
-          <a:bodyPr anchorCtr="0" anchor="b" bIns="91425" lIns="91425" spcFirstLastPara="1" rIns="91425" wrap="square" tIns="91425">
-            <a:noAutofit/>
-          </a:bodyPr>
-          <a:lstStyle/>
-          <a:p>
-            <a:pPr indent="0" lvl="0" marL="0" rtl="0" algn="r">
-              <a:spcBef>
-                <a:spcPts val="0"/>
-              </a:spcBef>
-              <a:spcAft>
-                <a:spcPts val="0"/>
-              </a:spcAft>
-              <a:buNone/>
-            </a:pPr>
-            <a:fld id="{00000000-1234-1234-1234-123412341234}" type="slidenum">
-              <a:rPr lang="en"/>
-              <a:t>‹#›</a:t>
-            </a:fld>
-            <a:endParaRPr/>
-          </a:p>
-          <a:p>
-            <a:pPr indent="0" lvl="0" marL="0" rtl="0" algn="r">
-              <a:spcBef>
-                <a:spcPts val="0"/>
-              </a:spcBef>
-              <a:spcAft>
-                <a:spcPts val="0"/>
-              </a:spcAft>
-              <a:buNone/>
-            </a:pPr>
-            <a:r>
-              <a:rPr b="0" lang="en" sz="900" u="sng">
-                <a:solidFill>
-                  <a:schemeClr val="hlink"/>
-                </a:solidFill>
-                <a:hlinkClick r:id="rId3"/>
-              </a:rPr>
-              <a:t>https://profriehle.com</a:t>
-            </a:r>
-            <a:r>
-              <a:rPr b="0" lang="en" sz="900">
-                <a:solidFill>
-                  <a:schemeClr val="dk2"/>
-                </a:solidFill>
-              </a:rPr>
-              <a:t> </a:t>
-            </a:r>
-            <a:endParaRPr b="0" sz="900">
-              <a:solidFill>
-                <a:schemeClr val="dk2"/>
-              </a:solidFill>
-            </a:endParaRPr>
-          </a:p>
-        </p:txBody>
-      </p:sp>
-      <p:sp>
-        <p:nvSpPr>
-          <p:cNvPr id="187" name="Google Shape;187;p29"/>
           <p:cNvSpPr txBox="1"/>
           <p:nvPr>
             <p:ph idx="1" type="body"/>
@@ -11862,7 +11570,7 @@
             </a:pPr>
             <a:r>
               <a:rPr lang="en"/>
-              <a:t>Course Syllabus</a:t>
+              <a:t>Course Content and Structure</a:t>
             </a:r>
             <a:endParaRPr/>
           </a:p>
@@ -11941,2395 +11649,34 @@
           </a:p>
         </p:txBody>
       </p:sp>
-      <p:graphicFrame>
-        <p:nvGraphicFramePr>
+      <p:pic>
+        <p:nvPicPr>
           <p:cNvPr id="58" name="Google Shape;58;p11"/>
-          <p:cNvGraphicFramePr/>
+          <p:cNvPicPr preferRelativeResize="0"/>
           <p:nvPr/>
-        </p:nvGraphicFramePr>
-        <p:xfrm>
-          <a:off x="274320" y="914400"/>
-          <a:ext cx="3000000" cy="3000000"/>
-        </p:xfrm>
-        <a:graphic>
-          <a:graphicData uri="http://schemas.openxmlformats.org/drawingml/2006/table">
-            <a:tbl>
-              <a:tblPr>
-                <a:noFill/>
-                <a:tableStyleId>{23EBFF20-7562-40A0-8FD4-97E65A76C2C4}</a:tableStyleId>
-              </a:tblPr>
-              <a:tblGrid>
-                <a:gridCol w="651300"/>
-                <a:gridCol w="2266250"/>
-                <a:gridCol w="5677825"/>
-              </a:tblGrid>
-              <a:tr h="316525">
-                <a:tc>
-                  <a:txBody>
-                    <a:bodyPr/>
-                    <a:lstStyle/>
-                    <a:p>
-                      <a:pPr indent="0" lvl="0" marL="0" rtl="0" algn="ctr">
-                        <a:spcBef>
-                          <a:spcPts val="0"/>
-                        </a:spcBef>
-                        <a:spcAft>
-                          <a:spcPts val="0"/>
-                        </a:spcAft>
-                        <a:buNone/>
-                      </a:pPr>
-                      <a:r>
-                        <a:rPr b="1" lang="en" sz="1200">
-                          <a:solidFill>
-                            <a:schemeClr val="lt1"/>
-                          </a:solidFill>
-                        </a:rPr>
-                        <a:t>1.</a:t>
-                      </a:r>
-                      <a:endParaRPr b="1" sz="1200">
-                        <a:solidFill>
-                          <a:schemeClr val="lt1"/>
-                        </a:solidFill>
-                      </a:endParaRPr>
-                    </a:p>
-                  </a:txBody>
-                  <a:tcPr marT="0" marB="0" marR="91425" marL="91425" anchor="ctr">
-                    <a:lnL cap="flat" cmpd="sng" w="38100">
-                      <a:solidFill>
-                        <a:schemeClr val="lt1"/>
-                      </a:solidFill>
-                      <a:prstDash val="solid"/>
-                      <a:round/>
-                      <a:headEnd len="sm" w="sm" type="none"/>
-                      <a:tailEnd len="sm" w="sm" type="none"/>
-                    </a:lnL>
-                    <a:lnR cap="flat" cmpd="sng" w="38100">
-                      <a:solidFill>
-                        <a:schemeClr val="lt1"/>
-                      </a:solidFill>
-                      <a:prstDash val="solid"/>
-                      <a:round/>
-                      <a:headEnd len="sm" w="sm" type="none"/>
-                      <a:tailEnd len="sm" w="sm" type="none"/>
-                    </a:lnR>
-                    <a:lnT cap="flat" cmpd="sng" w="38100">
-                      <a:solidFill>
-                        <a:schemeClr val="lt1"/>
-                      </a:solidFill>
-                      <a:prstDash val="solid"/>
-                      <a:round/>
-                      <a:headEnd len="sm" w="sm" type="none"/>
-                      <a:tailEnd len="sm" w="sm" type="none"/>
-                    </a:lnT>
-                    <a:lnB cap="flat" cmpd="sng" w="38100">
-                      <a:solidFill>
-                        <a:schemeClr val="lt1"/>
-                      </a:solidFill>
-                      <a:prstDash val="solid"/>
-                      <a:round/>
-                      <a:headEnd len="sm" w="sm" type="none"/>
-                      <a:tailEnd len="sm" w="sm" type="none"/>
-                    </a:lnB>
-                    <a:solidFill>
-                      <a:schemeClr val="accent4"/>
-                    </a:solidFill>
-                  </a:tcPr>
-                </a:tc>
-                <a:tc rowSpan="2">
-                  <a:txBody>
-                    <a:bodyPr/>
-                    <a:lstStyle/>
-                    <a:p>
-                      <a:pPr indent="0" lvl="0" marL="0" rtl="0" algn="l">
-                        <a:spcBef>
-                          <a:spcPts val="0"/>
-                        </a:spcBef>
-                        <a:spcAft>
-                          <a:spcPts val="0"/>
-                        </a:spcAft>
-                        <a:buNone/>
-                      </a:pPr>
-                      <a:r>
-                        <a:rPr b="1" lang="en" sz="1200">
-                          <a:solidFill>
-                            <a:schemeClr val="lt1"/>
-                          </a:solidFill>
-                        </a:rPr>
-                        <a:t>Science in general</a:t>
-                      </a:r>
-                      <a:endParaRPr b="1" sz="1200">
-                        <a:solidFill>
-                          <a:schemeClr val="lt1"/>
-                        </a:solidFill>
-                      </a:endParaRPr>
-                    </a:p>
-                  </a:txBody>
-                  <a:tcPr marT="0" marB="0" marR="91425" marL="91425" anchor="ctr">
-                    <a:lnL cap="flat" cmpd="sng" w="38100">
-                      <a:solidFill>
-                        <a:schemeClr val="lt1"/>
-                      </a:solidFill>
-                      <a:prstDash val="solid"/>
-                      <a:round/>
-                      <a:headEnd len="sm" w="sm" type="none"/>
-                      <a:tailEnd len="sm" w="sm" type="none"/>
-                    </a:lnL>
-                    <a:lnR cap="flat" cmpd="sng" w="38100">
-                      <a:solidFill>
-                        <a:schemeClr val="lt1"/>
-                      </a:solidFill>
-                      <a:prstDash val="solid"/>
-                      <a:round/>
-                      <a:headEnd len="sm" w="sm" type="none"/>
-                      <a:tailEnd len="sm" w="sm" type="none"/>
-                    </a:lnR>
-                    <a:lnT cap="flat" cmpd="sng" w="38100">
-                      <a:solidFill>
-                        <a:schemeClr val="lt1"/>
-                      </a:solidFill>
-                      <a:prstDash val="solid"/>
-                      <a:round/>
-                      <a:headEnd len="sm" w="sm" type="none"/>
-                      <a:tailEnd len="sm" w="sm" type="none"/>
-                    </a:lnT>
-                    <a:lnB cap="flat" cmpd="sng" w="38100">
-                      <a:solidFill>
-                        <a:schemeClr val="lt1"/>
-                      </a:solidFill>
-                      <a:prstDash val="solid"/>
-                      <a:round/>
-                      <a:headEnd len="sm" w="sm" type="none"/>
-                      <a:tailEnd len="sm" w="sm" type="none"/>
-                    </a:lnB>
-                    <a:solidFill>
-                      <a:schemeClr val="dk2"/>
-                    </a:solidFill>
-                  </a:tcPr>
-                </a:tc>
-                <a:tc>
-                  <a:txBody>
-                    <a:bodyPr/>
-                    <a:lstStyle/>
-                    <a:p>
-                      <a:pPr indent="0" lvl="0" marL="0" rtl="0" algn="l">
-                        <a:spcBef>
-                          <a:spcPts val="0"/>
-                        </a:spcBef>
-                        <a:spcAft>
-                          <a:spcPts val="0"/>
-                        </a:spcAft>
-                        <a:buNone/>
-                      </a:pPr>
-                      <a:r>
-                        <a:rPr lang="en" sz="1200"/>
-                        <a:t>What is science?</a:t>
-                      </a:r>
-                      <a:endParaRPr sz="1200"/>
-                    </a:p>
-                  </a:txBody>
-                  <a:tcPr marT="0" marB="0" marR="91425" marL="91425" anchor="ctr">
-                    <a:lnL cap="flat" cmpd="sng" w="38100">
-                      <a:solidFill>
-                        <a:schemeClr val="lt1"/>
-                      </a:solidFill>
-                      <a:prstDash val="solid"/>
-                      <a:round/>
-                      <a:headEnd len="sm" w="sm" type="none"/>
-                      <a:tailEnd len="sm" w="sm" type="none"/>
-                    </a:lnL>
-                    <a:lnR cap="flat" cmpd="sng" w="38100">
-                      <a:solidFill>
-                        <a:schemeClr val="lt1"/>
-                      </a:solidFill>
-                      <a:prstDash val="solid"/>
-                      <a:round/>
-                      <a:headEnd len="sm" w="sm" type="none"/>
-                      <a:tailEnd len="sm" w="sm" type="none"/>
-                    </a:lnR>
-                    <a:lnT cap="flat" cmpd="sng" w="38100">
-                      <a:solidFill>
-                        <a:schemeClr val="lt1"/>
-                      </a:solidFill>
-                      <a:prstDash val="solid"/>
-                      <a:round/>
-                      <a:headEnd len="sm" w="sm" type="none"/>
-                      <a:tailEnd len="sm" w="sm" type="none"/>
-                    </a:lnT>
-                    <a:lnB cap="flat" cmpd="sng" w="38100">
-                      <a:solidFill>
-                        <a:schemeClr val="lt1"/>
-                      </a:solidFill>
-                      <a:prstDash val="solid"/>
-                      <a:round/>
-                      <a:headEnd len="sm" w="sm" type="none"/>
-                      <a:tailEnd len="sm" w="sm" type="none"/>
-                    </a:lnB>
-                  </a:tcPr>
-                </a:tc>
-              </a:tr>
-              <a:tr h="316525">
-                <a:tc>
-                  <a:txBody>
-                    <a:bodyPr/>
-                    <a:lstStyle/>
-                    <a:p>
-                      <a:pPr indent="0" lvl="0" marL="0" rtl="0" algn="ctr">
-                        <a:spcBef>
-                          <a:spcPts val="0"/>
-                        </a:spcBef>
-                        <a:spcAft>
-                          <a:spcPts val="0"/>
-                        </a:spcAft>
-                        <a:buNone/>
-                      </a:pPr>
-                      <a:r>
-                        <a:rPr b="1" lang="en" sz="1200">
-                          <a:solidFill>
-                            <a:schemeClr val="lt1"/>
-                          </a:solidFill>
-                        </a:rPr>
-                        <a:t>2.</a:t>
-                      </a:r>
-                      <a:endParaRPr b="1" sz="1200">
-                        <a:solidFill>
-                          <a:schemeClr val="lt1"/>
-                        </a:solidFill>
-                      </a:endParaRPr>
-                    </a:p>
-                  </a:txBody>
-                  <a:tcPr marT="0" marB="0" marR="91425" marL="91425" anchor="ctr">
-                    <a:lnL cap="flat" cmpd="sng" w="38100">
-                      <a:solidFill>
-                        <a:schemeClr val="lt1"/>
-                      </a:solidFill>
-                      <a:prstDash val="solid"/>
-                      <a:round/>
-                      <a:headEnd len="sm" w="sm" type="none"/>
-                      <a:tailEnd len="sm" w="sm" type="none"/>
-                    </a:lnL>
-                    <a:lnR cap="flat" cmpd="sng" w="38100">
-                      <a:solidFill>
-                        <a:schemeClr val="lt1"/>
-                      </a:solidFill>
-                      <a:prstDash val="solid"/>
-                      <a:round/>
-                      <a:headEnd len="sm" w="sm" type="none"/>
-                      <a:tailEnd len="sm" w="sm" type="none"/>
-                    </a:lnR>
-                    <a:lnT cap="flat" cmpd="sng" w="38100">
-                      <a:solidFill>
-                        <a:schemeClr val="lt1"/>
-                      </a:solidFill>
-                      <a:prstDash val="solid"/>
-                      <a:round/>
-                      <a:headEnd len="sm" w="sm" type="none"/>
-                      <a:tailEnd len="sm" w="sm" type="none"/>
-                    </a:lnT>
-                    <a:lnB cap="flat" cmpd="sng" w="38100">
-                      <a:solidFill>
-                        <a:schemeClr val="lt1"/>
-                      </a:solidFill>
-                      <a:prstDash val="solid"/>
-                      <a:round/>
-                      <a:headEnd len="sm" w="sm" type="none"/>
-                      <a:tailEnd len="sm" w="sm" type="none"/>
-                    </a:lnB>
-                    <a:solidFill>
-                      <a:schemeClr val="accent4"/>
-                    </a:solidFill>
-                  </a:tcPr>
-                </a:tc>
-                <a:tc vMerge="1"/>
-                <a:tc>
-                  <a:txBody>
-                    <a:bodyPr/>
-                    <a:lstStyle/>
-                    <a:p>
-                      <a:pPr indent="0" lvl="0" marL="0" rtl="0" algn="l">
-                        <a:spcBef>
-                          <a:spcPts val="0"/>
-                        </a:spcBef>
-                        <a:spcAft>
-                          <a:spcPts val="0"/>
-                        </a:spcAft>
-                        <a:buNone/>
-                      </a:pPr>
-                      <a:r>
-                        <a:rPr lang="en" sz="1200">
-                          <a:solidFill>
-                            <a:schemeClr val="dk1"/>
-                          </a:solidFill>
-                        </a:rPr>
-                        <a:t>Scientific research</a:t>
-                      </a:r>
-                      <a:endParaRPr sz="1200">
-                        <a:solidFill>
-                          <a:schemeClr val="dk1"/>
-                        </a:solidFill>
-                      </a:endParaRPr>
-                    </a:p>
-                  </a:txBody>
-                  <a:tcPr marT="0" marB="0" marR="91425" marL="91425" anchor="ctr">
-                    <a:lnL cap="flat" cmpd="sng" w="38100">
-                      <a:solidFill>
-                        <a:schemeClr val="lt1"/>
-                      </a:solidFill>
-                      <a:prstDash val="solid"/>
-                      <a:round/>
-                      <a:headEnd len="sm" w="sm" type="none"/>
-                      <a:tailEnd len="sm" w="sm" type="none"/>
-                    </a:lnL>
-                    <a:lnR cap="flat" cmpd="sng" w="38100">
-                      <a:solidFill>
-                        <a:schemeClr val="lt1"/>
-                      </a:solidFill>
-                      <a:prstDash val="solid"/>
-                      <a:round/>
-                      <a:headEnd len="sm" w="sm" type="none"/>
-                      <a:tailEnd len="sm" w="sm" type="none"/>
-                    </a:lnR>
-                    <a:lnT cap="flat" cmpd="sng" w="38100">
-                      <a:solidFill>
-                        <a:schemeClr val="lt1"/>
-                      </a:solidFill>
-                      <a:prstDash val="solid"/>
-                      <a:round/>
-                      <a:headEnd len="sm" w="sm" type="none"/>
-                      <a:tailEnd len="sm" w="sm" type="none"/>
-                    </a:lnT>
-                    <a:lnB cap="flat" cmpd="sng" w="38100">
-                      <a:solidFill>
-                        <a:schemeClr val="lt1"/>
-                      </a:solidFill>
-                      <a:prstDash val="solid"/>
-                      <a:round/>
-                      <a:headEnd len="sm" w="sm" type="none"/>
-                      <a:tailEnd len="sm" w="sm" type="none"/>
-                    </a:lnB>
-                    <a:solidFill>
-                      <a:schemeClr val="lt2"/>
-                    </a:solidFill>
-                  </a:tcPr>
-                </a:tc>
-              </a:tr>
-              <a:tr h="316525">
-                <a:tc>
-                  <a:txBody>
-                    <a:bodyPr/>
-                    <a:lstStyle/>
-                    <a:p>
-                      <a:pPr indent="0" lvl="0" marL="0" rtl="0" algn="ctr">
-                        <a:spcBef>
-                          <a:spcPts val="0"/>
-                        </a:spcBef>
-                        <a:spcAft>
-                          <a:spcPts val="0"/>
-                        </a:spcAft>
-                        <a:buNone/>
-                      </a:pPr>
-                      <a:r>
-                        <a:rPr b="1" lang="en" sz="1200">
-                          <a:solidFill>
-                            <a:schemeClr val="lt1"/>
-                          </a:solidFill>
-                        </a:rPr>
-                        <a:t>3.</a:t>
-                      </a:r>
-                      <a:endParaRPr b="1" sz="1200">
-                        <a:solidFill>
-                          <a:schemeClr val="lt1"/>
-                        </a:solidFill>
-                      </a:endParaRPr>
-                    </a:p>
-                  </a:txBody>
-                  <a:tcPr marT="0" marB="0" marR="91425" marL="91425" anchor="ctr">
-                    <a:lnL cap="flat" cmpd="sng" w="38100">
-                      <a:solidFill>
-                        <a:schemeClr val="lt1"/>
-                      </a:solidFill>
-                      <a:prstDash val="solid"/>
-                      <a:round/>
-                      <a:headEnd len="sm" w="sm" type="none"/>
-                      <a:tailEnd len="sm" w="sm" type="none"/>
-                    </a:lnL>
-                    <a:lnR cap="flat" cmpd="sng" w="38100">
-                      <a:solidFill>
-                        <a:schemeClr val="lt1"/>
-                      </a:solidFill>
-                      <a:prstDash val="solid"/>
-                      <a:round/>
-                      <a:headEnd len="sm" w="sm" type="none"/>
-                      <a:tailEnd len="sm" w="sm" type="none"/>
-                    </a:lnR>
-                    <a:lnT cap="flat" cmpd="sng" w="38100">
-                      <a:solidFill>
-                        <a:schemeClr val="lt1"/>
-                      </a:solidFill>
-                      <a:prstDash val="solid"/>
-                      <a:round/>
-                      <a:headEnd len="sm" w="sm" type="none"/>
-                      <a:tailEnd len="sm" w="sm" type="none"/>
-                    </a:lnT>
-                    <a:lnB cap="flat" cmpd="sng" w="38100">
-                      <a:solidFill>
-                        <a:schemeClr val="lt1"/>
-                      </a:solidFill>
-                      <a:prstDash val="solid"/>
-                      <a:round/>
-                      <a:headEnd len="sm" w="sm" type="none"/>
-                      <a:tailEnd len="sm" w="sm" type="none"/>
-                    </a:lnB>
-                    <a:solidFill>
-                      <a:schemeClr val="accent4"/>
-                    </a:solidFill>
-                  </a:tcPr>
-                </a:tc>
-                <a:tc rowSpan="2">
-                  <a:txBody>
-                    <a:bodyPr/>
-                    <a:lstStyle/>
-                    <a:p>
-                      <a:pPr indent="0" lvl="0" marL="0" rtl="0" algn="l">
-                        <a:spcBef>
-                          <a:spcPts val="0"/>
-                        </a:spcBef>
-                        <a:spcAft>
-                          <a:spcPts val="0"/>
-                        </a:spcAft>
-                        <a:buNone/>
-                      </a:pPr>
-                      <a:r>
-                        <a:rPr b="1" lang="en" sz="1200">
-                          <a:solidFill>
-                            <a:schemeClr val="lt1"/>
-                          </a:solidFill>
-                        </a:rPr>
-                        <a:t>Research methods</a:t>
-                      </a:r>
-                      <a:endParaRPr b="1" sz="1200">
-                        <a:solidFill>
-                          <a:schemeClr val="lt1"/>
-                        </a:solidFill>
-                      </a:endParaRPr>
-                    </a:p>
-                  </a:txBody>
-                  <a:tcPr marT="0" marB="0" marR="91425" marL="91425" anchor="ctr">
-                    <a:lnL cap="flat" cmpd="sng" w="38100">
-                      <a:solidFill>
-                        <a:schemeClr val="lt1"/>
-                      </a:solidFill>
-                      <a:prstDash val="solid"/>
-                      <a:round/>
-                      <a:headEnd len="sm" w="sm" type="none"/>
-                      <a:tailEnd len="sm" w="sm" type="none"/>
-                    </a:lnL>
-                    <a:lnR cap="flat" cmpd="sng" w="38100">
-                      <a:solidFill>
-                        <a:schemeClr val="lt1"/>
-                      </a:solidFill>
-                      <a:prstDash val="solid"/>
-                      <a:round/>
-                      <a:headEnd len="sm" w="sm" type="none"/>
-                      <a:tailEnd len="sm" w="sm" type="none"/>
-                    </a:lnR>
-                    <a:lnT cap="flat" cmpd="sng" w="38100">
-                      <a:solidFill>
-                        <a:schemeClr val="lt1"/>
-                      </a:solidFill>
-                      <a:prstDash val="solid"/>
-                      <a:round/>
-                      <a:headEnd len="sm" w="sm" type="none"/>
-                      <a:tailEnd len="sm" w="sm" type="none"/>
-                    </a:lnT>
-                    <a:lnB cap="flat" cmpd="sng" w="38100">
-                      <a:solidFill>
-                        <a:schemeClr val="lt1"/>
-                      </a:solidFill>
-                      <a:prstDash val="solid"/>
-                      <a:round/>
-                      <a:headEnd len="sm" w="sm" type="none"/>
-                      <a:tailEnd len="sm" w="sm" type="none"/>
-                    </a:lnB>
-                    <a:solidFill>
-                      <a:schemeClr val="dk2"/>
-                    </a:solidFill>
-                  </a:tcPr>
-                </a:tc>
-                <a:tc>
-                  <a:txBody>
-                    <a:bodyPr/>
-                    <a:lstStyle/>
-                    <a:p>
-                      <a:pPr indent="0" lvl="0" marL="0" rtl="0" algn="l">
-                        <a:spcBef>
-                          <a:spcPts val="0"/>
-                        </a:spcBef>
-                        <a:spcAft>
-                          <a:spcPts val="0"/>
-                        </a:spcAft>
-                        <a:buNone/>
-                      </a:pPr>
-                      <a:r>
-                        <a:rPr lang="en" sz="1200">
-                          <a:solidFill>
-                            <a:schemeClr val="dk1"/>
-                          </a:solidFill>
-                        </a:rPr>
-                        <a:t>Qualitative data analysis</a:t>
-                      </a:r>
-                      <a:endParaRPr sz="1200">
-                        <a:solidFill>
-                          <a:schemeClr val="dk1"/>
-                        </a:solidFill>
-                      </a:endParaRPr>
-                    </a:p>
-                  </a:txBody>
-                  <a:tcPr marT="0" marB="0" marR="91425" marL="91425" anchor="ctr">
-                    <a:lnL cap="flat" cmpd="sng" w="38100">
-                      <a:solidFill>
-                        <a:schemeClr val="lt1"/>
-                      </a:solidFill>
-                      <a:prstDash val="solid"/>
-                      <a:round/>
-                      <a:headEnd len="sm" w="sm" type="none"/>
-                      <a:tailEnd len="sm" w="sm" type="none"/>
-                    </a:lnL>
-                    <a:lnR cap="flat" cmpd="sng" w="38100">
-                      <a:solidFill>
-                        <a:schemeClr val="lt1"/>
-                      </a:solidFill>
-                      <a:prstDash val="solid"/>
-                      <a:round/>
-                      <a:headEnd len="sm" w="sm" type="none"/>
-                      <a:tailEnd len="sm" w="sm" type="none"/>
-                    </a:lnR>
-                    <a:lnT cap="flat" cmpd="sng" w="38100">
-                      <a:solidFill>
-                        <a:schemeClr val="lt1"/>
-                      </a:solidFill>
-                      <a:prstDash val="solid"/>
-                      <a:round/>
-                      <a:headEnd len="sm" w="sm" type="none"/>
-                      <a:tailEnd len="sm" w="sm" type="none"/>
-                    </a:lnT>
-                    <a:lnB cap="flat" cmpd="sng" w="38100">
-                      <a:solidFill>
-                        <a:schemeClr val="lt1"/>
-                      </a:solidFill>
-                      <a:prstDash val="solid"/>
-                      <a:round/>
-                      <a:headEnd len="sm" w="sm" type="none"/>
-                      <a:tailEnd len="sm" w="sm" type="none"/>
-                    </a:lnB>
-                    <a:solidFill>
-                      <a:schemeClr val="lt1"/>
-                    </a:solidFill>
-                  </a:tcPr>
-                </a:tc>
-              </a:tr>
-              <a:tr h="316525">
-                <a:tc>
-                  <a:txBody>
-                    <a:bodyPr/>
-                    <a:lstStyle/>
-                    <a:p>
-                      <a:pPr indent="0" lvl="0" marL="0" rtl="0" algn="ctr">
-                        <a:spcBef>
-                          <a:spcPts val="0"/>
-                        </a:spcBef>
-                        <a:spcAft>
-                          <a:spcPts val="0"/>
-                        </a:spcAft>
-                        <a:buNone/>
-                      </a:pPr>
-                      <a:r>
-                        <a:rPr b="1" lang="en" sz="1200">
-                          <a:solidFill>
-                            <a:schemeClr val="lt1"/>
-                          </a:solidFill>
-                        </a:rPr>
-                        <a:t>4.</a:t>
-                      </a:r>
-                      <a:endParaRPr b="1" sz="1200">
-                        <a:solidFill>
-                          <a:schemeClr val="lt1"/>
-                        </a:solidFill>
-                      </a:endParaRPr>
-                    </a:p>
-                  </a:txBody>
-                  <a:tcPr marT="0" marB="0" marR="91425" marL="91425" anchor="ctr">
-                    <a:lnL cap="flat" cmpd="sng" w="38100">
-                      <a:solidFill>
-                        <a:schemeClr val="lt1"/>
-                      </a:solidFill>
-                      <a:prstDash val="solid"/>
-                      <a:round/>
-                      <a:headEnd len="sm" w="sm" type="none"/>
-                      <a:tailEnd len="sm" w="sm" type="none"/>
-                    </a:lnL>
-                    <a:lnR cap="flat" cmpd="sng" w="38100">
-                      <a:solidFill>
-                        <a:schemeClr val="lt1"/>
-                      </a:solidFill>
-                      <a:prstDash val="solid"/>
-                      <a:round/>
-                      <a:headEnd len="sm" w="sm" type="none"/>
-                      <a:tailEnd len="sm" w="sm" type="none"/>
-                    </a:lnR>
-                    <a:lnT cap="flat" cmpd="sng" w="38100">
-                      <a:solidFill>
-                        <a:schemeClr val="lt1"/>
-                      </a:solidFill>
-                      <a:prstDash val="solid"/>
-                      <a:round/>
-                      <a:headEnd len="sm" w="sm" type="none"/>
-                      <a:tailEnd len="sm" w="sm" type="none"/>
-                    </a:lnT>
-                    <a:lnB cap="flat" cmpd="sng" w="38100">
-                      <a:solidFill>
-                        <a:schemeClr val="lt1"/>
-                      </a:solidFill>
-                      <a:prstDash val="solid"/>
-                      <a:round/>
-                      <a:headEnd len="sm" w="sm" type="none"/>
-                      <a:tailEnd len="sm" w="sm" type="none"/>
-                    </a:lnB>
-                    <a:solidFill>
-                      <a:schemeClr val="accent4"/>
-                    </a:solidFill>
-                  </a:tcPr>
-                </a:tc>
-                <a:tc vMerge="1"/>
-                <a:tc>
-                  <a:txBody>
-                    <a:bodyPr/>
-                    <a:lstStyle/>
-                    <a:p>
-                      <a:pPr indent="0" lvl="0" marL="0" rtl="0" algn="l">
-                        <a:spcBef>
-                          <a:spcPts val="0"/>
-                        </a:spcBef>
-                        <a:spcAft>
-                          <a:spcPts val="0"/>
-                        </a:spcAft>
-                        <a:buNone/>
-                      </a:pPr>
-                      <a:r>
-                        <a:rPr lang="en" sz="1200">
-                          <a:solidFill>
-                            <a:schemeClr val="dk1"/>
-                          </a:solidFill>
-                        </a:rPr>
-                        <a:t>Literature reviews</a:t>
-                      </a:r>
-                      <a:endParaRPr sz="1200">
-                        <a:solidFill>
-                          <a:schemeClr val="dk1"/>
-                        </a:solidFill>
-                      </a:endParaRPr>
-                    </a:p>
-                  </a:txBody>
-                  <a:tcPr marT="0" marB="0" marR="91425" marL="91425" anchor="ctr">
-                    <a:lnL cap="flat" cmpd="sng" w="38100">
-                      <a:solidFill>
-                        <a:schemeClr val="lt1"/>
-                      </a:solidFill>
-                      <a:prstDash val="solid"/>
-                      <a:round/>
-                      <a:headEnd len="sm" w="sm" type="none"/>
-                      <a:tailEnd len="sm" w="sm" type="none"/>
-                    </a:lnL>
-                    <a:lnR cap="flat" cmpd="sng" w="38100">
-                      <a:solidFill>
-                        <a:schemeClr val="lt1"/>
-                      </a:solidFill>
-                      <a:prstDash val="solid"/>
-                      <a:round/>
-                      <a:headEnd len="sm" w="sm" type="none"/>
-                      <a:tailEnd len="sm" w="sm" type="none"/>
-                    </a:lnR>
-                    <a:lnT cap="flat" cmpd="sng" w="38100">
-                      <a:solidFill>
-                        <a:schemeClr val="lt1"/>
-                      </a:solidFill>
-                      <a:prstDash val="solid"/>
-                      <a:round/>
-                      <a:headEnd len="sm" w="sm" type="none"/>
-                      <a:tailEnd len="sm" w="sm" type="none"/>
-                    </a:lnT>
-                    <a:lnB cap="flat" cmpd="sng" w="38100">
-                      <a:solidFill>
-                        <a:schemeClr val="lt1"/>
-                      </a:solidFill>
-                      <a:prstDash val="solid"/>
-                      <a:round/>
-                      <a:headEnd len="sm" w="sm" type="none"/>
-                      <a:tailEnd len="sm" w="sm" type="none"/>
-                    </a:lnB>
-                    <a:solidFill>
-                      <a:schemeClr val="lt2"/>
-                    </a:solidFill>
-                  </a:tcPr>
-                </a:tc>
-              </a:tr>
-              <a:tr h="316525">
-                <a:tc>
-                  <a:txBody>
-                    <a:bodyPr/>
-                    <a:lstStyle/>
-                    <a:p>
-                      <a:pPr indent="0" lvl="0" marL="0" rtl="0" algn="ctr">
-                        <a:spcBef>
-                          <a:spcPts val="0"/>
-                        </a:spcBef>
-                        <a:spcAft>
-                          <a:spcPts val="0"/>
-                        </a:spcAft>
-                        <a:buNone/>
-                      </a:pPr>
-                      <a:r>
-                        <a:rPr b="1" lang="en" sz="1200">
-                          <a:solidFill>
-                            <a:schemeClr val="lt1"/>
-                          </a:solidFill>
-                        </a:rPr>
-                        <a:t>5.</a:t>
-                      </a:r>
-                      <a:endParaRPr b="1" sz="1200">
-                        <a:solidFill>
-                          <a:schemeClr val="lt1"/>
-                        </a:solidFill>
-                      </a:endParaRPr>
-                    </a:p>
-                  </a:txBody>
-                  <a:tcPr marT="0" marB="0" marR="91425" marL="91425" anchor="ctr">
-                    <a:lnL cap="flat" cmpd="sng" w="38100">
-                      <a:solidFill>
-                        <a:schemeClr val="lt1"/>
-                      </a:solidFill>
-                      <a:prstDash val="solid"/>
-                      <a:round/>
-                      <a:headEnd len="sm" w="sm" type="none"/>
-                      <a:tailEnd len="sm" w="sm" type="none"/>
-                    </a:lnL>
-                    <a:lnR cap="flat" cmpd="sng" w="38100">
-                      <a:solidFill>
-                        <a:schemeClr val="lt1"/>
-                      </a:solidFill>
-                      <a:prstDash val="solid"/>
-                      <a:round/>
-                      <a:headEnd len="sm" w="sm" type="none"/>
-                      <a:tailEnd len="sm" w="sm" type="none"/>
-                    </a:lnR>
-                    <a:lnT cap="flat" cmpd="sng" w="38100">
-                      <a:solidFill>
-                        <a:schemeClr val="lt1"/>
-                      </a:solidFill>
-                      <a:prstDash val="solid"/>
-                      <a:round/>
-                      <a:headEnd len="sm" w="sm" type="none"/>
-                      <a:tailEnd len="sm" w="sm" type="none"/>
-                    </a:lnT>
-                    <a:lnB cap="flat" cmpd="sng" w="38100">
-                      <a:solidFill>
-                        <a:schemeClr val="lt1"/>
-                      </a:solidFill>
-                      <a:prstDash val="solid"/>
-                      <a:round/>
-                      <a:headEnd len="sm" w="sm" type="none"/>
-                      <a:tailEnd len="sm" w="sm" type="none"/>
-                    </a:lnB>
-                    <a:solidFill>
-                      <a:schemeClr val="accent4"/>
-                    </a:solidFill>
-                  </a:tcPr>
-                </a:tc>
-                <a:tc>
-                  <a:txBody>
-                    <a:bodyPr/>
-                    <a:lstStyle/>
-                    <a:p>
-                      <a:pPr indent="0" lvl="0" marL="0" rtl="0" algn="l">
-                        <a:spcBef>
-                          <a:spcPts val="0"/>
-                        </a:spcBef>
-                        <a:spcAft>
-                          <a:spcPts val="0"/>
-                        </a:spcAft>
-                        <a:buNone/>
-                      </a:pPr>
-                      <a:r>
-                        <a:rPr b="1" lang="en" sz="1200">
-                          <a:solidFill>
-                            <a:schemeClr val="lt1"/>
-                          </a:solidFill>
-                        </a:rPr>
-                        <a:t>Science in general</a:t>
-                      </a:r>
-                      <a:endParaRPr sz="1200">
-                        <a:solidFill>
-                          <a:schemeClr val="lt1"/>
-                        </a:solidFill>
-                      </a:endParaRPr>
-                    </a:p>
-                  </a:txBody>
-                  <a:tcPr marT="0" marB="0" marR="91425" marL="91425" anchor="ctr">
-                    <a:lnL cap="flat" cmpd="sng" w="38100">
-                      <a:solidFill>
-                        <a:schemeClr val="lt1"/>
-                      </a:solidFill>
-                      <a:prstDash val="solid"/>
-                      <a:round/>
-                      <a:headEnd len="sm" w="sm" type="none"/>
-                      <a:tailEnd len="sm" w="sm" type="none"/>
-                    </a:lnL>
-                    <a:lnR cap="flat" cmpd="sng" w="38100">
-                      <a:solidFill>
-                        <a:schemeClr val="lt1"/>
-                      </a:solidFill>
-                      <a:prstDash val="solid"/>
-                      <a:round/>
-                      <a:headEnd len="sm" w="sm" type="none"/>
-                      <a:tailEnd len="sm" w="sm" type="none"/>
-                    </a:lnR>
-                    <a:lnT cap="flat" cmpd="sng" w="38100">
-                      <a:solidFill>
-                        <a:schemeClr val="lt1"/>
-                      </a:solidFill>
-                      <a:prstDash val="solid"/>
-                      <a:round/>
-                      <a:headEnd len="sm" w="sm" type="none"/>
-                      <a:tailEnd len="sm" w="sm" type="none"/>
-                    </a:lnT>
-                    <a:lnB cap="flat" cmpd="sng" w="38100">
-                      <a:solidFill>
-                        <a:schemeClr val="lt1"/>
-                      </a:solidFill>
-                      <a:prstDash val="solid"/>
-                      <a:round/>
-                      <a:headEnd len="sm" w="sm" type="none"/>
-                      <a:tailEnd len="sm" w="sm" type="none"/>
-                    </a:lnB>
-                    <a:solidFill>
-                      <a:schemeClr val="dk2"/>
-                    </a:solidFill>
-                  </a:tcPr>
-                </a:tc>
-                <a:tc>
-                  <a:txBody>
-                    <a:bodyPr/>
-                    <a:lstStyle/>
-                    <a:p>
-                      <a:pPr indent="0" lvl="0" marL="0" rtl="0" algn="l">
-                        <a:spcBef>
-                          <a:spcPts val="0"/>
-                        </a:spcBef>
-                        <a:spcAft>
-                          <a:spcPts val="0"/>
-                        </a:spcAft>
-                        <a:buNone/>
-                      </a:pPr>
-                      <a:r>
-                        <a:rPr lang="en" sz="1200">
-                          <a:solidFill>
-                            <a:schemeClr val="dk1"/>
-                          </a:solidFill>
-                        </a:rPr>
-                        <a:t>Theory building</a:t>
-                      </a:r>
-                      <a:endParaRPr sz="1200">
-                        <a:solidFill>
-                          <a:schemeClr val="dk1"/>
-                        </a:solidFill>
-                      </a:endParaRPr>
-                    </a:p>
-                  </a:txBody>
-                  <a:tcPr marT="0" marB="0" marR="91425" marL="91425" anchor="ctr">
-                    <a:lnL cap="flat" cmpd="sng" w="38100">
-                      <a:solidFill>
-                        <a:schemeClr val="lt1"/>
-                      </a:solidFill>
-                      <a:prstDash val="solid"/>
-                      <a:round/>
-                      <a:headEnd len="sm" w="sm" type="none"/>
-                      <a:tailEnd len="sm" w="sm" type="none"/>
-                    </a:lnL>
-                    <a:lnR cap="flat" cmpd="sng" w="38100">
-                      <a:solidFill>
-                        <a:schemeClr val="lt1"/>
-                      </a:solidFill>
-                      <a:prstDash val="solid"/>
-                      <a:round/>
-                      <a:headEnd len="sm" w="sm" type="none"/>
-                      <a:tailEnd len="sm" w="sm" type="none"/>
-                    </a:lnR>
-                    <a:lnT cap="flat" cmpd="sng" w="38100">
-                      <a:solidFill>
-                        <a:schemeClr val="lt1"/>
-                      </a:solidFill>
-                      <a:prstDash val="solid"/>
-                      <a:round/>
-                      <a:headEnd len="sm" w="sm" type="none"/>
-                      <a:tailEnd len="sm" w="sm" type="none"/>
-                    </a:lnT>
-                    <a:lnB cap="flat" cmpd="sng" w="38100">
-                      <a:solidFill>
-                        <a:schemeClr val="lt1"/>
-                      </a:solidFill>
-                      <a:prstDash val="solid"/>
-                      <a:round/>
-                      <a:headEnd len="sm" w="sm" type="none"/>
-                      <a:tailEnd len="sm" w="sm" type="none"/>
-                    </a:lnB>
-                    <a:solidFill>
-                      <a:schemeClr val="lt1"/>
-                    </a:solidFill>
-                  </a:tcPr>
-                </a:tc>
-              </a:tr>
-              <a:tr h="316525">
-                <a:tc>
-                  <a:txBody>
-                    <a:bodyPr/>
-                    <a:lstStyle/>
-                    <a:p>
-                      <a:pPr indent="0" lvl="0" marL="0" rtl="0" algn="ctr">
-                        <a:spcBef>
-                          <a:spcPts val="0"/>
-                        </a:spcBef>
-                        <a:spcAft>
-                          <a:spcPts val="0"/>
-                        </a:spcAft>
-                        <a:buNone/>
-                      </a:pPr>
-                      <a:r>
-                        <a:rPr b="1" lang="en" sz="1200">
-                          <a:solidFill>
-                            <a:schemeClr val="lt1"/>
-                          </a:solidFill>
-                        </a:rPr>
-                        <a:t>6.</a:t>
-                      </a:r>
-                      <a:endParaRPr b="1" sz="1200">
-                        <a:solidFill>
-                          <a:schemeClr val="lt1"/>
-                        </a:solidFill>
-                      </a:endParaRPr>
-                    </a:p>
-                  </a:txBody>
-                  <a:tcPr marT="0" marB="0" marR="91425" marL="91425" anchor="ctr">
-                    <a:lnL cap="flat" cmpd="sng" w="38100">
-                      <a:solidFill>
-                        <a:schemeClr val="lt1"/>
-                      </a:solidFill>
-                      <a:prstDash val="solid"/>
-                      <a:round/>
-                      <a:headEnd len="sm" w="sm" type="none"/>
-                      <a:tailEnd len="sm" w="sm" type="none"/>
-                    </a:lnL>
-                    <a:lnR cap="flat" cmpd="sng" w="38100">
-                      <a:solidFill>
-                        <a:schemeClr val="lt1"/>
-                      </a:solidFill>
-                      <a:prstDash val="solid"/>
-                      <a:round/>
-                      <a:headEnd len="sm" w="sm" type="none"/>
-                      <a:tailEnd len="sm" w="sm" type="none"/>
-                    </a:lnR>
-                    <a:lnT cap="flat" cmpd="sng" w="38100">
-                      <a:solidFill>
-                        <a:schemeClr val="lt1"/>
-                      </a:solidFill>
-                      <a:prstDash val="solid"/>
-                      <a:round/>
-                      <a:headEnd len="sm" w="sm" type="none"/>
-                      <a:tailEnd len="sm" w="sm" type="none"/>
-                    </a:lnT>
-                    <a:lnB cap="flat" cmpd="sng" w="38100">
-                      <a:solidFill>
-                        <a:schemeClr val="lt1"/>
-                      </a:solidFill>
-                      <a:prstDash val="solid"/>
-                      <a:round/>
-                      <a:headEnd len="sm" w="sm" type="none"/>
-                      <a:tailEnd len="sm" w="sm" type="none"/>
-                    </a:lnB>
-                    <a:solidFill>
-                      <a:schemeClr val="accent4"/>
-                    </a:solidFill>
-                  </a:tcPr>
-                </a:tc>
-                <a:tc rowSpan="3">
-                  <a:txBody>
-                    <a:bodyPr/>
-                    <a:lstStyle/>
-                    <a:p>
-                      <a:pPr indent="0" lvl="0" marL="0" rtl="0" algn="l">
-                        <a:spcBef>
-                          <a:spcPts val="0"/>
-                        </a:spcBef>
-                        <a:spcAft>
-                          <a:spcPts val="0"/>
-                        </a:spcAft>
-                        <a:buNone/>
-                      </a:pPr>
-                      <a:r>
-                        <a:rPr b="1" lang="en" sz="1200">
-                          <a:solidFill>
-                            <a:schemeClr val="lt1"/>
-                          </a:solidFill>
-                        </a:rPr>
-                        <a:t>Research methods</a:t>
-                      </a:r>
-                      <a:endParaRPr sz="1200">
-                        <a:solidFill>
-                          <a:schemeClr val="lt1"/>
-                        </a:solidFill>
-                      </a:endParaRPr>
-                    </a:p>
-                  </a:txBody>
-                  <a:tcPr marT="0" marB="0" marR="91425" marL="91425" anchor="ctr">
-                    <a:lnL cap="flat" cmpd="sng" w="38100">
-                      <a:solidFill>
-                        <a:schemeClr val="lt1"/>
-                      </a:solidFill>
-                      <a:prstDash val="solid"/>
-                      <a:round/>
-                      <a:headEnd len="sm" w="sm" type="none"/>
-                      <a:tailEnd len="sm" w="sm" type="none"/>
-                    </a:lnL>
-                    <a:lnR cap="flat" cmpd="sng" w="38100">
-                      <a:solidFill>
-                        <a:schemeClr val="lt1"/>
-                      </a:solidFill>
-                      <a:prstDash val="solid"/>
-                      <a:round/>
-                      <a:headEnd len="sm" w="sm" type="none"/>
-                      <a:tailEnd len="sm" w="sm" type="none"/>
-                    </a:lnR>
-                    <a:lnT cap="flat" cmpd="sng" w="38100">
-                      <a:solidFill>
-                        <a:schemeClr val="lt1"/>
-                      </a:solidFill>
-                      <a:prstDash val="solid"/>
-                      <a:round/>
-                      <a:headEnd len="sm" w="sm" type="none"/>
-                      <a:tailEnd len="sm" w="sm" type="none"/>
-                    </a:lnT>
-                    <a:lnB cap="flat" cmpd="sng" w="38100">
-                      <a:solidFill>
-                        <a:schemeClr val="lt1"/>
-                      </a:solidFill>
-                      <a:prstDash val="solid"/>
-                      <a:round/>
-                      <a:headEnd len="sm" w="sm" type="none"/>
-                      <a:tailEnd len="sm" w="sm" type="none"/>
-                    </a:lnB>
-                    <a:solidFill>
-                      <a:schemeClr val="dk2"/>
-                    </a:solidFill>
-                  </a:tcPr>
-                </a:tc>
-                <a:tc>
-                  <a:txBody>
-                    <a:bodyPr/>
-                    <a:lstStyle/>
-                    <a:p>
-                      <a:pPr indent="0" lvl="0" marL="0" rtl="0" algn="l">
-                        <a:spcBef>
-                          <a:spcPts val="0"/>
-                        </a:spcBef>
-                        <a:spcAft>
-                          <a:spcPts val="0"/>
-                        </a:spcAft>
-                        <a:buNone/>
-                      </a:pPr>
-                      <a:r>
-                        <a:rPr lang="en" sz="1200">
-                          <a:solidFill>
-                            <a:schemeClr val="dk1"/>
-                          </a:solidFill>
-                        </a:rPr>
-                        <a:t>Qualitative surveys</a:t>
-                      </a:r>
-                      <a:endParaRPr sz="1200">
-                        <a:solidFill>
-                          <a:schemeClr val="dk1"/>
-                        </a:solidFill>
-                      </a:endParaRPr>
-                    </a:p>
-                  </a:txBody>
-                  <a:tcPr marT="0" marB="0" marR="91425" marL="91425" anchor="ctr">
-                    <a:lnL cap="flat" cmpd="sng" w="38100">
-                      <a:solidFill>
-                        <a:schemeClr val="lt1"/>
-                      </a:solidFill>
-                      <a:prstDash val="solid"/>
-                      <a:round/>
-                      <a:headEnd len="sm" w="sm" type="none"/>
-                      <a:tailEnd len="sm" w="sm" type="none"/>
-                    </a:lnL>
-                    <a:lnR cap="flat" cmpd="sng" w="38100">
-                      <a:solidFill>
-                        <a:schemeClr val="lt1"/>
-                      </a:solidFill>
-                      <a:prstDash val="solid"/>
-                      <a:round/>
-                      <a:headEnd len="sm" w="sm" type="none"/>
-                      <a:tailEnd len="sm" w="sm" type="none"/>
-                    </a:lnR>
-                    <a:lnT cap="flat" cmpd="sng" w="38100">
-                      <a:solidFill>
-                        <a:schemeClr val="lt1"/>
-                      </a:solidFill>
-                      <a:prstDash val="solid"/>
-                      <a:round/>
-                      <a:headEnd len="sm" w="sm" type="none"/>
-                      <a:tailEnd len="sm" w="sm" type="none"/>
-                    </a:lnT>
-                    <a:lnB cap="flat" cmpd="sng" w="38100">
-                      <a:solidFill>
-                        <a:schemeClr val="lt1"/>
-                      </a:solidFill>
-                      <a:prstDash val="solid"/>
-                      <a:round/>
-                      <a:headEnd len="sm" w="sm" type="none"/>
-                      <a:tailEnd len="sm" w="sm" type="none"/>
-                    </a:lnB>
-                    <a:solidFill>
-                      <a:schemeClr val="lt2"/>
-                    </a:solidFill>
-                  </a:tcPr>
-                </a:tc>
-              </a:tr>
-              <a:tr h="316525">
-                <a:tc>
-                  <a:txBody>
-                    <a:bodyPr/>
-                    <a:lstStyle/>
-                    <a:p>
-                      <a:pPr indent="0" lvl="0" marL="0" rtl="0" algn="ctr">
-                        <a:spcBef>
-                          <a:spcPts val="0"/>
-                        </a:spcBef>
-                        <a:spcAft>
-                          <a:spcPts val="0"/>
-                        </a:spcAft>
-                        <a:buNone/>
-                      </a:pPr>
-                      <a:r>
-                        <a:rPr b="1" lang="en" sz="1200">
-                          <a:solidFill>
-                            <a:schemeClr val="lt1"/>
-                          </a:solidFill>
-                        </a:rPr>
-                        <a:t>7.</a:t>
-                      </a:r>
-                      <a:endParaRPr b="1" sz="1200">
-                        <a:solidFill>
-                          <a:schemeClr val="lt1"/>
-                        </a:solidFill>
-                      </a:endParaRPr>
-                    </a:p>
-                  </a:txBody>
-                  <a:tcPr marT="0" marB="0" marR="91425" marL="91425" anchor="ctr">
-                    <a:lnL cap="flat" cmpd="sng" w="38100">
-                      <a:solidFill>
-                        <a:schemeClr val="lt1"/>
-                      </a:solidFill>
-                      <a:prstDash val="solid"/>
-                      <a:round/>
-                      <a:headEnd len="sm" w="sm" type="none"/>
-                      <a:tailEnd len="sm" w="sm" type="none"/>
-                    </a:lnL>
-                    <a:lnR cap="flat" cmpd="sng" w="38100">
-                      <a:solidFill>
-                        <a:schemeClr val="lt1"/>
-                      </a:solidFill>
-                      <a:prstDash val="solid"/>
-                      <a:round/>
-                      <a:headEnd len="sm" w="sm" type="none"/>
-                      <a:tailEnd len="sm" w="sm" type="none"/>
-                    </a:lnR>
-                    <a:lnT cap="flat" cmpd="sng" w="38100">
-                      <a:solidFill>
-                        <a:schemeClr val="lt1"/>
-                      </a:solidFill>
-                      <a:prstDash val="solid"/>
-                      <a:round/>
-                      <a:headEnd len="sm" w="sm" type="none"/>
-                      <a:tailEnd len="sm" w="sm" type="none"/>
-                    </a:lnT>
-                    <a:lnB cap="flat" cmpd="sng" w="38100">
-                      <a:solidFill>
-                        <a:schemeClr val="lt1"/>
-                      </a:solidFill>
-                      <a:prstDash val="solid"/>
-                      <a:round/>
-                      <a:headEnd len="sm" w="sm" type="none"/>
-                      <a:tailEnd len="sm" w="sm" type="none"/>
-                    </a:lnB>
-                    <a:solidFill>
-                      <a:schemeClr val="accent4"/>
-                    </a:solidFill>
-                  </a:tcPr>
-                </a:tc>
-                <a:tc vMerge="1"/>
-                <a:tc>
-                  <a:txBody>
-                    <a:bodyPr/>
-                    <a:lstStyle/>
-                    <a:p>
-                      <a:pPr indent="0" lvl="0" marL="0" rtl="0" algn="l">
-                        <a:spcBef>
-                          <a:spcPts val="0"/>
-                        </a:spcBef>
-                        <a:spcAft>
-                          <a:spcPts val="0"/>
-                        </a:spcAft>
-                        <a:buNone/>
-                      </a:pPr>
-                      <a:r>
-                        <a:rPr lang="en" sz="1200">
-                          <a:solidFill>
-                            <a:schemeClr val="dk1"/>
-                          </a:solidFill>
-                        </a:rPr>
-                        <a:t>Action research</a:t>
-                      </a:r>
-                      <a:endParaRPr sz="1200">
-                        <a:solidFill>
-                          <a:schemeClr val="dk1"/>
-                        </a:solidFill>
-                      </a:endParaRPr>
-                    </a:p>
-                  </a:txBody>
-                  <a:tcPr marT="0" marB="0" marR="91425" marL="91425" anchor="ctr">
-                    <a:lnL cap="flat" cmpd="sng" w="38100">
-                      <a:solidFill>
-                        <a:schemeClr val="lt1"/>
-                      </a:solidFill>
-                      <a:prstDash val="solid"/>
-                      <a:round/>
-                      <a:headEnd len="sm" w="sm" type="none"/>
-                      <a:tailEnd len="sm" w="sm" type="none"/>
-                    </a:lnL>
-                    <a:lnR cap="flat" cmpd="sng" w="38100">
-                      <a:solidFill>
-                        <a:schemeClr val="lt1"/>
-                      </a:solidFill>
-                      <a:prstDash val="solid"/>
-                      <a:round/>
-                      <a:headEnd len="sm" w="sm" type="none"/>
-                      <a:tailEnd len="sm" w="sm" type="none"/>
-                    </a:lnR>
-                    <a:lnT cap="flat" cmpd="sng" w="38100">
-                      <a:solidFill>
-                        <a:schemeClr val="lt1"/>
-                      </a:solidFill>
-                      <a:prstDash val="solid"/>
-                      <a:round/>
-                      <a:headEnd len="sm" w="sm" type="none"/>
-                      <a:tailEnd len="sm" w="sm" type="none"/>
-                    </a:lnT>
-                    <a:lnB cap="flat" cmpd="sng" w="38100">
-                      <a:solidFill>
-                        <a:schemeClr val="lt1"/>
-                      </a:solidFill>
-                      <a:prstDash val="solid"/>
-                      <a:round/>
-                      <a:headEnd len="sm" w="sm" type="none"/>
-                      <a:tailEnd len="sm" w="sm" type="none"/>
-                    </a:lnB>
-                    <a:solidFill>
-                      <a:schemeClr val="lt1"/>
-                    </a:solidFill>
-                  </a:tcPr>
-                </a:tc>
-              </a:tr>
-              <a:tr h="316525">
-                <a:tc>
-                  <a:txBody>
-                    <a:bodyPr/>
-                    <a:lstStyle/>
-                    <a:p>
-                      <a:pPr indent="0" lvl="0" marL="0" rtl="0" algn="ctr">
-                        <a:spcBef>
-                          <a:spcPts val="0"/>
-                        </a:spcBef>
-                        <a:spcAft>
-                          <a:spcPts val="0"/>
-                        </a:spcAft>
-                        <a:buNone/>
-                      </a:pPr>
-                      <a:r>
-                        <a:rPr b="1" lang="en" sz="1200">
-                          <a:solidFill>
-                            <a:schemeClr val="lt1"/>
-                          </a:solidFill>
-                        </a:rPr>
-                        <a:t>8.</a:t>
-                      </a:r>
-                      <a:endParaRPr b="1" sz="1200">
-                        <a:solidFill>
-                          <a:schemeClr val="lt1"/>
-                        </a:solidFill>
-                      </a:endParaRPr>
-                    </a:p>
-                  </a:txBody>
-                  <a:tcPr marT="0" marB="0" marR="91425" marL="91425" anchor="ctr">
-                    <a:lnL cap="flat" cmpd="sng" w="38100">
-                      <a:solidFill>
-                        <a:schemeClr val="lt1"/>
-                      </a:solidFill>
-                      <a:prstDash val="solid"/>
-                      <a:round/>
-                      <a:headEnd len="sm" w="sm" type="none"/>
-                      <a:tailEnd len="sm" w="sm" type="none"/>
-                    </a:lnL>
-                    <a:lnR cap="flat" cmpd="sng" w="38100">
-                      <a:solidFill>
-                        <a:schemeClr val="lt1"/>
-                      </a:solidFill>
-                      <a:prstDash val="solid"/>
-                      <a:round/>
-                      <a:headEnd len="sm" w="sm" type="none"/>
-                      <a:tailEnd len="sm" w="sm" type="none"/>
-                    </a:lnR>
-                    <a:lnT cap="flat" cmpd="sng" w="38100">
-                      <a:solidFill>
-                        <a:schemeClr val="lt1"/>
-                      </a:solidFill>
-                      <a:prstDash val="solid"/>
-                      <a:round/>
-                      <a:headEnd len="sm" w="sm" type="none"/>
-                      <a:tailEnd len="sm" w="sm" type="none"/>
-                    </a:lnT>
-                    <a:lnB cap="flat" cmpd="sng" w="38100">
-                      <a:solidFill>
-                        <a:schemeClr val="lt1"/>
-                      </a:solidFill>
-                      <a:prstDash val="solid"/>
-                      <a:round/>
-                      <a:headEnd len="sm" w="sm" type="none"/>
-                      <a:tailEnd len="sm" w="sm" type="none"/>
-                    </a:lnB>
-                    <a:solidFill>
-                      <a:schemeClr val="accent4"/>
-                    </a:solidFill>
-                  </a:tcPr>
-                </a:tc>
-                <a:tc vMerge="1"/>
-                <a:tc>
-                  <a:txBody>
-                    <a:bodyPr/>
-                    <a:lstStyle/>
-                    <a:p>
-                      <a:pPr indent="0" lvl="0" marL="0" rtl="0" algn="l">
-                        <a:spcBef>
-                          <a:spcPts val="0"/>
-                        </a:spcBef>
-                        <a:spcAft>
-                          <a:spcPts val="0"/>
-                        </a:spcAft>
-                        <a:buNone/>
-                      </a:pPr>
-                      <a:r>
-                        <a:rPr lang="en" sz="1200">
-                          <a:solidFill>
-                            <a:schemeClr val="dk1"/>
-                          </a:solidFill>
-                        </a:rPr>
-                        <a:t>Case study research</a:t>
-                      </a:r>
-                      <a:endParaRPr sz="1200">
-                        <a:solidFill>
-                          <a:schemeClr val="dk1"/>
-                        </a:solidFill>
-                      </a:endParaRPr>
-                    </a:p>
-                  </a:txBody>
-                  <a:tcPr marT="0" marB="0" marR="91425" marL="91425" anchor="ctr">
-                    <a:lnL cap="flat" cmpd="sng" w="38100">
-                      <a:solidFill>
-                        <a:schemeClr val="lt1"/>
-                      </a:solidFill>
-                      <a:prstDash val="solid"/>
-                      <a:round/>
-                      <a:headEnd len="sm" w="sm" type="none"/>
-                      <a:tailEnd len="sm" w="sm" type="none"/>
-                    </a:lnL>
-                    <a:lnR cap="flat" cmpd="sng" w="38100">
-                      <a:solidFill>
-                        <a:schemeClr val="lt1"/>
-                      </a:solidFill>
-                      <a:prstDash val="solid"/>
-                      <a:round/>
-                      <a:headEnd len="sm" w="sm" type="none"/>
-                      <a:tailEnd len="sm" w="sm" type="none"/>
-                    </a:lnR>
-                    <a:lnT cap="flat" cmpd="sng" w="38100">
-                      <a:solidFill>
-                        <a:schemeClr val="lt1"/>
-                      </a:solidFill>
-                      <a:prstDash val="solid"/>
-                      <a:round/>
-                      <a:headEnd len="sm" w="sm" type="none"/>
-                      <a:tailEnd len="sm" w="sm" type="none"/>
-                    </a:lnT>
-                    <a:lnB cap="flat" cmpd="sng" w="38100">
-                      <a:solidFill>
-                        <a:schemeClr val="lt1"/>
-                      </a:solidFill>
-                      <a:prstDash val="solid"/>
-                      <a:round/>
-                      <a:headEnd len="sm" w="sm" type="none"/>
-                      <a:tailEnd len="sm" w="sm" type="none"/>
-                    </a:lnB>
-                    <a:solidFill>
-                      <a:schemeClr val="lt2"/>
-                    </a:solidFill>
-                  </a:tcPr>
-                </a:tc>
-              </a:tr>
-              <a:tr h="316525">
-                <a:tc>
-                  <a:txBody>
-                    <a:bodyPr/>
-                    <a:lstStyle/>
-                    <a:p>
-                      <a:pPr indent="0" lvl="0" marL="0" rtl="0" algn="ctr">
-                        <a:spcBef>
-                          <a:spcPts val="0"/>
-                        </a:spcBef>
-                        <a:spcAft>
-                          <a:spcPts val="0"/>
-                        </a:spcAft>
-                        <a:buNone/>
-                      </a:pPr>
-                      <a:r>
-                        <a:rPr b="1" lang="en" sz="1200">
-                          <a:solidFill>
-                            <a:schemeClr val="lt1"/>
-                          </a:solidFill>
-                        </a:rPr>
-                        <a:t>9.</a:t>
-                      </a:r>
-                      <a:endParaRPr b="1" sz="1200">
-                        <a:solidFill>
-                          <a:schemeClr val="lt1"/>
-                        </a:solidFill>
-                      </a:endParaRPr>
-                    </a:p>
-                  </a:txBody>
-                  <a:tcPr marT="0" marB="0" marR="91425" marL="91425" anchor="ctr">
-                    <a:lnL cap="flat" cmpd="sng" w="38100">
-                      <a:solidFill>
-                        <a:schemeClr val="lt1"/>
-                      </a:solidFill>
-                      <a:prstDash val="solid"/>
-                      <a:round/>
-                      <a:headEnd len="sm" w="sm" type="none"/>
-                      <a:tailEnd len="sm" w="sm" type="none"/>
-                    </a:lnL>
-                    <a:lnR cap="flat" cmpd="sng" w="38100">
-                      <a:solidFill>
-                        <a:schemeClr val="lt1"/>
-                      </a:solidFill>
-                      <a:prstDash val="solid"/>
-                      <a:round/>
-                      <a:headEnd len="sm" w="sm" type="none"/>
-                      <a:tailEnd len="sm" w="sm" type="none"/>
-                    </a:lnR>
-                    <a:lnT cap="flat" cmpd="sng" w="38100">
-                      <a:solidFill>
-                        <a:schemeClr val="lt1"/>
-                      </a:solidFill>
-                      <a:prstDash val="solid"/>
-                      <a:round/>
-                      <a:headEnd len="sm" w="sm" type="none"/>
-                      <a:tailEnd len="sm" w="sm" type="none"/>
-                    </a:lnT>
-                    <a:lnB cap="flat" cmpd="sng" w="38100">
-                      <a:solidFill>
-                        <a:schemeClr val="lt1"/>
-                      </a:solidFill>
-                      <a:prstDash val="solid"/>
-                      <a:round/>
-                      <a:headEnd len="sm" w="sm" type="none"/>
-                      <a:tailEnd len="sm" w="sm" type="none"/>
-                    </a:lnB>
-                    <a:solidFill>
-                      <a:schemeClr val="accent4"/>
-                    </a:solidFill>
-                  </a:tcPr>
-                </a:tc>
-                <a:tc>
-                  <a:txBody>
-                    <a:bodyPr/>
-                    <a:lstStyle/>
-                    <a:p>
-                      <a:pPr indent="0" lvl="0" marL="0" rtl="0" algn="l">
-                        <a:spcBef>
-                          <a:spcPts val="0"/>
-                        </a:spcBef>
-                        <a:spcAft>
-                          <a:spcPts val="0"/>
-                        </a:spcAft>
-                        <a:buNone/>
-                      </a:pPr>
-                      <a:r>
-                        <a:rPr b="1" lang="en" sz="1200">
-                          <a:solidFill>
-                            <a:schemeClr val="lt1"/>
-                          </a:solidFill>
-                        </a:rPr>
-                        <a:t>Science in general</a:t>
-                      </a:r>
-                      <a:endParaRPr sz="1200">
-                        <a:solidFill>
-                          <a:schemeClr val="lt1"/>
-                        </a:solidFill>
-                      </a:endParaRPr>
-                    </a:p>
-                  </a:txBody>
-                  <a:tcPr marT="0" marB="0" marR="91425" marL="91425" anchor="ctr">
-                    <a:lnL cap="flat" cmpd="sng" w="38100">
-                      <a:solidFill>
-                        <a:schemeClr val="lt1"/>
-                      </a:solidFill>
-                      <a:prstDash val="solid"/>
-                      <a:round/>
-                      <a:headEnd len="sm" w="sm" type="none"/>
-                      <a:tailEnd len="sm" w="sm" type="none"/>
-                    </a:lnL>
-                    <a:lnR cap="flat" cmpd="sng" w="38100">
-                      <a:solidFill>
-                        <a:schemeClr val="lt1"/>
-                      </a:solidFill>
-                      <a:prstDash val="solid"/>
-                      <a:round/>
-                      <a:headEnd len="sm" w="sm" type="none"/>
-                      <a:tailEnd len="sm" w="sm" type="none"/>
-                    </a:lnR>
-                    <a:lnT cap="flat" cmpd="sng" w="38100">
-                      <a:solidFill>
-                        <a:schemeClr val="lt1"/>
-                      </a:solidFill>
-                      <a:prstDash val="solid"/>
-                      <a:round/>
-                      <a:headEnd len="sm" w="sm" type="none"/>
-                      <a:tailEnd len="sm" w="sm" type="none"/>
-                    </a:lnT>
-                    <a:lnB cap="flat" cmpd="sng" w="38100">
-                      <a:solidFill>
-                        <a:schemeClr val="lt1"/>
-                      </a:solidFill>
-                      <a:prstDash val="solid"/>
-                      <a:round/>
-                      <a:headEnd len="sm" w="sm" type="none"/>
-                      <a:tailEnd len="sm" w="sm" type="none"/>
-                    </a:lnB>
-                    <a:solidFill>
-                      <a:schemeClr val="dk2"/>
-                    </a:solidFill>
-                  </a:tcPr>
-                </a:tc>
-                <a:tc>
-                  <a:txBody>
-                    <a:bodyPr/>
-                    <a:lstStyle/>
-                    <a:p>
-                      <a:pPr indent="0" lvl="0" marL="0" rtl="0" algn="l">
-                        <a:spcBef>
-                          <a:spcPts val="0"/>
-                        </a:spcBef>
-                        <a:spcAft>
-                          <a:spcPts val="0"/>
-                        </a:spcAft>
-                        <a:buNone/>
-                      </a:pPr>
-                      <a:r>
-                        <a:rPr lang="en" sz="1200">
-                          <a:solidFill>
-                            <a:schemeClr val="dk1"/>
-                          </a:solidFill>
-                        </a:rPr>
-                        <a:t>Theory validation</a:t>
-                      </a:r>
-                      <a:endParaRPr sz="1200">
-                        <a:solidFill>
-                          <a:schemeClr val="dk1"/>
-                        </a:solidFill>
-                      </a:endParaRPr>
-                    </a:p>
-                  </a:txBody>
-                  <a:tcPr marT="0" marB="0" marR="91425" marL="91425" anchor="ctr">
-                    <a:lnL cap="flat" cmpd="sng" w="38100">
-                      <a:solidFill>
-                        <a:schemeClr val="lt1"/>
-                      </a:solidFill>
-                      <a:prstDash val="solid"/>
-                      <a:round/>
-                      <a:headEnd len="sm" w="sm" type="none"/>
-                      <a:tailEnd len="sm" w="sm" type="none"/>
-                    </a:lnL>
-                    <a:lnR cap="flat" cmpd="sng" w="38100">
-                      <a:solidFill>
-                        <a:schemeClr val="lt1"/>
-                      </a:solidFill>
-                      <a:prstDash val="solid"/>
-                      <a:round/>
-                      <a:headEnd len="sm" w="sm" type="none"/>
-                      <a:tailEnd len="sm" w="sm" type="none"/>
-                    </a:lnR>
-                    <a:lnT cap="flat" cmpd="sng" w="38100">
-                      <a:solidFill>
-                        <a:schemeClr val="lt1"/>
-                      </a:solidFill>
-                      <a:prstDash val="solid"/>
-                      <a:round/>
-                      <a:headEnd len="sm" w="sm" type="none"/>
-                      <a:tailEnd len="sm" w="sm" type="none"/>
-                    </a:lnT>
-                    <a:lnB cap="flat" cmpd="sng" w="38100">
-                      <a:solidFill>
-                        <a:schemeClr val="lt1"/>
-                      </a:solidFill>
-                      <a:prstDash val="solid"/>
-                      <a:round/>
-                      <a:headEnd len="sm" w="sm" type="none"/>
-                      <a:tailEnd len="sm" w="sm" type="none"/>
-                    </a:lnB>
-                    <a:solidFill>
-                      <a:schemeClr val="lt1"/>
-                    </a:solidFill>
-                  </a:tcPr>
-                </a:tc>
-              </a:tr>
-              <a:tr h="316525">
-                <a:tc>
-                  <a:txBody>
-                    <a:bodyPr/>
-                    <a:lstStyle/>
-                    <a:p>
-                      <a:pPr indent="0" lvl="0" marL="0" rtl="0" algn="ctr">
-                        <a:spcBef>
-                          <a:spcPts val="0"/>
-                        </a:spcBef>
-                        <a:spcAft>
-                          <a:spcPts val="0"/>
-                        </a:spcAft>
-                        <a:buNone/>
-                      </a:pPr>
-                      <a:r>
-                        <a:rPr b="1" lang="en" sz="1200">
-                          <a:solidFill>
-                            <a:schemeClr val="lt1"/>
-                          </a:solidFill>
-                        </a:rPr>
-                        <a:t>10.</a:t>
-                      </a:r>
-                      <a:endParaRPr b="1" sz="1200">
-                        <a:solidFill>
-                          <a:schemeClr val="lt1"/>
-                        </a:solidFill>
-                      </a:endParaRPr>
-                    </a:p>
-                  </a:txBody>
-                  <a:tcPr marT="0" marB="0" marR="91425" marL="91425" anchor="ctr">
-                    <a:lnL cap="flat" cmpd="sng" w="38100">
-                      <a:solidFill>
-                        <a:schemeClr val="lt1"/>
-                      </a:solidFill>
-                      <a:prstDash val="solid"/>
-                      <a:round/>
-                      <a:headEnd len="sm" w="sm" type="none"/>
-                      <a:tailEnd len="sm" w="sm" type="none"/>
-                    </a:lnL>
-                    <a:lnR cap="flat" cmpd="sng" w="38100">
-                      <a:solidFill>
-                        <a:schemeClr val="lt1"/>
-                      </a:solidFill>
-                      <a:prstDash val="solid"/>
-                      <a:round/>
-                      <a:headEnd len="sm" w="sm" type="none"/>
-                      <a:tailEnd len="sm" w="sm" type="none"/>
-                    </a:lnR>
-                    <a:lnT cap="flat" cmpd="sng" w="38100">
-                      <a:solidFill>
-                        <a:schemeClr val="lt1"/>
-                      </a:solidFill>
-                      <a:prstDash val="solid"/>
-                      <a:round/>
-                      <a:headEnd len="sm" w="sm" type="none"/>
-                      <a:tailEnd len="sm" w="sm" type="none"/>
-                    </a:lnT>
-                    <a:lnB cap="flat" cmpd="sng" w="38100">
-                      <a:solidFill>
-                        <a:schemeClr val="lt1"/>
-                      </a:solidFill>
-                      <a:prstDash val="solid"/>
-                      <a:round/>
-                      <a:headEnd len="sm" w="sm" type="none"/>
-                      <a:tailEnd len="sm" w="sm" type="none"/>
-                    </a:lnB>
-                    <a:solidFill>
-                      <a:schemeClr val="accent4"/>
-                    </a:solidFill>
-                  </a:tcPr>
-                </a:tc>
-                <a:tc rowSpan="2">
-                  <a:txBody>
-                    <a:bodyPr/>
-                    <a:lstStyle/>
-                    <a:p>
-                      <a:pPr indent="0" lvl="0" marL="0" rtl="0" algn="l">
-                        <a:spcBef>
-                          <a:spcPts val="0"/>
-                        </a:spcBef>
-                        <a:spcAft>
-                          <a:spcPts val="0"/>
-                        </a:spcAft>
-                        <a:buNone/>
-                      </a:pPr>
-                      <a:r>
-                        <a:rPr b="1" lang="en" sz="1200">
-                          <a:solidFill>
-                            <a:schemeClr val="lt1"/>
-                          </a:solidFill>
-                        </a:rPr>
-                        <a:t>Research methods</a:t>
-                      </a:r>
-                      <a:endParaRPr sz="1200">
-                        <a:solidFill>
-                          <a:schemeClr val="lt1"/>
-                        </a:solidFill>
-                      </a:endParaRPr>
-                    </a:p>
-                  </a:txBody>
-                  <a:tcPr marT="0" marB="0" marR="91425" marL="91425" anchor="ctr">
-                    <a:lnL cap="flat" cmpd="sng" w="38100">
-                      <a:solidFill>
-                        <a:schemeClr val="lt1"/>
-                      </a:solidFill>
-                      <a:prstDash val="solid"/>
-                      <a:round/>
-                      <a:headEnd len="sm" w="sm" type="none"/>
-                      <a:tailEnd len="sm" w="sm" type="none"/>
-                    </a:lnL>
-                    <a:lnR cap="flat" cmpd="sng" w="38100">
-                      <a:solidFill>
-                        <a:schemeClr val="lt1"/>
-                      </a:solidFill>
-                      <a:prstDash val="solid"/>
-                      <a:round/>
-                      <a:headEnd len="sm" w="sm" type="none"/>
-                      <a:tailEnd len="sm" w="sm" type="none"/>
-                    </a:lnR>
-                    <a:lnT cap="flat" cmpd="sng" w="38100">
-                      <a:solidFill>
-                        <a:schemeClr val="lt1"/>
-                      </a:solidFill>
-                      <a:prstDash val="solid"/>
-                      <a:round/>
-                      <a:headEnd len="sm" w="sm" type="none"/>
-                      <a:tailEnd len="sm" w="sm" type="none"/>
-                    </a:lnT>
-                    <a:lnB cap="flat" cmpd="sng" w="38100">
-                      <a:solidFill>
-                        <a:schemeClr val="lt1"/>
-                      </a:solidFill>
-                      <a:prstDash val="solid"/>
-                      <a:round/>
-                      <a:headEnd len="sm" w="sm" type="none"/>
-                      <a:tailEnd len="sm" w="sm" type="none"/>
-                    </a:lnB>
-                    <a:solidFill>
-                      <a:schemeClr val="dk2"/>
-                    </a:solidFill>
-                  </a:tcPr>
-                </a:tc>
-                <a:tc>
-                  <a:txBody>
-                    <a:bodyPr/>
-                    <a:lstStyle/>
-                    <a:p>
-                      <a:pPr indent="0" lvl="0" marL="0" rtl="0" algn="l">
-                        <a:spcBef>
-                          <a:spcPts val="0"/>
-                        </a:spcBef>
-                        <a:spcAft>
-                          <a:spcPts val="0"/>
-                        </a:spcAft>
-                        <a:buNone/>
-                      </a:pPr>
-                      <a:r>
-                        <a:rPr lang="en" sz="1200">
-                          <a:solidFill>
-                            <a:schemeClr val="dk1"/>
-                          </a:solidFill>
-                        </a:rPr>
-                        <a:t>Survey research</a:t>
-                      </a:r>
-                      <a:endParaRPr sz="1200">
-                        <a:solidFill>
-                          <a:schemeClr val="dk1"/>
-                        </a:solidFill>
-                      </a:endParaRPr>
-                    </a:p>
-                  </a:txBody>
-                  <a:tcPr marT="0" marB="0" marR="91425" marL="91425" anchor="ctr">
-                    <a:lnL cap="flat" cmpd="sng" w="38100">
-                      <a:solidFill>
-                        <a:schemeClr val="lt1"/>
-                      </a:solidFill>
-                      <a:prstDash val="solid"/>
-                      <a:round/>
-                      <a:headEnd len="sm" w="sm" type="none"/>
-                      <a:tailEnd len="sm" w="sm" type="none"/>
-                    </a:lnL>
-                    <a:lnR cap="flat" cmpd="sng" w="38100">
-                      <a:solidFill>
-                        <a:schemeClr val="lt1"/>
-                      </a:solidFill>
-                      <a:prstDash val="solid"/>
-                      <a:round/>
-                      <a:headEnd len="sm" w="sm" type="none"/>
-                      <a:tailEnd len="sm" w="sm" type="none"/>
-                    </a:lnR>
-                    <a:lnT cap="flat" cmpd="sng" w="38100">
-                      <a:solidFill>
-                        <a:schemeClr val="lt1"/>
-                      </a:solidFill>
-                      <a:prstDash val="solid"/>
-                      <a:round/>
-                      <a:headEnd len="sm" w="sm" type="none"/>
-                      <a:tailEnd len="sm" w="sm" type="none"/>
-                    </a:lnT>
-                    <a:lnB cap="flat" cmpd="sng" w="38100">
-                      <a:solidFill>
-                        <a:schemeClr val="lt1"/>
-                      </a:solidFill>
-                      <a:prstDash val="solid"/>
-                      <a:round/>
-                      <a:headEnd len="sm" w="sm" type="none"/>
-                      <a:tailEnd len="sm" w="sm" type="none"/>
-                    </a:lnB>
-                    <a:solidFill>
-                      <a:schemeClr val="lt2"/>
-                    </a:solidFill>
-                  </a:tcPr>
-                </a:tc>
-              </a:tr>
-              <a:tr h="316525">
-                <a:tc>
-                  <a:txBody>
-                    <a:bodyPr/>
-                    <a:lstStyle/>
-                    <a:p>
-                      <a:pPr indent="0" lvl="0" marL="0" rtl="0" algn="ctr">
-                        <a:spcBef>
-                          <a:spcPts val="0"/>
-                        </a:spcBef>
-                        <a:spcAft>
-                          <a:spcPts val="0"/>
-                        </a:spcAft>
-                        <a:buNone/>
-                      </a:pPr>
-                      <a:r>
-                        <a:rPr b="1" lang="en" sz="1200">
-                          <a:solidFill>
-                            <a:schemeClr val="lt1"/>
-                          </a:solidFill>
-                        </a:rPr>
-                        <a:t>11.</a:t>
-                      </a:r>
-                      <a:endParaRPr b="1" sz="1200">
-                        <a:solidFill>
-                          <a:schemeClr val="lt1"/>
-                        </a:solidFill>
-                      </a:endParaRPr>
-                    </a:p>
-                  </a:txBody>
-                  <a:tcPr marT="0" marB="0" marR="91425" marL="91425" anchor="ctr">
-                    <a:lnL cap="flat" cmpd="sng" w="38100">
-                      <a:solidFill>
-                        <a:schemeClr val="lt1"/>
-                      </a:solidFill>
-                      <a:prstDash val="solid"/>
-                      <a:round/>
-                      <a:headEnd len="sm" w="sm" type="none"/>
-                      <a:tailEnd len="sm" w="sm" type="none"/>
-                    </a:lnL>
-                    <a:lnR cap="flat" cmpd="sng" w="38100">
-                      <a:solidFill>
-                        <a:schemeClr val="lt1"/>
-                      </a:solidFill>
-                      <a:prstDash val="solid"/>
-                      <a:round/>
-                      <a:headEnd len="sm" w="sm" type="none"/>
-                      <a:tailEnd len="sm" w="sm" type="none"/>
-                    </a:lnR>
-                    <a:lnT cap="flat" cmpd="sng" w="38100">
-                      <a:solidFill>
-                        <a:schemeClr val="lt1"/>
-                      </a:solidFill>
-                      <a:prstDash val="solid"/>
-                      <a:round/>
-                      <a:headEnd len="sm" w="sm" type="none"/>
-                      <a:tailEnd len="sm" w="sm" type="none"/>
-                    </a:lnT>
-                    <a:lnB cap="flat" cmpd="sng" w="38100">
-                      <a:solidFill>
-                        <a:schemeClr val="lt1"/>
-                      </a:solidFill>
-                      <a:prstDash val="solid"/>
-                      <a:round/>
-                      <a:headEnd len="sm" w="sm" type="none"/>
-                      <a:tailEnd len="sm" w="sm" type="none"/>
-                    </a:lnB>
-                    <a:solidFill>
-                      <a:schemeClr val="accent4"/>
-                    </a:solidFill>
-                  </a:tcPr>
-                </a:tc>
-                <a:tc vMerge="1"/>
-                <a:tc>
-                  <a:txBody>
-                    <a:bodyPr/>
-                    <a:lstStyle/>
-                    <a:p>
-                      <a:pPr indent="0" lvl="0" marL="0" rtl="0" algn="l">
-                        <a:spcBef>
-                          <a:spcPts val="0"/>
-                        </a:spcBef>
-                        <a:spcAft>
-                          <a:spcPts val="0"/>
-                        </a:spcAft>
-                        <a:buNone/>
-                      </a:pPr>
-                      <a:r>
-                        <a:rPr lang="en" sz="1200">
-                          <a:solidFill>
-                            <a:schemeClr val="dk1"/>
-                          </a:solidFill>
-                        </a:rPr>
-                        <a:t>Controlled experiments</a:t>
-                      </a:r>
-                      <a:endParaRPr sz="1200">
-                        <a:solidFill>
-                          <a:schemeClr val="dk1"/>
-                        </a:solidFill>
-                      </a:endParaRPr>
-                    </a:p>
-                  </a:txBody>
-                  <a:tcPr marT="0" marB="0" marR="91425" marL="91425" anchor="ctr">
-                    <a:lnL cap="flat" cmpd="sng" w="38100">
-                      <a:solidFill>
-                        <a:schemeClr val="lt1"/>
-                      </a:solidFill>
-                      <a:prstDash val="solid"/>
-                      <a:round/>
-                      <a:headEnd len="sm" w="sm" type="none"/>
-                      <a:tailEnd len="sm" w="sm" type="none"/>
-                    </a:lnL>
-                    <a:lnR cap="flat" cmpd="sng" w="38100">
-                      <a:solidFill>
-                        <a:schemeClr val="lt1"/>
-                      </a:solidFill>
-                      <a:prstDash val="solid"/>
-                      <a:round/>
-                      <a:headEnd len="sm" w="sm" type="none"/>
-                      <a:tailEnd len="sm" w="sm" type="none"/>
-                    </a:lnR>
-                    <a:lnT cap="flat" cmpd="sng" w="38100">
-                      <a:solidFill>
-                        <a:schemeClr val="lt1"/>
-                      </a:solidFill>
-                      <a:prstDash val="solid"/>
-                      <a:round/>
-                      <a:headEnd len="sm" w="sm" type="none"/>
-                      <a:tailEnd len="sm" w="sm" type="none"/>
-                    </a:lnT>
-                    <a:lnB cap="flat" cmpd="sng" w="38100">
-                      <a:solidFill>
-                        <a:schemeClr val="lt1"/>
-                      </a:solidFill>
-                      <a:prstDash val="solid"/>
-                      <a:round/>
-                      <a:headEnd len="sm" w="sm" type="none"/>
-                      <a:tailEnd len="sm" w="sm" type="none"/>
-                    </a:lnB>
-                    <a:solidFill>
-                      <a:schemeClr val="lt1"/>
-                    </a:solidFill>
-                  </a:tcPr>
-                </a:tc>
-              </a:tr>
-              <a:tr h="316525">
-                <a:tc>
-                  <a:txBody>
-                    <a:bodyPr/>
-                    <a:lstStyle/>
-                    <a:p>
-                      <a:pPr indent="0" lvl="0" marL="0" rtl="0" algn="ctr">
-                        <a:spcBef>
-                          <a:spcPts val="0"/>
-                        </a:spcBef>
-                        <a:spcAft>
-                          <a:spcPts val="0"/>
-                        </a:spcAft>
-                        <a:buNone/>
-                      </a:pPr>
-                      <a:r>
-                        <a:rPr b="1" lang="en" sz="1200">
-                          <a:solidFill>
-                            <a:schemeClr val="lt1"/>
-                          </a:solidFill>
-                        </a:rPr>
-                        <a:t>12.</a:t>
-                      </a:r>
-                      <a:endParaRPr b="1" sz="1200">
-                        <a:solidFill>
-                          <a:schemeClr val="lt1"/>
-                        </a:solidFill>
-                      </a:endParaRPr>
-                    </a:p>
-                  </a:txBody>
-                  <a:tcPr marT="0" marB="0" marR="91425" marL="91425" anchor="ctr">
-                    <a:lnL cap="flat" cmpd="sng" w="38100">
-                      <a:solidFill>
-                        <a:schemeClr val="lt1"/>
-                      </a:solidFill>
-                      <a:prstDash val="solid"/>
-                      <a:round/>
-                      <a:headEnd len="sm" w="sm" type="none"/>
-                      <a:tailEnd len="sm" w="sm" type="none"/>
-                    </a:lnL>
-                    <a:lnR cap="flat" cmpd="sng" w="38100">
-                      <a:solidFill>
-                        <a:schemeClr val="lt1"/>
-                      </a:solidFill>
-                      <a:prstDash val="solid"/>
-                      <a:round/>
-                      <a:headEnd len="sm" w="sm" type="none"/>
-                      <a:tailEnd len="sm" w="sm" type="none"/>
-                    </a:lnR>
-                    <a:lnT cap="flat" cmpd="sng" w="38100">
-                      <a:solidFill>
-                        <a:schemeClr val="lt1"/>
-                      </a:solidFill>
-                      <a:prstDash val="solid"/>
-                      <a:round/>
-                      <a:headEnd len="sm" w="sm" type="none"/>
-                      <a:tailEnd len="sm" w="sm" type="none"/>
-                    </a:lnT>
-                    <a:lnB cap="flat" cmpd="sng" w="38100">
-                      <a:solidFill>
-                        <a:schemeClr val="lt1"/>
-                      </a:solidFill>
-                      <a:prstDash val="solid"/>
-                      <a:round/>
-                      <a:headEnd len="sm" w="sm" type="none"/>
-                      <a:tailEnd len="sm" w="sm" type="none"/>
-                    </a:lnB>
-                    <a:solidFill>
-                      <a:schemeClr val="accent4"/>
-                    </a:solidFill>
-                  </a:tcPr>
-                </a:tc>
-                <a:tc rowSpan="2">
-                  <a:txBody>
-                    <a:bodyPr/>
-                    <a:lstStyle/>
-                    <a:p>
-                      <a:pPr indent="0" lvl="0" marL="0" rtl="0" algn="l">
-                        <a:spcBef>
-                          <a:spcPts val="0"/>
-                        </a:spcBef>
-                        <a:spcAft>
-                          <a:spcPts val="0"/>
-                        </a:spcAft>
-                        <a:buNone/>
-                      </a:pPr>
-                      <a:r>
-                        <a:rPr b="1" lang="en" sz="1200">
-                          <a:solidFill>
-                            <a:schemeClr val="lt1"/>
-                          </a:solidFill>
-                        </a:rPr>
-                        <a:t>Academic writing</a:t>
-                      </a:r>
-                      <a:endParaRPr b="1" sz="1200">
-                        <a:solidFill>
-                          <a:schemeClr val="lt1"/>
-                        </a:solidFill>
-                      </a:endParaRPr>
-                    </a:p>
-                  </a:txBody>
-                  <a:tcPr marT="0" marB="0" marR="91425" marL="91425" anchor="ctr">
-                    <a:lnL cap="flat" cmpd="sng" w="38100">
-                      <a:solidFill>
-                        <a:schemeClr val="lt1"/>
-                      </a:solidFill>
-                      <a:prstDash val="solid"/>
-                      <a:round/>
-                      <a:headEnd len="sm" w="sm" type="none"/>
-                      <a:tailEnd len="sm" w="sm" type="none"/>
-                    </a:lnL>
-                    <a:lnR cap="flat" cmpd="sng" w="38100">
-                      <a:solidFill>
-                        <a:schemeClr val="lt1"/>
-                      </a:solidFill>
-                      <a:prstDash val="solid"/>
-                      <a:round/>
-                      <a:headEnd len="sm" w="sm" type="none"/>
-                      <a:tailEnd len="sm" w="sm" type="none"/>
-                    </a:lnR>
-                    <a:lnT cap="flat" cmpd="sng" w="38100">
-                      <a:solidFill>
-                        <a:schemeClr val="lt1"/>
-                      </a:solidFill>
-                      <a:prstDash val="solid"/>
-                      <a:round/>
-                      <a:headEnd len="sm" w="sm" type="none"/>
-                      <a:tailEnd len="sm" w="sm" type="none"/>
-                    </a:lnT>
-                    <a:lnB cap="flat" cmpd="sng" w="38100">
-                      <a:solidFill>
-                        <a:schemeClr val="lt1"/>
-                      </a:solidFill>
-                      <a:prstDash val="solid"/>
-                      <a:round/>
-                      <a:headEnd len="sm" w="sm" type="none"/>
-                      <a:tailEnd len="sm" w="sm" type="none"/>
-                    </a:lnB>
-                    <a:solidFill>
-                      <a:schemeClr val="dk2"/>
-                    </a:solidFill>
-                  </a:tcPr>
-                </a:tc>
-                <a:tc>
-                  <a:txBody>
-                    <a:bodyPr/>
-                    <a:lstStyle/>
-                    <a:p>
-                      <a:pPr indent="0" lvl="0" marL="0" rtl="0" algn="l">
-                        <a:spcBef>
-                          <a:spcPts val="0"/>
-                        </a:spcBef>
-                        <a:spcAft>
-                          <a:spcPts val="0"/>
-                        </a:spcAft>
-                        <a:buNone/>
-                      </a:pPr>
-                      <a:r>
-                        <a:rPr lang="en" sz="1200">
-                          <a:solidFill>
-                            <a:schemeClr val="dk1"/>
-                          </a:solidFill>
-                        </a:rPr>
-                        <a:t>Good academic writing</a:t>
-                      </a:r>
-                      <a:endParaRPr sz="1200">
-                        <a:solidFill>
-                          <a:schemeClr val="dk1"/>
-                        </a:solidFill>
-                      </a:endParaRPr>
-                    </a:p>
-                  </a:txBody>
-                  <a:tcPr marT="0" marB="0" marR="91425" marL="91425" anchor="ctr">
-                    <a:lnL cap="flat" cmpd="sng" w="38100">
-                      <a:solidFill>
-                        <a:schemeClr val="lt1"/>
-                      </a:solidFill>
-                      <a:prstDash val="solid"/>
-                      <a:round/>
-                      <a:headEnd len="sm" w="sm" type="none"/>
-                      <a:tailEnd len="sm" w="sm" type="none"/>
-                    </a:lnL>
-                    <a:lnR cap="flat" cmpd="sng" w="38100">
-                      <a:solidFill>
-                        <a:schemeClr val="lt1"/>
-                      </a:solidFill>
-                      <a:prstDash val="solid"/>
-                      <a:round/>
-                      <a:headEnd len="sm" w="sm" type="none"/>
-                      <a:tailEnd len="sm" w="sm" type="none"/>
-                    </a:lnR>
-                    <a:lnT cap="flat" cmpd="sng" w="38100">
-                      <a:solidFill>
-                        <a:schemeClr val="lt1"/>
-                      </a:solidFill>
-                      <a:prstDash val="solid"/>
-                      <a:round/>
-                      <a:headEnd len="sm" w="sm" type="none"/>
-                      <a:tailEnd len="sm" w="sm" type="none"/>
-                    </a:lnT>
-                    <a:lnB cap="flat" cmpd="sng" w="38100">
-                      <a:solidFill>
-                        <a:schemeClr val="lt1"/>
-                      </a:solidFill>
-                      <a:prstDash val="solid"/>
-                      <a:round/>
-                      <a:headEnd len="sm" w="sm" type="none"/>
-                      <a:tailEnd len="sm" w="sm" type="none"/>
-                    </a:lnB>
-                    <a:solidFill>
-                      <a:schemeClr val="lt2"/>
-                    </a:solidFill>
-                  </a:tcPr>
-                </a:tc>
-              </a:tr>
-              <a:tr h="316525">
-                <a:tc>
-                  <a:txBody>
-                    <a:bodyPr/>
-                    <a:lstStyle/>
-                    <a:p>
-                      <a:pPr indent="0" lvl="0" marL="0" rtl="0" algn="ctr">
-                        <a:spcBef>
-                          <a:spcPts val="0"/>
-                        </a:spcBef>
-                        <a:spcAft>
-                          <a:spcPts val="0"/>
-                        </a:spcAft>
-                        <a:buNone/>
-                      </a:pPr>
-                      <a:r>
-                        <a:rPr b="1" lang="en" sz="1200">
-                          <a:solidFill>
-                            <a:schemeClr val="lt1"/>
-                          </a:solidFill>
-                        </a:rPr>
-                        <a:t>13.</a:t>
-                      </a:r>
-                      <a:endParaRPr b="1" sz="1200">
-                        <a:solidFill>
-                          <a:schemeClr val="lt1"/>
-                        </a:solidFill>
-                      </a:endParaRPr>
-                    </a:p>
-                  </a:txBody>
-                  <a:tcPr marT="0" marB="0" marR="91425" marL="91425" anchor="ctr">
-                    <a:lnL cap="flat" cmpd="sng" w="38100">
-                      <a:solidFill>
-                        <a:schemeClr val="lt1"/>
-                      </a:solidFill>
-                      <a:prstDash val="solid"/>
-                      <a:round/>
-                      <a:headEnd len="sm" w="sm" type="none"/>
-                      <a:tailEnd len="sm" w="sm" type="none"/>
-                    </a:lnL>
-                    <a:lnR cap="flat" cmpd="sng" w="38100">
-                      <a:solidFill>
-                        <a:schemeClr val="lt1"/>
-                      </a:solidFill>
-                      <a:prstDash val="solid"/>
-                      <a:round/>
-                      <a:headEnd len="sm" w="sm" type="none"/>
-                      <a:tailEnd len="sm" w="sm" type="none"/>
-                    </a:lnR>
-                    <a:lnT cap="flat" cmpd="sng" w="38100">
-                      <a:solidFill>
-                        <a:schemeClr val="lt1"/>
-                      </a:solidFill>
-                      <a:prstDash val="solid"/>
-                      <a:round/>
-                      <a:headEnd len="sm" w="sm" type="none"/>
-                      <a:tailEnd len="sm" w="sm" type="none"/>
-                    </a:lnT>
-                    <a:lnB cap="flat" cmpd="sng" w="38100">
-                      <a:solidFill>
-                        <a:schemeClr val="lt1"/>
-                      </a:solidFill>
-                      <a:prstDash val="solid"/>
-                      <a:round/>
-                      <a:headEnd len="sm" w="sm" type="none"/>
-                      <a:tailEnd len="sm" w="sm" type="none"/>
-                    </a:lnB>
-                    <a:solidFill>
-                      <a:schemeClr val="accent4"/>
-                    </a:solidFill>
-                  </a:tcPr>
-                </a:tc>
-                <a:tc vMerge="1"/>
-                <a:tc>
-                  <a:txBody>
-                    <a:bodyPr/>
-                    <a:lstStyle/>
-                    <a:p>
-                      <a:pPr indent="0" lvl="0" marL="0" rtl="0" algn="l">
-                        <a:spcBef>
-                          <a:spcPts val="0"/>
-                        </a:spcBef>
-                        <a:spcAft>
-                          <a:spcPts val="0"/>
-                        </a:spcAft>
-                        <a:buNone/>
-                      </a:pPr>
-                      <a:r>
-                        <a:rPr lang="en" sz="1200">
-                          <a:solidFill>
-                            <a:schemeClr val="dk1"/>
-                          </a:solidFill>
-                        </a:rPr>
-                        <a:t>Academic publishing</a:t>
-                      </a:r>
-                      <a:endParaRPr sz="1200">
-                        <a:solidFill>
-                          <a:schemeClr val="dk1"/>
-                        </a:solidFill>
-                      </a:endParaRPr>
-                    </a:p>
-                  </a:txBody>
-                  <a:tcPr marT="0" marB="0" marR="91425" marL="91425" anchor="ctr">
-                    <a:lnL cap="flat" cmpd="sng" w="38100">
-                      <a:solidFill>
-                        <a:schemeClr val="lt1"/>
-                      </a:solidFill>
-                      <a:prstDash val="solid"/>
-                      <a:round/>
-                      <a:headEnd len="sm" w="sm" type="none"/>
-                      <a:tailEnd len="sm" w="sm" type="none"/>
-                    </a:lnL>
-                    <a:lnR cap="flat" cmpd="sng" w="38100">
-                      <a:solidFill>
-                        <a:schemeClr val="lt1"/>
-                      </a:solidFill>
-                      <a:prstDash val="solid"/>
-                      <a:round/>
-                      <a:headEnd len="sm" w="sm" type="none"/>
-                      <a:tailEnd len="sm" w="sm" type="none"/>
-                    </a:lnR>
-                    <a:lnT cap="flat" cmpd="sng" w="38100">
-                      <a:solidFill>
-                        <a:schemeClr val="lt1"/>
-                      </a:solidFill>
-                      <a:prstDash val="solid"/>
-                      <a:round/>
-                      <a:headEnd len="sm" w="sm" type="none"/>
-                      <a:tailEnd len="sm" w="sm" type="none"/>
-                    </a:lnT>
-                    <a:lnB cap="flat" cmpd="sng" w="38100">
-                      <a:solidFill>
-                        <a:schemeClr val="lt1">
-                          <a:alpha val="0"/>
-                        </a:schemeClr>
-                      </a:solidFill>
-                      <a:prstDash val="solid"/>
-                      <a:round/>
-                      <a:headEnd len="sm" w="sm" type="none"/>
-                      <a:tailEnd len="sm" w="sm" type="none"/>
-                    </a:lnB>
-                  </a:tcPr>
-                </a:tc>
-              </a:tr>
-            </a:tbl>
-          </a:graphicData>
-        </a:graphic>
-      </p:graphicFrame>
+        </p:nvPicPr>
+        <p:blipFill>
+          <a:blip r:embed="rId4">
+            <a:alphaModFix/>
+          </a:blip>
+          <a:stretch>
+            <a:fillRect/>
+          </a:stretch>
+        </p:blipFill>
+        <p:spPr>
+          <a:xfrm>
+            <a:off x="274320" y="914400"/>
+            <a:ext cx="8595360" cy="3502840"/>
+          </a:xfrm>
+          <a:prstGeom prst="rect">
+            <a:avLst/>
+          </a:prstGeom>
+          <a:noFill/>
+          <a:ln>
+            <a:noFill/>
+          </a:ln>
+        </p:spPr>
+      </p:pic>
     </p:spTree>
   </p:cSld>
   <p:clrMapOvr>
@@ -15124,7 +12471,7 @@
             <a:tbl>
               <a:tblPr>
                 <a:noFill/>
-                <a:tableStyleId>{14B4BF16-B9DC-46FC-A811-A1A9D4ED67F8}</a:tableStyleId>
+                <a:tableStyleId>{289D13A9-D2F7-4F60-86CA-BBA6726F6D71}</a:tableStyleId>
               </a:tblPr>
               <a:tblGrid>
                 <a:gridCol w="1719075"/>
@@ -15265,7 +12612,7 @@
                       <a:tailEnd len="sm" w="sm" type="none"/>
                     </a:lnB>
                     <a:solidFill>
-                      <a:schemeClr val="accent4"/>
+                      <a:schemeClr val="dk2"/>
                     </a:solidFill>
                   </a:tcPr>
                 </a:tc>
@@ -15342,7 +12689,7 @@
                       <a:tailEnd len="sm" w="sm" type="none"/>
                     </a:lnB>
                     <a:solidFill>
-                      <a:schemeClr val="dk2"/>
+                      <a:schemeClr val="lt2"/>
                     </a:solidFill>
                   </a:tcPr>
                 </a:tc>
@@ -15413,7 +12760,7 @@
                       <a:tailEnd len="sm" w="sm" type="none"/>
                     </a:lnB>
                     <a:solidFill>
-                      <a:schemeClr val="dk2"/>
+                      <a:schemeClr val="lt2"/>
                     </a:solidFill>
                   </a:tcPr>
                 </a:tc>
@@ -15484,7 +12831,7 @@
                       <a:tailEnd len="sm" w="sm" type="none"/>
                     </a:lnB>
                     <a:solidFill>
-                      <a:schemeClr val="dk2"/>
+                      <a:schemeClr val="lt2"/>
                     </a:solidFill>
                   </a:tcPr>
                 </a:tc>
@@ -15557,7 +12904,7 @@
                       <a:tailEnd len="sm" w="sm" type="none"/>
                     </a:lnB>
                     <a:solidFill>
-                      <a:schemeClr val="accent4"/>
+                      <a:schemeClr val="dk2"/>
                     </a:solidFill>
                   </a:tcPr>
                 </a:tc>
@@ -15628,7 +12975,7 @@
                       <a:tailEnd len="sm" w="sm" type="none"/>
                     </a:lnB>
                     <a:solidFill>
-                      <a:schemeClr val="dk2"/>
+                      <a:schemeClr val="lt2"/>
                     </a:solidFill>
                   </a:tcPr>
                 </a:tc>
@@ -15882,7 +13229,7 @@
                       <a:tailEnd len="sm" w="sm" type="none"/>
                     </a:lnB>
                     <a:solidFill>
-                      <a:schemeClr val="dk2"/>
+                      <a:schemeClr val="lt2"/>
                     </a:solidFill>
                   </a:tcPr>
                 </a:tc>
@@ -15945,7 +13292,7 @@
                       <a:tailEnd len="sm" w="sm" type="none"/>
                     </a:lnB>
                     <a:solidFill>
-                      <a:schemeClr val="accent6"/>
+                      <a:schemeClr val="accent1"/>
                     </a:solidFill>
                   </a:tcPr>
                 </a:tc>
@@ -16008,7 +13355,7 @@
                       <a:tailEnd len="sm" w="sm" type="none"/>
                     </a:lnB>
                     <a:solidFill>
-                      <a:schemeClr val="accent6"/>
+                      <a:schemeClr val="accent1"/>
                     </a:solidFill>
                   </a:tcPr>
                 </a:tc>
@@ -16071,7 +13418,7 @@
                       <a:tailEnd len="sm" w="sm" type="none"/>
                     </a:lnB>
                     <a:solidFill>
-                      <a:schemeClr val="accent6"/>
+                      <a:schemeClr val="accent1"/>
                     </a:solidFill>
                   </a:tcPr>
                 </a:tc>
@@ -16169,7 +13516,7 @@
                       <a:tailEnd len="sm" w="sm" type="none"/>
                     </a:lnB>
                     <a:solidFill>
-                      <a:schemeClr val="dk2"/>
+                      <a:schemeClr val="lt2"/>
                     </a:solidFill>
                   </a:tcPr>
                 </a:tc>
@@ -16610,7 +13957,7 @@
             </a:pPr>
             <a:r>
               <a:rPr lang="en"/>
-              <a:t>Lecture content (2 SWS) = 30 / 150 = 20% (of semester contributions)</a:t>
+              <a:t>Lecture content (4 SWS) = 60 / 150 = 40% (of semester contributions)</a:t>
             </a:r>
             <a:endParaRPr/>
           </a:p>
@@ -16644,7 +13991,7 @@
             </a:pPr>
             <a:r>
               <a:rPr lang="en"/>
-              <a:t>Homework submissions = 120 / 150 = 80% (of semester contributions)</a:t>
+              <a:t>Method exercises = 90 / 150 = 60% (of semester contributions)</a:t>
             </a:r>
             <a:endParaRPr/>
           </a:p>
@@ -16661,87 +14008,14 @@
             </a:pPr>
             <a:r>
               <a:rPr lang="en"/>
-              <a:t>Written homework = 9 / 13 of homework submissions</a:t>
-            </a:r>
-            <a:endParaRPr/>
-          </a:p>
-          <a:p>
-            <a:pPr indent="-292100" lvl="2" marL="1371600" rtl="0" algn="l">
-              <a:spcBef>
-                <a:spcPts val="0"/>
-              </a:spcBef>
-              <a:spcAft>
-                <a:spcPts val="0"/>
-              </a:spcAft>
-              <a:buClr>
-                <a:srgbClr val="9E9E9E"/>
-              </a:buClr>
-              <a:buSzPts val="1000"/>
-              <a:buChar char="■"/>
-            </a:pPr>
-            <a:r>
-              <a:rPr lang="en" sz="1000">
-                <a:solidFill>
-                  <a:srgbClr val="9E9E9E"/>
-                </a:solidFill>
-              </a:rPr>
-              <a:t>Graded using [0..10] based on grading rubric (see later slide)</a:t>
-            </a:r>
-            <a:endParaRPr sz="1000">
-              <a:solidFill>
-                <a:srgbClr val="9E9E9E"/>
-              </a:solidFill>
-            </a:endParaRPr>
-          </a:p>
-          <a:p>
-            <a:pPr indent="-317500" lvl="1" marL="914400" rtl="0" algn="l">
-              <a:spcBef>
-                <a:spcPts val="1000"/>
-              </a:spcBef>
-              <a:spcAft>
-                <a:spcPts val="0"/>
-              </a:spcAft>
-              <a:buSzPts val="1400"/>
-              <a:buChar char="○"/>
-            </a:pPr>
-            <a:r>
-              <a:rPr lang="en"/>
-              <a:t>Method exercises = 4 / 13 of homework submissions</a:t>
-            </a:r>
-            <a:endParaRPr/>
-          </a:p>
-          <a:p>
-            <a:pPr indent="-292100" lvl="2" marL="1371600" rtl="0" algn="l">
-              <a:spcBef>
-                <a:spcPts val="0"/>
-              </a:spcBef>
-              <a:spcAft>
-                <a:spcPts val="0"/>
-              </a:spcAft>
-              <a:buClr>
-                <a:srgbClr val="9E9E9E"/>
-              </a:buClr>
-              <a:buSzPts val="1000"/>
-              <a:buChar char="■"/>
-            </a:pPr>
-            <a:r>
-              <a:rPr lang="en" sz="1000">
-                <a:solidFill>
-                  <a:srgbClr val="9E9E9E"/>
-                </a:solidFill>
-              </a:rPr>
-              <a:t>Graded using [0..10] based on grading rubric (see later slide)</a:t>
-            </a:r>
-            <a:endParaRPr sz="1000">
-              <a:solidFill>
-                <a:srgbClr val="9E9E9E"/>
-              </a:solidFill>
-            </a:endParaRPr>
+              <a:t>Graded using [0..10] using tool and grading rubric</a:t>
+            </a:r>
+            <a:endParaRPr/>
           </a:p>
           <a:p>
             <a:pPr indent="0" lvl="0" marL="0" rtl="0" algn="l">
               <a:spcBef>
-                <a:spcPts val="1000"/>
+                <a:spcPts val="1200"/>
               </a:spcBef>
               <a:spcAft>
                 <a:spcPts val="0"/>
@@ -17163,28 +14437,28 @@
         <a:srgbClr val="FFFFFF"/>
       </a:lt1>
       <a:dk2>
-        <a:srgbClr val="808080"/>
+        <a:srgbClr val="404040"/>
       </a:dk2>
       <a:lt2>
-        <a:srgbClr val="DCDCDC"/>
+        <a:srgbClr val="808080"/>
       </a:lt2>
       <a:accent1>
-        <a:srgbClr val="4CAF50"/>
+        <a:srgbClr val="D0D0D0"/>
       </a:accent1>
       <a:accent2>
-        <a:srgbClr val="1E90FF"/>
+        <a:srgbClr val="4169E1"/>
       </a:accent2>
       <a:accent3>
-        <a:srgbClr val="FF0000"/>
+        <a:srgbClr val="D50D01"/>
       </a:accent3>
       <a:accent4>
-        <a:srgbClr val="424242"/>
+        <a:srgbClr val="FEB612"/>
       </a:accent4>
       <a:accent5>
-        <a:srgbClr val="D9D9D9"/>
+        <a:srgbClr val="4CAF50"/>
       </a:accent5>
       <a:accent6>
-        <a:srgbClr val="D9D9D9"/>
+        <a:srgbClr val="8E44AD"/>
       </a:accent6>
       <a:hlink>
         <a:srgbClr val="34A3C5"/>

</xml_diff>

<commit_message>
Updated after QDA lecture
</commit_message>
<xml_diff>
--- a/Lecture slides/NYT A01 - Introduction.pptx
+++ b/Lecture slides/NYT A01 - Introduction.pptx
@@ -29,6 +29,7 @@
     <p:sldId id="274" r:id="rId24"/>
     <p:sldId id="275" r:id="rId25"/>
     <p:sldId id="276" r:id="rId26"/>
+    <p:sldId id="277" r:id="rId27"/>
   </p:sldIdLst>
   <p:sldSz cy="5143500" cx="9144000"/>
   <p:notesSz cx="6858000" cy="9144000"/>
@@ -808,7 +809,7 @@
       </p:grpSpPr>
       <p:sp>
         <p:nvSpPr>
-          <p:cNvPr id="97" name="Google Shape;97;g108fe332759_2_142:notes"/>
+          <p:cNvPr id="97" name="Google Shape;97;g2395919313b_0_82:notes"/>
           <p:cNvSpPr/>
           <p:nvPr>
             <p:ph idx="2" type="sldImg"/>
@@ -843,7 +844,7 @@
       </p:sp>
       <p:sp>
         <p:nvSpPr>
-          <p:cNvPr id="98" name="Google Shape;98;g108fe332759_2_142:notes"/>
+          <p:cNvPr id="98" name="Google Shape;98;g2395919313b_0_82:notes"/>
           <p:cNvSpPr txBox="1"/>
           <p:nvPr>
             <p:ph idx="1" type="body"/>
@@ -1204,7 +1205,7 @@
       </p:grpSpPr>
       <p:sp>
         <p:nvSpPr>
-          <p:cNvPr id="125" name="Google Shape;125;g108fe332759_2_30:notes"/>
+          <p:cNvPr id="125" name="Google Shape;125;g2395919313b_0_88:notes"/>
           <p:cNvSpPr/>
           <p:nvPr>
             <p:ph idx="2" type="sldImg"/>
@@ -1239,7 +1240,7 @@
       </p:sp>
       <p:sp>
         <p:nvSpPr>
-          <p:cNvPr id="126" name="Google Shape;126;g108fe332759_2_30:notes"/>
+          <p:cNvPr id="126" name="Google Shape;126;g2395919313b_0_88:notes"/>
           <p:cNvSpPr txBox="1"/>
           <p:nvPr>
             <p:ph idx="1" type="body"/>
@@ -1303,7 +1304,7 @@
       </p:grpSpPr>
       <p:sp>
         <p:nvSpPr>
-          <p:cNvPr id="132" name="Google Shape;132;g108fe332759_2_36:notes"/>
+          <p:cNvPr id="132" name="Google Shape;132;g2395919313b_0_94:notes"/>
           <p:cNvSpPr/>
           <p:nvPr>
             <p:ph idx="2" type="sldImg"/>
@@ -1338,7 +1339,7 @@
       </p:sp>
       <p:sp>
         <p:nvSpPr>
-          <p:cNvPr id="133" name="Google Shape;133;g108fe332759_2_36:notes"/>
+          <p:cNvPr id="133" name="Google Shape;133;g2395919313b_0_94:notes"/>
           <p:cNvSpPr txBox="1"/>
           <p:nvPr>
             <p:ph idx="1" type="body"/>
@@ -1388,7 +1389,7 @@
   <p:cSld>
     <p:spTree>
       <p:nvGrpSpPr>
-        <p:cNvPr id="139" name="Shape 139"/>
+        <p:cNvPr id="138" name="Shape 138"/>
         <p:cNvGrpSpPr/>
         <p:nvPr/>
       </p:nvGrpSpPr>
@@ -1402,7 +1403,7 @@
       </p:grpSpPr>
       <p:sp>
         <p:nvSpPr>
-          <p:cNvPr id="140" name="Google Shape;140;g108fe332759_2_43:notes"/>
+          <p:cNvPr id="139" name="Google Shape;139;g2395919313b_0_100:notes"/>
           <p:cNvSpPr/>
           <p:nvPr>
             <p:ph idx="2" type="sldImg"/>
@@ -1437,7 +1438,7 @@
       </p:sp>
       <p:sp>
         <p:nvSpPr>
-          <p:cNvPr id="141" name="Google Shape;141;g108fe332759_2_43:notes"/>
+          <p:cNvPr id="140" name="Google Shape;140;g2395919313b_0_100:notes"/>
           <p:cNvSpPr txBox="1"/>
           <p:nvPr>
             <p:ph idx="1" type="body"/>
@@ -1487,7 +1488,7 @@
   <p:cSld>
     <p:spTree>
       <p:nvGrpSpPr>
-        <p:cNvPr id="147" name="Shape 147"/>
+        <p:cNvPr id="146" name="Shape 146"/>
         <p:cNvGrpSpPr/>
         <p:nvPr/>
       </p:nvGrpSpPr>
@@ -1501,7 +1502,7 @@
       </p:grpSpPr>
       <p:sp>
         <p:nvSpPr>
-          <p:cNvPr id="148" name="Google Shape;148;g108fe332759_2_49:notes"/>
+          <p:cNvPr id="147" name="Google Shape;147;g108fe332759_2_43:notes"/>
           <p:cNvSpPr/>
           <p:nvPr>
             <p:ph idx="2" type="sldImg"/>
@@ -1536,7 +1537,7 @@
       </p:sp>
       <p:sp>
         <p:nvSpPr>
-          <p:cNvPr id="149" name="Google Shape;149;g108fe332759_2_49:notes"/>
+          <p:cNvPr id="148" name="Google Shape;148;g108fe332759_2_43:notes"/>
           <p:cNvSpPr txBox="1"/>
           <p:nvPr>
             <p:ph idx="1" type="body"/>
@@ -1600,7 +1601,7 @@
       </p:grpSpPr>
       <p:sp>
         <p:nvSpPr>
-          <p:cNvPr id="155" name="Google Shape;155;g108fe332759_2_61:notes"/>
+          <p:cNvPr id="155" name="Google Shape;155;g108fe332759_2_49:notes"/>
           <p:cNvSpPr/>
           <p:nvPr>
             <p:ph idx="2" type="sldImg"/>
@@ -1635,7 +1636,7 @@
       </p:sp>
       <p:sp>
         <p:nvSpPr>
-          <p:cNvPr id="156" name="Google Shape;156;g108fe332759_2_61:notes"/>
+          <p:cNvPr id="156" name="Google Shape;156;g108fe332759_2_49:notes"/>
           <p:cNvSpPr txBox="1"/>
           <p:nvPr>
             <p:ph idx="1" type="body"/>
@@ -1699,7 +1700,7 @@
       </p:grpSpPr>
       <p:sp>
         <p:nvSpPr>
-          <p:cNvPr id="162" name="Google Shape;162;g108fe332759_2_67:notes"/>
+          <p:cNvPr id="162" name="Google Shape;162;g108fe332759_2_61:notes"/>
           <p:cNvSpPr/>
           <p:nvPr>
             <p:ph idx="2" type="sldImg"/>
@@ -1734,7 +1735,7 @@
       </p:sp>
       <p:sp>
         <p:nvSpPr>
-          <p:cNvPr id="163" name="Google Shape;163;g108fe332759_2_67:notes"/>
+          <p:cNvPr id="163" name="Google Shape;163;g108fe332759_2_61:notes"/>
           <p:cNvSpPr txBox="1"/>
           <p:nvPr>
             <p:ph idx="1" type="body"/>
@@ -1897,7 +1898,7 @@
       </p:grpSpPr>
       <p:sp>
         <p:nvSpPr>
-          <p:cNvPr id="169" name="Google Shape;169;gf5a950148e_0_0:notes"/>
+          <p:cNvPr id="169" name="Google Shape;169;g2395919313b_0_107:notes"/>
           <p:cNvSpPr/>
           <p:nvPr>
             <p:ph idx="2" type="sldImg"/>
@@ -1932,7 +1933,7 @@
       </p:sp>
       <p:sp>
         <p:nvSpPr>
-          <p:cNvPr id="170" name="Google Shape;170;gf5a950148e_0_0:notes"/>
+          <p:cNvPr id="170" name="Google Shape;170;g2395919313b_0_107:notes"/>
           <p:cNvSpPr txBox="1"/>
           <p:nvPr>
             <p:ph idx="1" type="body"/>
@@ -1982,7 +1983,7 @@
   <p:cSld>
     <p:spTree>
       <p:nvGrpSpPr>
-        <p:cNvPr id="174" name="Shape 174"/>
+        <p:cNvPr id="175" name="Shape 175"/>
         <p:cNvGrpSpPr/>
         <p:nvPr/>
       </p:nvGrpSpPr>
@@ -1996,7 +1997,7 @@
       </p:grpSpPr>
       <p:sp>
         <p:nvSpPr>
-          <p:cNvPr id="175" name="Google Shape;175;gf5a950148e_0_6:notes"/>
+          <p:cNvPr id="176" name="Google Shape;176;g2395919313b_0_38:notes"/>
           <p:cNvSpPr/>
           <p:nvPr>
             <p:ph idx="2" type="sldImg"/>
@@ -2031,7 +2032,106 @@
       </p:sp>
       <p:sp>
         <p:nvSpPr>
-          <p:cNvPr id="176" name="Google Shape;176;gf5a950148e_0_6:notes"/>
+          <p:cNvPr id="177" name="Google Shape;177;g2395919313b_0_38:notes"/>
+          <p:cNvSpPr txBox="1"/>
+          <p:nvPr>
+            <p:ph idx="1" type="body"/>
+          </p:nvPr>
+        </p:nvSpPr>
+        <p:spPr>
+          <a:xfrm>
+            <a:off x="685800" y="4343400"/>
+            <a:ext cx="5486400" cy="4114800"/>
+          </a:xfrm>
+          <a:prstGeom prst="rect">
+            <a:avLst/>
+          </a:prstGeom>
+        </p:spPr>
+        <p:txBody>
+          <a:bodyPr anchorCtr="0" anchor="t" bIns="91425" lIns="91425" spcFirstLastPara="1" rIns="91425" wrap="square" tIns="91425">
+            <a:noAutofit/>
+          </a:bodyPr>
+          <a:lstStyle/>
+          <a:p>
+            <a:pPr indent="0" lvl="0" marL="0" rtl="0" algn="l">
+              <a:spcBef>
+                <a:spcPts val="0"/>
+              </a:spcBef>
+              <a:spcAft>
+                <a:spcPts val="0"/>
+              </a:spcAft>
+              <a:buNone/>
+            </a:pPr>
+            <a:r>
+              <a:t/>
+            </a:r>
+            <a:endParaRPr/>
+          </a:p>
+        </p:txBody>
+      </p:sp>
+    </p:spTree>
+  </p:cSld>
+  <p:clrMapOvr>
+    <a:masterClrMapping/>
+  </p:clrMapOvr>
+</p:notes>
+</file>
+
+<file path=ppt/notesSlides/notesSlide22.xml><?xml version="1.0" encoding="utf-8"?>
+<p:notes xmlns:a="http://schemas.openxmlformats.org/drawingml/2006/main" xmlns:r="http://schemas.openxmlformats.org/officeDocument/2006/relationships" xmlns:mc="http://schemas.openxmlformats.org/markup-compatibility/2006" xmlns:mv="urn:schemas-microsoft-com:mac:vml" xmlns:p="http://schemas.openxmlformats.org/presentationml/2006/main" xmlns:c="http://schemas.openxmlformats.org/drawingml/2006/chart" xmlns:dgm="http://schemas.openxmlformats.org/drawingml/2006/diagram" xmlns:o="urn:schemas-microsoft-com:office:office" xmlns:v="urn:schemas-microsoft-com:vml" xmlns:pvml="urn:schemas-microsoft-com:office:powerpoint" xmlns:com="http://schemas.openxmlformats.org/drawingml/2006/compatibility" xmlns:p14="http://schemas.microsoft.com/office/powerpoint/2010/main" xmlns:p15="http://schemas.microsoft.com/office/powerpoint/2012/main" xmlns:ahyp="http://schemas.microsoft.com/office/drawing/2018/hyperlinkcolor" showMasterPhAnim="0" showMasterSp="0">
+  <p:cSld>
+    <p:spTree>
+      <p:nvGrpSpPr>
+        <p:cNvPr id="181" name="Shape 181"/>
+        <p:cNvGrpSpPr/>
+        <p:nvPr/>
+      </p:nvGrpSpPr>
+      <p:grpSpPr>
+        <a:xfrm>
+          <a:off x="0" y="0"/>
+          <a:ext cx="0" cy="0"/>
+          <a:chOff x="0" y="0"/>
+          <a:chExt cx="0" cy="0"/>
+        </a:xfrm>
+      </p:grpSpPr>
+      <p:sp>
+        <p:nvSpPr>
+          <p:cNvPr id="182" name="Google Shape;182;g2395919313b_0_43:notes"/>
+          <p:cNvSpPr/>
+          <p:nvPr>
+            <p:ph idx="2" type="sldImg"/>
+          </p:nvPr>
+        </p:nvSpPr>
+        <p:spPr>
+          <a:xfrm>
+            <a:off x="381300" y="685800"/>
+            <a:ext cx="6096000" cy="3429000"/>
+          </a:xfrm>
+          <a:custGeom>
+            <a:rect b="b" l="l" r="r" t="t"/>
+            <a:pathLst>
+              <a:path extrusionOk="0" h="120000" w="120000">
+                <a:moveTo>
+                  <a:pt x="0" y="0"/>
+                </a:moveTo>
+                <a:lnTo>
+                  <a:pt x="120000" y="0"/>
+                </a:lnTo>
+                <a:lnTo>
+                  <a:pt x="120000" y="120000"/>
+                </a:lnTo>
+                <a:lnTo>
+                  <a:pt x="0" y="120000"/>
+                </a:lnTo>
+                <a:close/>
+              </a:path>
+            </a:pathLst>
+          </a:custGeom>
+        </p:spPr>
+      </p:sp>
+      <p:sp>
+        <p:nvSpPr>
+          <p:cNvPr id="183" name="Google Shape;183;g2395919313b_0_43:notes"/>
           <p:cNvSpPr txBox="1"/>
           <p:nvPr>
             <p:ph idx="1" type="body"/>
@@ -2491,7 +2591,7 @@
       </p:grpSpPr>
       <p:sp>
         <p:nvSpPr>
-          <p:cNvPr id="74" name="Google Shape;74;g108fe332759_2_12:notes"/>
+          <p:cNvPr id="74" name="Google Shape;74;g2395919313b_0_76:notes"/>
           <p:cNvSpPr/>
           <p:nvPr>
             <p:ph idx="2" type="sldImg"/>
@@ -2526,7 +2626,7 @@
       </p:sp>
       <p:sp>
         <p:nvSpPr>
-          <p:cNvPr id="75" name="Google Shape;75;g108fe332759_2_12:notes"/>
+          <p:cNvPr id="75" name="Google Shape;75;g2395919313b_0_76:notes"/>
           <p:cNvSpPr txBox="1"/>
           <p:nvPr>
             <p:ph idx="1" type="body"/>
@@ -6679,7 +6779,7 @@
             <a:tbl>
               <a:tblPr>
                 <a:noFill/>
-                <a:tableStyleId>{289D13A9-D2F7-4F60-86CA-BBA6726F6D71}</a:tableStyleId>
+                <a:tableStyleId>{067A0ED2-2E35-4495-812A-DB64C3BFA2AA}</a:tableStyleId>
               </a:tblPr>
               <a:tblGrid>
                 <a:gridCol w="1227850"/>
@@ -8790,7 +8890,7 @@
             </a:pPr>
             <a:r>
               <a:rPr lang="en"/>
-              <a:t>Receiving a Grade for the Course</a:t>
+              <a:t>Course Registration vs. Exam Registration</a:t>
             </a:r>
             <a:endParaRPr/>
           </a:p>
@@ -8826,16 +8926,15 @@
               <a:spcAft>
                 <a:spcPts val="0"/>
               </a:spcAft>
-              <a:buClr>
-                <a:schemeClr val="dk1"/>
-              </a:buClr>
-              <a:buSzPts val="1100"/>
-              <a:buFont typeface="Arial"/>
-              <a:buNone/>
-            </a:pPr>
+              <a:buNone/>
+            </a:pPr>
+            <a:r>
+              <a:rPr b="1" lang="en"/>
+              <a:t>Step 1: Course registration </a:t>
+            </a:r>
             <a:r>
               <a:rPr lang="en"/>
-              <a:t>If you want to receive a grade</a:t>
+              <a:t>(German: Kursanmeldung)</a:t>
             </a:r>
             <a:endParaRPr/>
           </a:p>
@@ -8847,101 +8946,19 @@
               <a:spcAft>
                 <a:spcPts val="0"/>
               </a:spcAft>
-              <a:buClr>
-                <a:srgbClr val="212121"/>
-              </a:buClr>
               <a:buSzPts val="1800"/>
               <a:buChar char="●"/>
             </a:pPr>
             <a:r>
-              <a:rPr lang="en">
-                <a:solidFill>
-                  <a:srgbClr val="212121"/>
-                </a:solidFill>
-              </a:rPr>
-              <a:t>You must register through your university’s exam registration system</a:t>
-            </a:r>
-            <a:endParaRPr>
-              <a:solidFill>
-                <a:srgbClr val="212121"/>
-              </a:solidFill>
-            </a:endParaRPr>
-          </a:p>
-          <a:p>
-            <a:pPr indent="-317500" lvl="1" marL="914400" rtl="0" algn="l">
-              <a:spcBef>
-                <a:spcPts val="0"/>
-              </a:spcBef>
-              <a:spcAft>
-                <a:spcPts val="0"/>
-              </a:spcAft>
-              <a:buSzPts val="1400"/>
-              <a:buChar char="○"/>
-            </a:pPr>
-            <a:r>
-              <a:rPr b="1" lang="en"/>
-              <a:t>Your degree program may have split the course into two (VL + UE)</a:t>
-            </a:r>
-            <a:endParaRPr b="1"/>
-          </a:p>
-          <a:p>
-            <a:pPr indent="-317500" lvl="1" marL="914400" rtl="0" algn="l">
-              <a:spcBef>
-                <a:spcPts val="0"/>
-              </a:spcBef>
-              <a:spcAft>
-                <a:spcPts val="0"/>
-              </a:spcAft>
-              <a:buSzPts val="1400"/>
-              <a:buChar char="○"/>
-            </a:pPr>
-            <a:r>
-              <a:rPr b="1" lang="en"/>
-              <a:t>Registration system is different from the course management system</a:t>
-            </a:r>
-            <a:endParaRPr b="1"/>
-          </a:p>
-          <a:p>
-            <a:pPr indent="-317500" lvl="1" marL="914400" rtl="0" algn="l">
-              <a:spcBef>
-                <a:spcPts val="0"/>
-              </a:spcBef>
-              <a:spcAft>
-                <a:spcPts val="0"/>
-              </a:spcAft>
-              <a:buSzPts val="1400"/>
-              <a:buChar char="○"/>
-            </a:pPr>
-            <a:r>
-              <a:rPr b="1" lang="en"/>
-              <a:t>Please check asap that the course is available in your degree program!</a:t>
-            </a:r>
-            <a:endParaRPr b="1">
-              <a:solidFill>
-                <a:srgbClr val="212121"/>
-              </a:solidFill>
-            </a:endParaRPr>
-          </a:p>
-          <a:p>
-            <a:pPr indent="0" lvl="0" marL="0" rtl="0" algn="l">
-              <a:spcBef>
-                <a:spcPts val="1200"/>
-              </a:spcBef>
-              <a:spcAft>
-                <a:spcPts val="0"/>
-              </a:spcAft>
-              <a:buNone/>
-            </a:pPr>
-            <a:r>
               <a:rPr lang="en"/>
-              <a:t>In case of problems, please see</a:t>
+              <a:t>Students sign up through the course management system</a:t>
             </a:r>
             <a:endParaRPr/>
           </a:p>
           <a:p>
             <a:pPr indent="-342900" lvl="0" marL="457200" rtl="0" algn="l">
               <a:spcBef>
-                <a:spcPts val="1200"/>
+                <a:spcPts val="0"/>
               </a:spcBef>
               <a:spcAft>
                 <a:spcPts val="0"/>
@@ -8950,17 +8967,25 @@
               <a:buChar char="●"/>
             </a:pPr>
             <a:r>
-              <a:rPr lang="en" u="sng">
-                <a:solidFill>
-                  <a:schemeClr val="hlink"/>
-                </a:solidFill>
-                <a:hlinkClick r:id="rId3"/>
-              </a:rPr>
-              <a:t>https://oss.cs.fau.de/teaching/course-resources/course-registration/</a:t>
-            </a:r>
-            <a:r>
               <a:rPr lang="en"/>
-              <a:t> </a:t>
+              <a:t>You may or may not get in, various rules and regulations apply</a:t>
+            </a:r>
+            <a:endParaRPr/>
+          </a:p>
+          <a:p>
+            <a:pPr indent="-342900" lvl="0" marL="457200" rtl="0" algn="l">
+              <a:spcBef>
+                <a:spcPts val="0"/>
+              </a:spcBef>
+              <a:spcAft>
+                <a:spcPts val="0"/>
+              </a:spcAft>
+              <a:buSzPts val="1800"/>
+              <a:buChar char="●"/>
+            </a:pPr>
+            <a:r>
+              <a:rPr lang="en"/>
+              <a:t>The earlier you sign up, the more likely you are to get in</a:t>
             </a:r>
             <a:endParaRPr/>
           </a:p>
@@ -8970,13 +8995,68 @@
                 <a:spcPts val="1200"/>
               </a:spcBef>
               <a:spcAft>
+                <a:spcPts val="0"/>
+              </a:spcAft>
+              <a:buNone/>
+            </a:pPr>
+            <a:r>
+              <a:rPr b="1" lang="en"/>
+              <a:t>Step 2: Exam registration </a:t>
+            </a:r>
+            <a:r>
+              <a:rPr lang="en"/>
+              <a:t>(German: Prüfungsanmeldung)</a:t>
+            </a:r>
+            <a:endParaRPr/>
+          </a:p>
+          <a:p>
+            <a:pPr indent="-342900" lvl="0" marL="457200" rtl="0" algn="l">
+              <a:spcBef>
                 <a:spcPts val="1200"/>
-              </a:spcAft>
-              <a:buNone/>
+              </a:spcBef>
+              <a:spcAft>
+                <a:spcPts val="0"/>
+              </a:spcAft>
+              <a:buSzPts val="1800"/>
+              <a:buChar char="●"/>
             </a:pPr>
             <a:r>
               <a:rPr lang="en"/>
-              <a:t>Otherwise: No grade</a:t>
+              <a:t>During the first weeks of the course, you can decide to drop out</a:t>
+            </a:r>
+            <a:endParaRPr/>
+          </a:p>
+          <a:p>
+            <a:pPr indent="-342900" lvl="0" marL="457200" rtl="0" algn="l">
+              <a:spcBef>
+                <a:spcPts val="0"/>
+              </a:spcBef>
+              <a:spcAft>
+                <a:spcPts val="0"/>
+              </a:spcAft>
+              <a:buSzPts val="1800"/>
+              <a:buChar char="●"/>
+            </a:pPr>
+            <a:r>
+              <a:rPr lang="en"/>
+              <a:t>Four weeks (or so) into the semester, you can register for the exam</a:t>
+            </a:r>
+            <a:endParaRPr/>
+          </a:p>
+          <a:p>
+            <a:pPr indent="-342900" lvl="0" marL="457200" rtl="0" algn="l">
+              <a:spcBef>
+                <a:spcPts val="0"/>
+              </a:spcBef>
+              <a:spcAft>
+                <a:spcPts val="0"/>
+              </a:spcAft>
+              <a:buSzPts val="1800"/>
+              <a:buChar char="●"/>
+            </a:pPr>
+            <a:r>
+              <a:rPr lang="en"/>
+              <a:t>After exam registration closes, your decision is binding</a:t>
             </a:r>
             <a:endParaRPr/>
           </a:p>
@@ -9035,7 +9115,7 @@
                 <a:solidFill>
                   <a:schemeClr val="hlink"/>
                 </a:solidFill>
-                <a:hlinkClick r:id="rId4"/>
+                <a:hlinkClick r:id="rId3"/>
               </a:rPr>
               <a:t>https://profriehle.com</a:t>
             </a:r>
@@ -9098,6 +9178,313 @@
           </a:prstGeom>
         </p:spPr>
         <p:txBody>
+          <a:bodyPr anchorCtr="0" anchor="ctr" bIns="91425" lIns="274300" spcFirstLastPara="1" rIns="91425" wrap="square" tIns="91425">
+            <a:noAutofit/>
+          </a:bodyPr>
+          <a:lstStyle/>
+          <a:p>
+            <a:pPr indent="0" lvl="0" marL="0" rtl="0" algn="l">
+              <a:spcBef>
+                <a:spcPts val="0"/>
+              </a:spcBef>
+              <a:spcAft>
+                <a:spcPts val="0"/>
+              </a:spcAft>
+              <a:buNone/>
+            </a:pPr>
+            <a:r>
+              <a:rPr lang="en"/>
+              <a:t>Receiving a Grade for the Course</a:t>
+            </a:r>
+            <a:endParaRPr/>
+          </a:p>
+        </p:txBody>
+      </p:sp>
+      <p:sp>
+        <p:nvSpPr>
+          <p:cNvPr id="136" name="Google Shape;136;p22"/>
+          <p:cNvSpPr txBox="1"/>
+          <p:nvPr>
+            <p:ph idx="1" type="body"/>
+          </p:nvPr>
+        </p:nvSpPr>
+        <p:spPr>
+          <a:xfrm>
+            <a:off x="274320" y="914400"/>
+            <a:ext cx="8595300" cy="4114800"/>
+          </a:xfrm>
+          <a:prstGeom prst="rect">
+            <a:avLst/>
+          </a:prstGeom>
+        </p:spPr>
+        <p:txBody>
+          <a:bodyPr anchorCtr="0" anchor="t" bIns="0" lIns="0" spcFirstLastPara="1" rIns="0" wrap="square" tIns="0">
+            <a:noAutofit/>
+          </a:bodyPr>
+          <a:lstStyle/>
+          <a:p>
+            <a:pPr indent="0" lvl="0" marL="0" rtl="0" algn="l">
+              <a:spcBef>
+                <a:spcPts val="0"/>
+              </a:spcBef>
+              <a:spcAft>
+                <a:spcPts val="0"/>
+              </a:spcAft>
+              <a:buClr>
+                <a:schemeClr val="dk1"/>
+              </a:buClr>
+              <a:buSzPts val="1100"/>
+              <a:buFont typeface="Arial"/>
+              <a:buNone/>
+            </a:pPr>
+            <a:r>
+              <a:rPr lang="en"/>
+              <a:t>If you want to receive a grade</a:t>
+            </a:r>
+            <a:endParaRPr/>
+          </a:p>
+          <a:p>
+            <a:pPr indent="-342900" lvl="0" marL="457200" rtl="0" algn="l">
+              <a:spcBef>
+                <a:spcPts val="1200"/>
+              </a:spcBef>
+              <a:spcAft>
+                <a:spcPts val="0"/>
+              </a:spcAft>
+              <a:buClr>
+                <a:srgbClr val="212121"/>
+              </a:buClr>
+              <a:buSzPts val="1800"/>
+              <a:buChar char="●"/>
+            </a:pPr>
+            <a:r>
+              <a:rPr lang="en">
+                <a:solidFill>
+                  <a:srgbClr val="212121"/>
+                </a:solidFill>
+              </a:rPr>
+              <a:t>You must register through your university’s exam registration system</a:t>
+            </a:r>
+            <a:endParaRPr>
+              <a:solidFill>
+                <a:srgbClr val="212121"/>
+              </a:solidFill>
+            </a:endParaRPr>
+          </a:p>
+          <a:p>
+            <a:pPr indent="-317500" lvl="1" marL="914400" rtl="0" algn="l">
+              <a:spcBef>
+                <a:spcPts val="1000"/>
+              </a:spcBef>
+              <a:spcAft>
+                <a:spcPts val="0"/>
+              </a:spcAft>
+              <a:buSzPts val="1400"/>
+              <a:buChar char="○"/>
+            </a:pPr>
+            <a:r>
+              <a:rPr b="1" lang="en"/>
+              <a:t>Your degree program may have split the course into two (VL + UE)</a:t>
+            </a:r>
+            <a:endParaRPr b="1"/>
+          </a:p>
+          <a:p>
+            <a:pPr indent="-317500" lvl="1" marL="914400" rtl="0" algn="l">
+              <a:spcBef>
+                <a:spcPts val="0"/>
+              </a:spcBef>
+              <a:spcAft>
+                <a:spcPts val="0"/>
+              </a:spcAft>
+              <a:buSzPts val="1400"/>
+              <a:buChar char="○"/>
+            </a:pPr>
+            <a:r>
+              <a:rPr b="1" lang="en"/>
+              <a:t>Please check asap that the course is available in your degree program!</a:t>
+            </a:r>
+            <a:endParaRPr b="1">
+              <a:solidFill>
+                <a:srgbClr val="212121"/>
+              </a:solidFill>
+            </a:endParaRPr>
+          </a:p>
+          <a:p>
+            <a:pPr indent="0" lvl="0" marL="0" rtl="0" algn="l">
+              <a:spcBef>
+                <a:spcPts val="1200"/>
+              </a:spcBef>
+              <a:spcAft>
+                <a:spcPts val="0"/>
+              </a:spcAft>
+              <a:buNone/>
+            </a:pPr>
+            <a:r>
+              <a:rPr lang="en"/>
+              <a:t>In case of problems, please see</a:t>
+            </a:r>
+            <a:endParaRPr/>
+          </a:p>
+          <a:p>
+            <a:pPr indent="-342900" lvl="0" marL="457200" rtl="0" algn="l">
+              <a:spcBef>
+                <a:spcPts val="1200"/>
+              </a:spcBef>
+              <a:spcAft>
+                <a:spcPts val="0"/>
+              </a:spcAft>
+              <a:buSzPts val="1800"/>
+              <a:buChar char="●"/>
+            </a:pPr>
+            <a:r>
+              <a:rPr lang="en" u="sng">
+                <a:solidFill>
+                  <a:schemeClr val="hlink"/>
+                </a:solidFill>
+                <a:hlinkClick r:id="rId3"/>
+              </a:rPr>
+              <a:t>https://oss.cs.fau.de/teaching/course-resources/course-registration/</a:t>
+            </a:r>
+            <a:r>
+              <a:rPr lang="en"/>
+              <a:t> </a:t>
+            </a:r>
+            <a:endParaRPr/>
+          </a:p>
+          <a:p>
+            <a:pPr indent="0" lvl="0" marL="0" rtl="0" algn="l">
+              <a:spcBef>
+                <a:spcPts val="1200"/>
+              </a:spcBef>
+              <a:spcAft>
+                <a:spcPts val="1200"/>
+              </a:spcAft>
+              <a:buNone/>
+            </a:pPr>
+            <a:r>
+              <a:rPr lang="en"/>
+              <a:t>Otherwise: No grade</a:t>
+            </a:r>
+            <a:endParaRPr/>
+          </a:p>
+        </p:txBody>
+      </p:sp>
+      <p:sp>
+        <p:nvSpPr>
+          <p:cNvPr id="137" name="Google Shape;137;p22"/>
+          <p:cNvSpPr txBox="1"/>
+          <p:nvPr>
+            <p:ph idx="12" type="sldNum"/>
+          </p:nvPr>
+        </p:nvSpPr>
+        <p:spPr>
+          <a:xfrm>
+            <a:off x="7315202" y="4416550"/>
+            <a:ext cx="1828800" cy="731400"/>
+          </a:xfrm>
+          <a:prstGeom prst="rect">
+            <a:avLst/>
+          </a:prstGeom>
+        </p:spPr>
+        <p:txBody>
+          <a:bodyPr anchorCtr="0" anchor="b" bIns="91425" lIns="91425" spcFirstLastPara="1" rIns="91425" wrap="square" tIns="91425">
+            <a:noAutofit/>
+          </a:bodyPr>
+          <a:lstStyle/>
+          <a:p>
+            <a:pPr indent="0" lvl="0" marL="0" rtl="0" algn="r">
+              <a:spcBef>
+                <a:spcPts val="0"/>
+              </a:spcBef>
+              <a:spcAft>
+                <a:spcPts val="0"/>
+              </a:spcAft>
+              <a:buNone/>
+            </a:pPr>
+            <a:fld id="{00000000-1234-1234-1234-123412341234}" type="slidenum">
+              <a:rPr lang="en"/>
+              <a:t>‹#›</a:t>
+            </a:fld>
+            <a:endParaRPr/>
+          </a:p>
+          <a:p>
+            <a:pPr indent="0" lvl="0" marL="0" rtl="0" algn="r">
+              <a:spcBef>
+                <a:spcPts val="0"/>
+              </a:spcBef>
+              <a:spcAft>
+                <a:spcPts val="0"/>
+              </a:spcAft>
+              <a:buNone/>
+            </a:pPr>
+            <a:r>
+              <a:rPr b="0" lang="en" sz="900" u="sng">
+                <a:solidFill>
+                  <a:schemeClr val="hlink"/>
+                </a:solidFill>
+                <a:hlinkClick r:id="rId4"/>
+              </a:rPr>
+              <a:t>https://profriehle.com</a:t>
+            </a:r>
+            <a:r>
+              <a:rPr b="0" lang="en" sz="900">
+                <a:solidFill>
+                  <a:schemeClr val="dk2"/>
+                </a:solidFill>
+              </a:rPr>
+              <a:t> </a:t>
+            </a:r>
+            <a:endParaRPr b="0" sz="900">
+              <a:solidFill>
+                <a:schemeClr val="dk2"/>
+              </a:solidFill>
+            </a:endParaRPr>
+          </a:p>
+        </p:txBody>
+      </p:sp>
+    </p:spTree>
+  </p:cSld>
+  <p:clrMapOvr>
+    <a:masterClrMapping/>
+  </p:clrMapOvr>
+</p:sld>
+</file>
+
+<file path=ppt/slides/slide16.xml><?xml version="1.0" encoding="utf-8"?>
+<p:sld xmlns:a="http://schemas.openxmlformats.org/drawingml/2006/main" xmlns:r="http://schemas.openxmlformats.org/officeDocument/2006/relationships" xmlns:mc="http://schemas.openxmlformats.org/markup-compatibility/2006" xmlns:mv="urn:schemas-microsoft-com:mac:vml" xmlns:p="http://schemas.openxmlformats.org/presentationml/2006/main" xmlns:c="http://schemas.openxmlformats.org/drawingml/2006/chart" xmlns:dgm="http://schemas.openxmlformats.org/drawingml/2006/diagram" xmlns:o="urn:schemas-microsoft-com:office:office" xmlns:v="urn:schemas-microsoft-com:vml" xmlns:pvml="urn:schemas-microsoft-com:office:powerpoint" xmlns:com="http://schemas.openxmlformats.org/drawingml/2006/compatibility" xmlns:p14="http://schemas.microsoft.com/office/powerpoint/2010/main" xmlns:p15="http://schemas.microsoft.com/office/powerpoint/2012/main" xmlns:ahyp="http://schemas.microsoft.com/office/drawing/2018/hyperlinkcolor">
+  <p:cSld>
+    <p:spTree>
+      <p:nvGrpSpPr>
+        <p:cNvPr id="141" name="Shape 141"/>
+        <p:cNvGrpSpPr/>
+        <p:nvPr/>
+      </p:nvGrpSpPr>
+      <p:grpSpPr>
+        <a:xfrm>
+          <a:off x="0" y="0"/>
+          <a:ext cx="0" cy="0"/>
+          <a:chOff x="0" y="0"/>
+          <a:chExt cx="0" cy="0"/>
+        </a:xfrm>
+      </p:grpSpPr>
+      <p:sp>
+        <p:nvSpPr>
+          <p:cNvPr id="142" name="Google Shape;142;p23"/>
+          <p:cNvSpPr txBox="1"/>
+          <p:nvPr>
+            <p:ph type="title"/>
+          </p:nvPr>
+        </p:nvSpPr>
+        <p:spPr>
+          <a:xfrm>
+            <a:off x="0" y="0"/>
+            <a:ext cx="9144000" cy="685800"/>
+          </a:xfrm>
+          <a:prstGeom prst="rect">
+            <a:avLst/>
+          </a:prstGeom>
+        </p:spPr>
+        <p:txBody>
           <a:bodyPr anchorCtr="0" anchor="ctr" bIns="0" lIns="274300" spcFirstLastPara="1" rIns="0" wrap="square" tIns="0">
             <a:noAutofit/>
           </a:bodyPr>
@@ -9122,7 +9509,7 @@
       </p:sp>
       <p:pic>
         <p:nvPicPr>
-          <p:cNvPr id="136" name="Google Shape;136;p22"/>
+          <p:cNvPr id="143" name="Google Shape;143;p23"/>
           <p:cNvPicPr preferRelativeResize="0"/>
           <p:nvPr/>
         </p:nvPicPr>
@@ -9150,7 +9537,7 @@
       </p:pic>
       <p:sp>
         <p:nvSpPr>
-          <p:cNvPr id="137" name="Google Shape;137;p22"/>
+          <p:cNvPr id="144" name="Google Shape;144;p23"/>
           <p:cNvSpPr txBox="1"/>
           <p:nvPr/>
         </p:nvSpPr>
@@ -9208,7 +9595,7 @@
       </p:sp>
       <p:sp>
         <p:nvSpPr>
-          <p:cNvPr id="138" name="Google Shape;138;p22"/>
+          <p:cNvPr id="145" name="Google Shape;145;p23"/>
           <p:cNvSpPr txBox="1"/>
           <p:nvPr>
             <p:ph idx="12" type="sldNum"/>
@@ -9287,12 +9674,12 @@
 </p:sld>
 </file>
 
-<file path=ppt/slides/slide16.xml><?xml version="1.0" encoding="utf-8"?>
+<file path=ppt/slides/slide17.xml><?xml version="1.0" encoding="utf-8"?>
 <p:sld xmlns:a="http://schemas.openxmlformats.org/drawingml/2006/main" xmlns:r="http://schemas.openxmlformats.org/officeDocument/2006/relationships" xmlns:mc="http://schemas.openxmlformats.org/markup-compatibility/2006" xmlns:mv="urn:schemas-microsoft-com:mac:vml" xmlns:p="http://schemas.openxmlformats.org/presentationml/2006/main" xmlns:c="http://schemas.openxmlformats.org/drawingml/2006/chart" xmlns:dgm="http://schemas.openxmlformats.org/drawingml/2006/diagram" xmlns:o="urn:schemas-microsoft-com:office:office" xmlns:v="urn:schemas-microsoft-com:vml" xmlns:pvml="urn:schemas-microsoft-com:office:powerpoint" xmlns:com="http://schemas.openxmlformats.org/drawingml/2006/compatibility" xmlns:p14="http://schemas.microsoft.com/office/powerpoint/2010/main" xmlns:p15="http://schemas.microsoft.com/office/powerpoint/2012/main" xmlns:ahyp="http://schemas.microsoft.com/office/drawing/2018/hyperlinkcolor">
   <p:cSld>
     <p:spTree>
       <p:nvGrpSpPr>
-        <p:cNvPr id="142" name="Shape 142"/>
+        <p:cNvPr id="149" name="Shape 149"/>
         <p:cNvGrpSpPr/>
         <p:nvPr/>
       </p:nvGrpSpPr>
@@ -9306,7 +9693,7 @@
       </p:grpSpPr>
       <p:sp>
         <p:nvSpPr>
-          <p:cNvPr id="143" name="Google Shape;143;p23"/>
+          <p:cNvPr id="150" name="Google Shape;150;p24"/>
           <p:cNvSpPr txBox="1"/>
           <p:nvPr>
             <p:ph type="title"/>
@@ -9346,7 +9733,7 @@
       </p:sp>
       <p:sp>
         <p:nvSpPr>
-          <p:cNvPr id="144" name="Google Shape;144;p23"/>
+          <p:cNvPr id="151" name="Google Shape;151;p24"/>
           <p:cNvSpPr txBox="1"/>
           <p:nvPr>
             <p:ph idx="12" type="sldNum"/>
@@ -9419,7 +9806,7 @@
       </p:sp>
       <p:sp>
         <p:nvSpPr>
-          <p:cNvPr id="145" name="Google Shape;145;p23"/>
+          <p:cNvPr id="152" name="Google Shape;152;p24"/>
           <p:cNvSpPr txBox="1"/>
           <p:nvPr/>
         </p:nvSpPr>
@@ -9474,7 +9861,7 @@
       </p:sp>
       <p:sp>
         <p:nvSpPr>
-          <p:cNvPr id="146" name="Google Shape;146;p23"/>
+          <p:cNvPr id="153" name="Google Shape;153;p24"/>
           <p:cNvSpPr txBox="1"/>
           <p:nvPr>
             <p:ph idx="1" type="body"/>
@@ -9636,311 +10023,6 @@
               <a:t>English only</a:t>
             </a:r>
             <a:endParaRPr/>
-          </a:p>
-        </p:txBody>
-      </p:sp>
-    </p:spTree>
-  </p:cSld>
-  <p:clrMapOvr>
-    <a:masterClrMapping/>
-  </p:clrMapOvr>
-</p:sld>
-</file>
-
-<file path=ppt/slides/slide17.xml><?xml version="1.0" encoding="utf-8"?>
-<p:sld xmlns:a="http://schemas.openxmlformats.org/drawingml/2006/main" xmlns:r="http://schemas.openxmlformats.org/officeDocument/2006/relationships" xmlns:mc="http://schemas.openxmlformats.org/markup-compatibility/2006" xmlns:mv="urn:schemas-microsoft-com:mac:vml" xmlns:p="http://schemas.openxmlformats.org/presentationml/2006/main" xmlns:c="http://schemas.openxmlformats.org/drawingml/2006/chart" xmlns:dgm="http://schemas.openxmlformats.org/drawingml/2006/diagram" xmlns:o="urn:schemas-microsoft-com:office:office" xmlns:v="urn:schemas-microsoft-com:vml" xmlns:pvml="urn:schemas-microsoft-com:office:powerpoint" xmlns:com="http://schemas.openxmlformats.org/drawingml/2006/compatibility" xmlns:p14="http://schemas.microsoft.com/office/powerpoint/2010/main" xmlns:p15="http://schemas.microsoft.com/office/powerpoint/2012/main" xmlns:ahyp="http://schemas.microsoft.com/office/drawing/2018/hyperlinkcolor">
-  <p:cSld>
-    <p:spTree>
-      <p:nvGrpSpPr>
-        <p:cNvPr id="150" name="Shape 150"/>
-        <p:cNvGrpSpPr/>
-        <p:nvPr/>
-      </p:nvGrpSpPr>
-      <p:grpSpPr>
-        <a:xfrm>
-          <a:off x="0" y="0"/>
-          <a:ext cx="0" cy="0"/>
-          <a:chOff x="0" y="0"/>
-          <a:chExt cx="0" cy="0"/>
-        </a:xfrm>
-      </p:grpSpPr>
-      <p:sp>
-        <p:nvSpPr>
-          <p:cNvPr id="151" name="Google Shape;151;p24"/>
-          <p:cNvSpPr txBox="1"/>
-          <p:nvPr>
-            <p:ph type="title"/>
-          </p:nvPr>
-        </p:nvSpPr>
-        <p:spPr>
-          <a:xfrm>
-            <a:off x="0" y="0"/>
-            <a:ext cx="9144000" cy="685800"/>
-          </a:xfrm>
-          <a:prstGeom prst="rect">
-            <a:avLst/>
-          </a:prstGeom>
-        </p:spPr>
-        <p:txBody>
-          <a:bodyPr anchorCtr="0" anchor="ctr" bIns="91425" lIns="274300" spcFirstLastPara="1" rIns="91425" wrap="square" tIns="91425">
-            <a:noAutofit/>
-          </a:bodyPr>
-          <a:lstStyle/>
-          <a:p>
-            <a:pPr indent="0" lvl="0" marL="0" rtl="0" algn="l">
-              <a:spcBef>
-                <a:spcPts val="0"/>
-              </a:spcBef>
-              <a:spcAft>
-                <a:spcPts val="0"/>
-              </a:spcAft>
-              <a:buNone/>
-            </a:pPr>
-            <a:r>
-              <a:rPr lang="en"/>
-              <a:t>Course Organization</a:t>
-            </a:r>
-            <a:endParaRPr/>
-          </a:p>
-        </p:txBody>
-      </p:sp>
-      <p:sp>
-        <p:nvSpPr>
-          <p:cNvPr id="152" name="Google Shape;152;p24"/>
-          <p:cNvSpPr txBox="1"/>
-          <p:nvPr>
-            <p:ph idx="1" type="body"/>
-          </p:nvPr>
-        </p:nvSpPr>
-        <p:spPr>
-          <a:xfrm>
-            <a:off x="274320" y="914400"/>
-            <a:ext cx="8595300" cy="4114800"/>
-          </a:xfrm>
-          <a:prstGeom prst="rect">
-            <a:avLst/>
-          </a:prstGeom>
-        </p:spPr>
-        <p:txBody>
-          <a:bodyPr anchorCtr="0" anchor="t" bIns="0" lIns="0" spcFirstLastPara="1" rIns="0" wrap="square" tIns="0">
-            <a:noAutofit/>
-          </a:bodyPr>
-          <a:lstStyle/>
-          <a:p>
-            <a:pPr indent="0" lvl="0" marL="0" rtl="0" algn="l">
-              <a:spcBef>
-                <a:spcPts val="0"/>
-              </a:spcBef>
-              <a:spcAft>
-                <a:spcPts val="0"/>
-              </a:spcAft>
-              <a:buClr>
-                <a:schemeClr val="dk1"/>
-              </a:buClr>
-              <a:buSzPts val="1100"/>
-              <a:buFont typeface="Arial"/>
-              <a:buNone/>
-            </a:pPr>
-            <a:r>
-              <a:rPr b="1" lang="en"/>
-              <a:t>Course organization</a:t>
-            </a:r>
-            <a:endParaRPr b="1"/>
-          </a:p>
-          <a:p>
-            <a:pPr indent="-342900" lvl="0" marL="457200" rtl="0" algn="l">
-              <a:spcBef>
-                <a:spcPts val="1200"/>
-              </a:spcBef>
-              <a:spcAft>
-                <a:spcPts val="0"/>
-              </a:spcAft>
-              <a:buSzPts val="1800"/>
-              <a:buChar char="●"/>
-            </a:pPr>
-            <a:r>
-              <a:rPr lang="en"/>
-              <a:t>See </a:t>
-            </a:r>
-            <a:r>
-              <a:rPr lang="en" u="sng">
-                <a:solidFill>
-                  <a:schemeClr val="hlink"/>
-                </a:solidFill>
-                <a:hlinkClick r:id="rId3"/>
-              </a:rPr>
-              <a:t>https://nyt.uni1.de</a:t>
-            </a:r>
-            <a:r>
-              <a:rPr lang="en"/>
-              <a:t>   </a:t>
-            </a:r>
-            <a:endParaRPr/>
-          </a:p>
-          <a:p>
-            <a:pPr indent="0" lvl="0" marL="0" rtl="0" algn="l">
-              <a:spcBef>
-                <a:spcPts val="1200"/>
-              </a:spcBef>
-              <a:spcAft>
-                <a:spcPts val="0"/>
-              </a:spcAft>
-              <a:buClr>
-                <a:schemeClr val="dk1"/>
-              </a:buClr>
-              <a:buSzPts val="1100"/>
-              <a:buFont typeface="Arial"/>
-              <a:buNone/>
-            </a:pPr>
-            <a:r>
-              <a:rPr b="1" lang="en"/>
-              <a:t>Course schedule</a:t>
-            </a:r>
-            <a:endParaRPr b="1"/>
-          </a:p>
-          <a:p>
-            <a:pPr indent="-342900" lvl="0" marL="457200" rtl="0" algn="l">
-              <a:spcBef>
-                <a:spcPts val="1200"/>
-              </a:spcBef>
-              <a:spcAft>
-                <a:spcPts val="0"/>
-              </a:spcAft>
-              <a:buSzPts val="1800"/>
-              <a:buChar char="●"/>
-            </a:pPr>
-            <a:r>
-              <a:rPr lang="en"/>
-              <a:t>See </a:t>
-            </a:r>
-            <a:r>
-              <a:rPr b="1" lang="en"/>
-              <a:t>Schedule</a:t>
-            </a:r>
-            <a:r>
-              <a:rPr lang="en"/>
-              <a:t> tab on Course organization doc</a:t>
-            </a:r>
-            <a:endParaRPr/>
-          </a:p>
-          <a:p>
-            <a:pPr indent="0" lvl="0" marL="0" rtl="0" algn="l">
-              <a:spcBef>
-                <a:spcPts val="1200"/>
-              </a:spcBef>
-              <a:spcAft>
-                <a:spcPts val="0"/>
-              </a:spcAft>
-              <a:buClr>
-                <a:schemeClr val="dk1"/>
-              </a:buClr>
-              <a:buSzPts val="1100"/>
-              <a:buFont typeface="Arial"/>
-              <a:buNone/>
-            </a:pPr>
-            <a:r>
-              <a:rPr b="1" lang="en"/>
-              <a:t>Project allocation</a:t>
-            </a:r>
-            <a:endParaRPr b="1"/>
-          </a:p>
-          <a:p>
-            <a:pPr indent="-342900" lvl="0" marL="457200" rtl="0" algn="l">
-              <a:spcBef>
-                <a:spcPts val="1200"/>
-              </a:spcBef>
-              <a:spcAft>
-                <a:spcPts val="0"/>
-              </a:spcAft>
-              <a:buSzPts val="1800"/>
-              <a:buChar char="●"/>
-            </a:pPr>
-            <a:r>
-              <a:rPr lang="en"/>
-              <a:t>See </a:t>
-            </a:r>
-            <a:r>
-              <a:rPr b="1" lang="en"/>
-              <a:t>Projects </a:t>
-            </a:r>
-            <a:r>
-              <a:rPr lang="en"/>
-              <a:t>tab on Course organization doc </a:t>
-            </a:r>
-            <a:endParaRPr/>
-          </a:p>
-        </p:txBody>
-      </p:sp>
-      <p:sp>
-        <p:nvSpPr>
-          <p:cNvPr id="153" name="Google Shape;153;p24"/>
-          <p:cNvSpPr txBox="1"/>
-          <p:nvPr>
-            <p:ph idx="12" type="sldNum"/>
-          </p:nvPr>
-        </p:nvSpPr>
-        <p:spPr>
-          <a:xfrm>
-            <a:off x="7315202" y="4416550"/>
-            <a:ext cx="1828800" cy="731400"/>
-          </a:xfrm>
-          <a:prstGeom prst="rect">
-            <a:avLst/>
-          </a:prstGeom>
-        </p:spPr>
-        <p:txBody>
-          <a:bodyPr anchorCtr="0" anchor="b" bIns="91425" lIns="91425" spcFirstLastPara="1" rIns="91425" wrap="square" tIns="91425">
-            <a:noAutofit/>
-          </a:bodyPr>
-          <a:lstStyle/>
-          <a:p>
-            <a:pPr indent="0" lvl="0" marL="0" rtl="0" algn="r">
-              <a:spcBef>
-                <a:spcPts val="0"/>
-              </a:spcBef>
-              <a:spcAft>
-                <a:spcPts val="0"/>
-              </a:spcAft>
-              <a:buNone/>
-            </a:pPr>
-            <a:fld id="{00000000-1234-1234-1234-123412341234}" type="slidenum">
-              <a:rPr lang="en"/>
-              <a:t>‹#›</a:t>
-            </a:fld>
-            <a:endParaRPr/>
-          </a:p>
-          <a:p>
-            <a:pPr indent="0" lvl="0" marL="0" rtl="0" algn="r">
-              <a:spcBef>
-                <a:spcPts val="0"/>
-              </a:spcBef>
-              <a:spcAft>
-                <a:spcPts val="0"/>
-              </a:spcAft>
-              <a:buNone/>
-            </a:pPr>
-            <a:r>
-              <a:rPr b="0" lang="en" sz="900" u="sng">
-                <a:solidFill>
-                  <a:schemeClr val="hlink"/>
-                </a:solidFill>
-                <a:hlinkClick r:id="rId4"/>
-              </a:rPr>
-              <a:t>https://profriehle.com</a:t>
-            </a:r>
-            <a:r>
-              <a:rPr b="0" lang="en" sz="900">
-                <a:solidFill>
-                  <a:schemeClr val="dk2"/>
-                </a:solidFill>
-              </a:rPr>
-              <a:t> </a:t>
-            </a:r>
-            <a:endParaRPr b="0" sz="900">
-              <a:solidFill>
-                <a:schemeClr val="dk2"/>
-              </a:solidFill>
-            </a:endParaRPr>
           </a:p>
         </p:txBody>
       </p:sp>
@@ -10003,7 +10085,7 @@
             </a:pPr>
             <a:r>
               <a:rPr lang="en"/>
-              <a:t>Work Rhythm</a:t>
+              <a:t>Course Organization</a:t>
             </a:r>
             <a:endParaRPr/>
           </a:p>
@@ -10012,6 +10094,173 @@
       <p:sp>
         <p:nvSpPr>
           <p:cNvPr id="159" name="Google Shape;159;p25"/>
+          <p:cNvSpPr txBox="1"/>
+          <p:nvPr>
+            <p:ph idx="1" type="body"/>
+          </p:nvPr>
+        </p:nvSpPr>
+        <p:spPr>
+          <a:xfrm>
+            <a:off x="274320" y="914400"/>
+            <a:ext cx="8595300" cy="4114800"/>
+          </a:xfrm>
+          <a:prstGeom prst="rect">
+            <a:avLst/>
+          </a:prstGeom>
+        </p:spPr>
+        <p:txBody>
+          <a:bodyPr anchorCtr="0" anchor="t" bIns="0" lIns="0" spcFirstLastPara="1" rIns="0" wrap="square" tIns="0">
+            <a:noAutofit/>
+          </a:bodyPr>
+          <a:lstStyle/>
+          <a:p>
+            <a:pPr indent="0" lvl="0" marL="0" rtl="0" algn="l">
+              <a:spcBef>
+                <a:spcPts val="0"/>
+              </a:spcBef>
+              <a:spcAft>
+                <a:spcPts val="0"/>
+              </a:spcAft>
+              <a:buClr>
+                <a:schemeClr val="dk1"/>
+              </a:buClr>
+              <a:buSzPts val="1100"/>
+              <a:buFont typeface="Arial"/>
+              <a:buNone/>
+            </a:pPr>
+            <a:r>
+              <a:rPr b="1" lang="en"/>
+              <a:t>Course organization</a:t>
+            </a:r>
+            <a:endParaRPr b="1"/>
+          </a:p>
+          <a:p>
+            <a:pPr indent="-342900" lvl="0" marL="457200" rtl="0" algn="l">
+              <a:spcBef>
+                <a:spcPts val="1200"/>
+              </a:spcBef>
+              <a:spcAft>
+                <a:spcPts val="0"/>
+              </a:spcAft>
+              <a:buSzPts val="1800"/>
+              <a:buChar char="●"/>
+            </a:pPr>
+            <a:r>
+              <a:rPr lang="en"/>
+              <a:t>See </a:t>
+            </a:r>
+            <a:r>
+              <a:rPr lang="en" u="sng">
+                <a:solidFill>
+                  <a:schemeClr val="hlink"/>
+                </a:solidFill>
+                <a:hlinkClick r:id="rId3"/>
+              </a:rPr>
+              <a:t>https://nyt.uni1.de</a:t>
+            </a:r>
+            <a:r>
+              <a:rPr lang="en"/>
+              <a:t>   </a:t>
+            </a:r>
+            <a:endParaRPr/>
+          </a:p>
+          <a:p>
+            <a:pPr indent="0" lvl="0" marL="0" rtl="0" algn="l">
+              <a:spcBef>
+                <a:spcPts val="1200"/>
+              </a:spcBef>
+              <a:spcAft>
+                <a:spcPts val="0"/>
+              </a:spcAft>
+              <a:buClr>
+                <a:schemeClr val="dk1"/>
+              </a:buClr>
+              <a:buSzPts val="1100"/>
+              <a:buFont typeface="Arial"/>
+              <a:buNone/>
+            </a:pPr>
+            <a:r>
+              <a:rPr b="1" lang="en"/>
+              <a:t>Course schedule</a:t>
+            </a:r>
+            <a:endParaRPr b="1"/>
+          </a:p>
+          <a:p>
+            <a:pPr indent="-342900" lvl="0" marL="457200" rtl="0" algn="l">
+              <a:spcBef>
+                <a:spcPts val="1200"/>
+              </a:spcBef>
+              <a:spcAft>
+                <a:spcPts val="0"/>
+              </a:spcAft>
+              <a:buSzPts val="1800"/>
+              <a:buChar char="●"/>
+            </a:pPr>
+            <a:r>
+              <a:rPr lang="en"/>
+              <a:t>See </a:t>
+            </a:r>
+            <a:r>
+              <a:rPr b="1" lang="en"/>
+              <a:t>Schedule</a:t>
+            </a:r>
+            <a:r>
+              <a:rPr lang="en"/>
+              <a:t> tab on Course organization doc</a:t>
+            </a:r>
+            <a:endParaRPr/>
+          </a:p>
+          <a:p>
+            <a:pPr indent="0" lvl="0" marL="0" rtl="0" algn="l">
+              <a:spcBef>
+                <a:spcPts val="1200"/>
+              </a:spcBef>
+              <a:spcAft>
+                <a:spcPts val="0"/>
+              </a:spcAft>
+              <a:buClr>
+                <a:schemeClr val="dk1"/>
+              </a:buClr>
+              <a:buSzPts val="1100"/>
+              <a:buFont typeface="Arial"/>
+              <a:buNone/>
+            </a:pPr>
+            <a:r>
+              <a:rPr b="1" lang="en"/>
+              <a:t>Project allocation</a:t>
+            </a:r>
+            <a:endParaRPr b="1"/>
+          </a:p>
+          <a:p>
+            <a:pPr indent="-342900" lvl="0" marL="457200" rtl="0" algn="l">
+              <a:spcBef>
+                <a:spcPts val="1200"/>
+              </a:spcBef>
+              <a:spcAft>
+                <a:spcPts val="0"/>
+              </a:spcAft>
+              <a:buSzPts val="1800"/>
+              <a:buChar char="●"/>
+            </a:pPr>
+            <a:r>
+              <a:rPr lang="en"/>
+              <a:t>See </a:t>
+            </a:r>
+            <a:r>
+              <a:rPr b="1" lang="en"/>
+              <a:t>Projects </a:t>
+            </a:r>
+            <a:r>
+              <a:rPr lang="en"/>
+              <a:t>tab on Course organization doc </a:t>
+            </a:r>
+            <a:endParaRPr/>
+          </a:p>
+        </p:txBody>
+      </p:sp>
+      <p:sp>
+        <p:nvSpPr>
+          <p:cNvPr id="160" name="Google Shape;160;p25"/>
           <p:cNvSpPr txBox="1"/>
           <p:nvPr>
             <p:ph idx="12" type="sldNum"/>
@@ -10062,7 +10311,7 @@
                 <a:solidFill>
                   <a:schemeClr val="hlink"/>
                 </a:solidFill>
-                <a:hlinkClick r:id="rId3"/>
+                <a:hlinkClick r:id="rId4"/>
               </a:rPr>
               <a:t>https://profriehle.com</a:t>
             </a:r>
@@ -10079,195 +10328,6 @@
                 <a:schemeClr val="dk2"/>
               </a:solidFill>
             </a:endParaRPr>
-          </a:p>
-        </p:txBody>
-      </p:sp>
-      <p:sp>
-        <p:nvSpPr>
-          <p:cNvPr id="160" name="Google Shape;160;p25"/>
-          <p:cNvSpPr txBox="1"/>
-          <p:nvPr>
-            <p:ph idx="1" type="body"/>
-          </p:nvPr>
-        </p:nvSpPr>
-        <p:spPr>
-          <a:xfrm>
-            <a:off x="274320" y="914400"/>
-            <a:ext cx="8595300" cy="4114800"/>
-          </a:xfrm>
-          <a:prstGeom prst="rect">
-            <a:avLst/>
-          </a:prstGeom>
-        </p:spPr>
-        <p:txBody>
-          <a:bodyPr anchorCtr="0" anchor="t" bIns="0" lIns="0" spcFirstLastPara="1" rIns="0" wrap="square" tIns="0">
-            <a:noAutofit/>
-          </a:bodyPr>
-          <a:lstStyle/>
-          <a:p>
-            <a:pPr indent="0" lvl="0" marL="0" rtl="0" algn="l">
-              <a:spcBef>
-                <a:spcPts val="0"/>
-              </a:spcBef>
-              <a:spcAft>
-                <a:spcPts val="0"/>
-              </a:spcAft>
-              <a:buNone/>
-            </a:pPr>
-            <a:r>
-              <a:rPr b="1" lang="en"/>
-              <a:t>Lecture (class)</a:t>
-            </a:r>
-            <a:endParaRPr b="1"/>
-          </a:p>
-          <a:p>
-            <a:pPr indent="-342900" lvl="0" marL="457200" rtl="0" algn="l">
-              <a:spcBef>
-                <a:spcPts val="1200"/>
-              </a:spcBef>
-              <a:spcAft>
-                <a:spcPts val="0"/>
-              </a:spcAft>
-              <a:buSzPts val="1800"/>
-              <a:buChar char="●"/>
-            </a:pPr>
-            <a:r>
-              <a:rPr lang="en"/>
-              <a:t>Review of last week (quiz)</a:t>
-            </a:r>
-            <a:endParaRPr/>
-          </a:p>
-          <a:p>
-            <a:pPr indent="-342900" lvl="0" marL="457200" rtl="0" algn="l">
-              <a:spcBef>
-                <a:spcPts val="0"/>
-              </a:spcBef>
-              <a:spcAft>
-                <a:spcPts val="0"/>
-              </a:spcAft>
-              <a:buSzPts val="1800"/>
-              <a:buChar char="●"/>
-            </a:pPr>
-            <a:r>
-              <a:rPr lang="en"/>
-              <a:t>Presentation of this week’s topic</a:t>
-            </a:r>
-            <a:endParaRPr/>
-          </a:p>
-          <a:p>
-            <a:pPr indent="0" lvl="0" marL="0" rtl="0" algn="l">
-              <a:spcBef>
-                <a:spcPts val="1200"/>
-              </a:spcBef>
-              <a:spcAft>
-                <a:spcPts val="0"/>
-              </a:spcAft>
-              <a:buNone/>
-            </a:pPr>
-            <a:r>
-              <a:rPr b="1" lang="en"/>
-              <a:t>Method exercise</a:t>
-            </a:r>
-            <a:endParaRPr b="1"/>
-          </a:p>
-          <a:p>
-            <a:pPr indent="-342900" lvl="0" marL="457200" rtl="0" algn="l">
-              <a:spcBef>
-                <a:spcPts val="1200"/>
-              </a:spcBef>
-              <a:spcAft>
-                <a:spcPts val="0"/>
-              </a:spcAft>
-              <a:buSzPts val="1800"/>
-              <a:buChar char="●"/>
-            </a:pPr>
-            <a:r>
-              <a:rPr lang="en"/>
-              <a:t>Discussion of articles</a:t>
-            </a:r>
-            <a:endParaRPr/>
-          </a:p>
-          <a:p>
-            <a:pPr indent="-342900" lvl="0" marL="457200" rtl="0" algn="l">
-              <a:spcBef>
-                <a:spcPts val="0"/>
-              </a:spcBef>
-              <a:spcAft>
-                <a:spcPts val="0"/>
-              </a:spcAft>
-              <a:buSzPts val="1800"/>
-              <a:buChar char="●"/>
-            </a:pPr>
-            <a:r>
-              <a:rPr lang="en"/>
-              <a:t>Discussion of homework</a:t>
-            </a:r>
-            <a:endParaRPr/>
-          </a:p>
-          <a:p>
-            <a:pPr indent="0" lvl="0" marL="0" rtl="0" algn="l">
-              <a:spcBef>
-                <a:spcPts val="1200"/>
-              </a:spcBef>
-              <a:spcAft>
-                <a:spcPts val="0"/>
-              </a:spcAft>
-              <a:buNone/>
-            </a:pPr>
-            <a:r>
-              <a:rPr b="1" lang="en"/>
-              <a:t>Written homework</a:t>
-            </a:r>
-            <a:endParaRPr b="1"/>
-          </a:p>
-          <a:p>
-            <a:pPr indent="-342900" lvl="0" marL="457200" rtl="0" algn="l">
-              <a:spcBef>
-                <a:spcPts val="1200"/>
-              </a:spcBef>
-              <a:spcAft>
-                <a:spcPts val="0"/>
-              </a:spcAft>
-              <a:buSzPts val="1800"/>
-              <a:buChar char="●"/>
-            </a:pPr>
-            <a:r>
-              <a:rPr lang="en"/>
-              <a:t>See Course organization doc</a:t>
-            </a:r>
-            <a:endParaRPr/>
-          </a:p>
-          <a:p>
-            <a:pPr indent="-342900" lvl="0" marL="457200" rtl="0" algn="l">
-              <a:spcBef>
-                <a:spcPts val="0"/>
-              </a:spcBef>
-              <a:spcAft>
-                <a:spcPts val="0"/>
-              </a:spcAft>
-              <a:buSzPts val="1800"/>
-              <a:buChar char="●"/>
-            </a:pPr>
-            <a:r>
-              <a:rPr lang="en"/>
-              <a:t>Self-organized</a:t>
-            </a:r>
-            <a:endParaRPr/>
-          </a:p>
-          <a:p>
-            <a:pPr indent="0" lvl="0" marL="0" rtl="0" algn="l">
-              <a:spcBef>
-                <a:spcPts val="1200"/>
-              </a:spcBef>
-              <a:spcAft>
-                <a:spcPts val="1200"/>
-              </a:spcAft>
-              <a:buNone/>
-            </a:pPr>
-            <a:r>
-              <a:t/>
-            </a:r>
-            <a:endParaRPr/>
           </a:p>
         </p:txBody>
       </p:sp>
@@ -10330,7 +10390,7 @@
             </a:pPr>
             <a:r>
               <a:rPr lang="en"/>
-              <a:t>Course Communication</a:t>
+              <a:t>Work Rhythm</a:t>
             </a:r>
             <a:endParaRPr/>
           </a:p>
@@ -10339,6 +10399,79 @@
       <p:sp>
         <p:nvSpPr>
           <p:cNvPr id="166" name="Google Shape;166;p26"/>
+          <p:cNvSpPr txBox="1"/>
+          <p:nvPr>
+            <p:ph idx="12" type="sldNum"/>
+          </p:nvPr>
+        </p:nvSpPr>
+        <p:spPr>
+          <a:xfrm>
+            <a:off x="7315202" y="4416550"/>
+            <a:ext cx="1828800" cy="731400"/>
+          </a:xfrm>
+          <a:prstGeom prst="rect">
+            <a:avLst/>
+          </a:prstGeom>
+        </p:spPr>
+        <p:txBody>
+          <a:bodyPr anchorCtr="0" anchor="b" bIns="91425" lIns="91425" spcFirstLastPara="1" rIns="91425" wrap="square" tIns="91425">
+            <a:noAutofit/>
+          </a:bodyPr>
+          <a:lstStyle/>
+          <a:p>
+            <a:pPr indent="0" lvl="0" marL="0" rtl="0" algn="r">
+              <a:spcBef>
+                <a:spcPts val="0"/>
+              </a:spcBef>
+              <a:spcAft>
+                <a:spcPts val="0"/>
+              </a:spcAft>
+              <a:buNone/>
+            </a:pPr>
+            <a:fld id="{00000000-1234-1234-1234-123412341234}" type="slidenum">
+              <a:rPr lang="en"/>
+              <a:t>‹#›</a:t>
+            </a:fld>
+            <a:endParaRPr/>
+          </a:p>
+          <a:p>
+            <a:pPr indent="0" lvl="0" marL="0" rtl="0" algn="r">
+              <a:spcBef>
+                <a:spcPts val="0"/>
+              </a:spcBef>
+              <a:spcAft>
+                <a:spcPts val="0"/>
+              </a:spcAft>
+              <a:buNone/>
+            </a:pPr>
+            <a:r>
+              <a:rPr b="0" lang="en" sz="900" u="sng">
+                <a:solidFill>
+                  <a:schemeClr val="hlink"/>
+                </a:solidFill>
+                <a:hlinkClick r:id="rId3"/>
+              </a:rPr>
+              <a:t>https://profriehle.com</a:t>
+            </a:r>
+            <a:r>
+              <a:rPr b="0" lang="en" sz="900">
+                <a:solidFill>
+                  <a:schemeClr val="dk2"/>
+                </a:solidFill>
+              </a:rPr>
+              <a:t> </a:t>
+            </a:r>
+            <a:endParaRPr b="0" sz="900">
+              <a:solidFill>
+                <a:schemeClr val="dk2"/>
+              </a:solidFill>
+            </a:endParaRPr>
+          </a:p>
+        </p:txBody>
+      </p:sp>
+      <p:sp>
+        <p:nvSpPr>
+          <p:cNvPr id="167" name="Google Shape;167;p26"/>
           <p:cNvSpPr txBox="1"/>
           <p:nvPr>
             <p:ph idx="1" type="body"/>
@@ -10366,18 +10499,13 @@
               <a:spcAft>
                 <a:spcPts val="0"/>
               </a:spcAft>
-              <a:buClr>
-                <a:schemeClr val="dk1"/>
-              </a:buClr>
-              <a:buSzPts val="1100"/>
-              <a:buFont typeface="Arial"/>
-              <a:buNone/>
-            </a:pPr>
-            <a:r>
-              <a:rPr lang="en"/>
-              <a:t>Announcements by email</a:t>
-            </a:r>
-            <a:endParaRPr/>
+              <a:buNone/>
+            </a:pPr>
+            <a:r>
+              <a:rPr b="1" lang="en"/>
+              <a:t>Lecture (class)</a:t>
+            </a:r>
+            <a:endParaRPr b="1"/>
           </a:p>
           <a:p>
             <a:pPr indent="-342900" lvl="0" marL="457200" rtl="0" algn="l">
@@ -10392,30 +10520,14 @@
             </a:pPr>
             <a:r>
               <a:rPr lang="en"/>
-              <a:t>Through course management system</a:t>
-            </a:r>
-            <a:endParaRPr/>
-          </a:p>
-          <a:p>
-            <a:pPr indent="0" lvl="0" marL="0" rtl="0" algn="l">
-              <a:spcBef>
-                <a:spcPts val="1200"/>
-              </a:spcBef>
-              <a:spcAft>
-                <a:spcPts val="0"/>
-              </a:spcAft>
-              <a:buNone/>
-            </a:pPr>
-            <a:r>
-              <a:rPr lang="en"/>
-              <a:t>Questions to teaching team</a:t>
+              <a:t>Review of last week (quiz)</a:t>
             </a:r>
             <a:endParaRPr/>
           </a:p>
           <a:p>
             <a:pPr indent="-342900" lvl="0" marL="457200" rtl="0" algn="l">
               <a:spcBef>
-                <a:spcPts val="1200"/>
+                <a:spcPts val="0"/>
               </a:spcBef>
               <a:spcAft>
                 <a:spcPts val="0"/>
@@ -10425,14 +10537,30 @@
             </a:pPr>
             <a:r>
               <a:rPr lang="en"/>
-              <a:t>Please ask your question in the course forum</a:t>
-            </a:r>
-            <a:endParaRPr/>
+              <a:t>Presentation of this week’s topic</a:t>
+            </a:r>
+            <a:endParaRPr/>
+          </a:p>
+          <a:p>
+            <a:pPr indent="0" lvl="0" marL="0" rtl="0" algn="l">
+              <a:spcBef>
+                <a:spcPts val="1200"/>
+              </a:spcBef>
+              <a:spcAft>
+                <a:spcPts val="0"/>
+              </a:spcAft>
+              <a:buNone/>
+            </a:pPr>
+            <a:r>
+              <a:rPr b="1" lang="en"/>
+              <a:t>Method exercise</a:t>
+            </a:r>
+            <a:endParaRPr b="1"/>
           </a:p>
           <a:p>
             <a:pPr indent="-342900" lvl="0" marL="457200" rtl="0" algn="l">
               <a:spcBef>
-                <a:spcPts val="0"/>
+                <a:spcPts val="1200"/>
               </a:spcBef>
               <a:spcAft>
                 <a:spcPts val="0"/>
@@ -10442,7 +10570,24 @@
             </a:pPr>
             <a:r>
               <a:rPr lang="en"/>
-              <a:t>For private questions, use the teaching team email alias</a:t>
+              <a:t>Discussion of articles</a:t>
+            </a:r>
+            <a:endParaRPr/>
+          </a:p>
+          <a:p>
+            <a:pPr indent="-342900" lvl="0" marL="457200" rtl="0" algn="l">
+              <a:spcBef>
+                <a:spcPts val="0"/>
+              </a:spcBef>
+              <a:spcAft>
+                <a:spcPts val="0"/>
+              </a:spcAft>
+              <a:buSzPts val="1800"/>
+              <a:buChar char="●"/>
+            </a:pPr>
+            <a:r>
+              <a:rPr lang="en"/>
+              <a:t>Discussion of homework</a:t>
             </a:r>
             <a:endParaRPr/>
           </a:p>
@@ -10454,105 +10599,62 @@
               <a:spcAft>
                 <a:spcPts val="0"/>
               </a:spcAft>
-              <a:buClr>
-                <a:schemeClr val="dk1"/>
-              </a:buClr>
-              <a:buSzPts val="1100"/>
-              <a:buFont typeface="Arial"/>
+              <a:buNone/>
+            </a:pPr>
+            <a:r>
+              <a:rPr b="1" lang="en"/>
+              <a:t>Written homework</a:t>
+            </a:r>
+            <a:endParaRPr b="1"/>
+          </a:p>
+          <a:p>
+            <a:pPr indent="-342900" lvl="0" marL="457200" rtl="0" algn="l">
+              <a:spcBef>
+                <a:spcPts val="1200"/>
+              </a:spcBef>
+              <a:spcAft>
+                <a:spcPts val="0"/>
+              </a:spcAft>
+              <a:buSzPts val="1800"/>
+              <a:buChar char="●"/>
+            </a:pPr>
+            <a:r>
+              <a:rPr lang="en"/>
+              <a:t>See Course organization doc</a:t>
+            </a:r>
+            <a:endParaRPr/>
+          </a:p>
+          <a:p>
+            <a:pPr indent="-342900" lvl="0" marL="457200" rtl="0" algn="l">
+              <a:spcBef>
+                <a:spcPts val="0"/>
+              </a:spcBef>
+              <a:spcAft>
+                <a:spcPts val="0"/>
+              </a:spcAft>
+              <a:buSzPts val="1800"/>
+              <a:buChar char="●"/>
+            </a:pPr>
+            <a:r>
+              <a:rPr lang="en"/>
+              <a:t>Self-organized</a:t>
+            </a:r>
+            <a:endParaRPr/>
+          </a:p>
+          <a:p>
+            <a:pPr indent="0" lvl="0" marL="0" rtl="0" algn="l">
+              <a:spcBef>
+                <a:spcPts val="1200"/>
+              </a:spcBef>
+              <a:spcAft>
+                <a:spcPts val="1200"/>
+              </a:spcAft>
               <a:buNone/>
             </a:pPr>
             <a:r>
               <a:t/>
             </a:r>
             <a:endParaRPr/>
-          </a:p>
-          <a:p>
-            <a:pPr indent="0" lvl="0" marL="0" rtl="0" algn="l">
-              <a:spcBef>
-                <a:spcPts val="1200"/>
-              </a:spcBef>
-              <a:spcAft>
-                <a:spcPts val="1200"/>
-              </a:spcAft>
-              <a:buNone/>
-            </a:pPr>
-            <a:r>
-              <a:t/>
-            </a:r>
-            <a:endParaRPr/>
-          </a:p>
-        </p:txBody>
-      </p:sp>
-      <p:sp>
-        <p:nvSpPr>
-          <p:cNvPr id="167" name="Google Shape;167;p26"/>
-          <p:cNvSpPr txBox="1"/>
-          <p:nvPr>
-            <p:ph idx="12" type="sldNum"/>
-          </p:nvPr>
-        </p:nvSpPr>
-        <p:spPr>
-          <a:xfrm>
-            <a:off x="7315202" y="4416550"/>
-            <a:ext cx="1828800" cy="731400"/>
-          </a:xfrm>
-          <a:prstGeom prst="rect">
-            <a:avLst/>
-          </a:prstGeom>
-        </p:spPr>
-        <p:txBody>
-          <a:bodyPr anchorCtr="0" anchor="b" bIns="91425" lIns="91425" spcFirstLastPara="1" rIns="91425" wrap="square" tIns="91425">
-            <a:noAutofit/>
-          </a:bodyPr>
-          <a:lstStyle/>
-          <a:p>
-            <a:pPr indent="0" lvl="0" marL="0" rtl="0" algn="r">
-              <a:spcBef>
-                <a:spcPts val="0"/>
-              </a:spcBef>
-              <a:spcAft>
-                <a:spcPts val="0"/>
-              </a:spcAft>
-              <a:buNone/>
-            </a:pPr>
-            <a:fld id="{00000000-1234-1234-1234-123412341234}" type="slidenum">
-              <a:rPr lang="en"/>
-              <a:t>‹#›</a:t>
-            </a:fld>
-            <a:endParaRPr/>
-          </a:p>
-          <a:p>
-            <a:pPr indent="0" lvl="0" marL="0" rtl="0" algn="r">
-              <a:spcBef>
-                <a:spcPts val="0"/>
-              </a:spcBef>
-              <a:spcAft>
-                <a:spcPts val="0"/>
-              </a:spcAft>
-              <a:buNone/>
-            </a:pPr>
-            <a:r>
-              <a:rPr b="0" lang="en" sz="900" u="sng">
-                <a:solidFill>
-                  <a:schemeClr val="hlink"/>
-                </a:solidFill>
-                <a:hlinkClick r:id="rId3"/>
-              </a:rPr>
-              <a:t>https://profriehle.com</a:t>
-            </a:r>
-            <a:r>
-              <a:rPr b="0" lang="en" sz="900">
-                <a:solidFill>
-                  <a:schemeClr val="dk2"/>
-                </a:solidFill>
-              </a:rPr>
-              <a:t> </a:t>
-            </a:r>
-            <a:endParaRPr b="0" sz="900">
-              <a:solidFill>
-                <a:schemeClr val="dk2"/>
-              </a:solidFill>
-            </a:endParaRPr>
           </a:p>
         </p:txBody>
       </p:sp>
@@ -10899,6 +11001,272 @@
           <p:cNvPr id="172" name="Google Shape;172;p27"/>
           <p:cNvSpPr txBox="1"/>
           <p:nvPr>
+            <p:ph type="title"/>
+          </p:nvPr>
+        </p:nvSpPr>
+        <p:spPr>
+          <a:xfrm>
+            <a:off x="0" y="0"/>
+            <a:ext cx="9144000" cy="685800"/>
+          </a:xfrm>
+          <a:prstGeom prst="rect">
+            <a:avLst/>
+          </a:prstGeom>
+        </p:spPr>
+        <p:txBody>
+          <a:bodyPr anchorCtr="0" anchor="ctr" bIns="91425" lIns="274300" spcFirstLastPara="1" rIns="91425" wrap="square" tIns="91425">
+            <a:noAutofit/>
+          </a:bodyPr>
+          <a:lstStyle/>
+          <a:p>
+            <a:pPr indent="0" lvl="0" marL="0" rtl="0" algn="l">
+              <a:spcBef>
+                <a:spcPts val="0"/>
+              </a:spcBef>
+              <a:spcAft>
+                <a:spcPts val="0"/>
+              </a:spcAft>
+              <a:buNone/>
+            </a:pPr>
+            <a:r>
+              <a:rPr lang="en"/>
+              <a:t>Course Communication</a:t>
+            </a:r>
+            <a:endParaRPr/>
+          </a:p>
+        </p:txBody>
+      </p:sp>
+      <p:sp>
+        <p:nvSpPr>
+          <p:cNvPr id="173" name="Google Shape;173;p27"/>
+          <p:cNvSpPr txBox="1"/>
+          <p:nvPr>
+            <p:ph idx="1" type="body"/>
+          </p:nvPr>
+        </p:nvSpPr>
+        <p:spPr>
+          <a:xfrm>
+            <a:off x="274320" y="914400"/>
+            <a:ext cx="8595300" cy="4114800"/>
+          </a:xfrm>
+          <a:prstGeom prst="rect">
+            <a:avLst/>
+          </a:prstGeom>
+        </p:spPr>
+        <p:txBody>
+          <a:bodyPr anchorCtr="0" anchor="t" bIns="0" lIns="0" spcFirstLastPara="1" rIns="0" wrap="square" tIns="0">
+            <a:noAutofit/>
+          </a:bodyPr>
+          <a:lstStyle/>
+          <a:p>
+            <a:pPr indent="0" lvl="0" marL="0" rtl="0" algn="l">
+              <a:spcBef>
+                <a:spcPts val="0"/>
+              </a:spcBef>
+              <a:spcAft>
+                <a:spcPts val="0"/>
+              </a:spcAft>
+              <a:buClr>
+                <a:schemeClr val="dk1"/>
+              </a:buClr>
+              <a:buSzPts val="1100"/>
+              <a:buFont typeface="Arial"/>
+              <a:buNone/>
+            </a:pPr>
+            <a:r>
+              <a:rPr lang="en"/>
+              <a:t>Announcements by email</a:t>
+            </a:r>
+            <a:endParaRPr/>
+          </a:p>
+          <a:p>
+            <a:pPr indent="-342900" lvl="0" marL="457200" rtl="0" algn="l">
+              <a:spcBef>
+                <a:spcPts val="1200"/>
+              </a:spcBef>
+              <a:spcAft>
+                <a:spcPts val="0"/>
+              </a:spcAft>
+              <a:buSzPts val="1800"/>
+              <a:buChar char="●"/>
+            </a:pPr>
+            <a:r>
+              <a:rPr lang="en"/>
+              <a:t>Through course management system</a:t>
+            </a:r>
+            <a:endParaRPr/>
+          </a:p>
+          <a:p>
+            <a:pPr indent="0" lvl="0" marL="0" rtl="0" algn="l">
+              <a:spcBef>
+                <a:spcPts val="1200"/>
+              </a:spcBef>
+              <a:spcAft>
+                <a:spcPts val="0"/>
+              </a:spcAft>
+              <a:buNone/>
+            </a:pPr>
+            <a:r>
+              <a:rPr lang="en"/>
+              <a:t>Questions to teaching team</a:t>
+            </a:r>
+            <a:endParaRPr/>
+          </a:p>
+          <a:p>
+            <a:pPr indent="-342900" lvl="0" marL="457200" rtl="0" algn="l">
+              <a:spcBef>
+                <a:spcPts val="1200"/>
+              </a:spcBef>
+              <a:spcAft>
+                <a:spcPts val="0"/>
+              </a:spcAft>
+              <a:buSzPts val="1800"/>
+              <a:buChar char="●"/>
+            </a:pPr>
+            <a:r>
+              <a:rPr lang="en"/>
+              <a:t>Please ask your question in the course forum</a:t>
+            </a:r>
+            <a:endParaRPr/>
+          </a:p>
+          <a:p>
+            <a:pPr indent="-342900" lvl="0" marL="457200" rtl="0" algn="l">
+              <a:spcBef>
+                <a:spcPts val="0"/>
+              </a:spcBef>
+              <a:spcAft>
+                <a:spcPts val="0"/>
+              </a:spcAft>
+              <a:buSzPts val="1800"/>
+              <a:buChar char="●"/>
+            </a:pPr>
+            <a:r>
+              <a:rPr lang="en"/>
+              <a:t>For private questions, use the teaching team email alias</a:t>
+            </a:r>
+            <a:endParaRPr/>
+          </a:p>
+          <a:p>
+            <a:pPr indent="0" lvl="0" marL="0" rtl="0" algn="l">
+              <a:spcBef>
+                <a:spcPts val="1200"/>
+              </a:spcBef>
+              <a:spcAft>
+                <a:spcPts val="1200"/>
+              </a:spcAft>
+              <a:buNone/>
+            </a:pPr>
+            <a:r>
+              <a:rPr lang="en"/>
+              <a:t>Non-urgent questions will be answered in class</a:t>
+            </a:r>
+            <a:endParaRPr/>
+          </a:p>
+        </p:txBody>
+      </p:sp>
+      <p:sp>
+        <p:nvSpPr>
+          <p:cNvPr id="174" name="Google Shape;174;p27"/>
+          <p:cNvSpPr txBox="1"/>
+          <p:nvPr>
+            <p:ph idx="12" type="sldNum"/>
+          </p:nvPr>
+        </p:nvSpPr>
+        <p:spPr>
+          <a:xfrm>
+            <a:off x="7315202" y="4416550"/>
+            <a:ext cx="1828800" cy="731400"/>
+          </a:xfrm>
+          <a:prstGeom prst="rect">
+            <a:avLst/>
+          </a:prstGeom>
+        </p:spPr>
+        <p:txBody>
+          <a:bodyPr anchorCtr="0" anchor="b" bIns="91425" lIns="91425" spcFirstLastPara="1" rIns="91425" wrap="square" tIns="91425">
+            <a:noAutofit/>
+          </a:bodyPr>
+          <a:lstStyle/>
+          <a:p>
+            <a:pPr indent="0" lvl="0" marL="0" rtl="0" algn="r">
+              <a:spcBef>
+                <a:spcPts val="0"/>
+              </a:spcBef>
+              <a:spcAft>
+                <a:spcPts val="0"/>
+              </a:spcAft>
+              <a:buNone/>
+            </a:pPr>
+            <a:fld id="{00000000-1234-1234-1234-123412341234}" type="slidenum">
+              <a:rPr lang="en"/>
+              <a:t>‹#›</a:t>
+            </a:fld>
+            <a:endParaRPr/>
+          </a:p>
+          <a:p>
+            <a:pPr indent="0" lvl="0" marL="0" rtl="0" algn="r">
+              <a:spcBef>
+                <a:spcPts val="0"/>
+              </a:spcBef>
+              <a:spcAft>
+                <a:spcPts val="0"/>
+              </a:spcAft>
+              <a:buNone/>
+            </a:pPr>
+            <a:r>
+              <a:rPr b="0" lang="en" sz="900" u="sng">
+                <a:solidFill>
+                  <a:schemeClr val="hlink"/>
+                </a:solidFill>
+                <a:hlinkClick r:id="rId3"/>
+              </a:rPr>
+              <a:t>https://profriehle.com</a:t>
+            </a:r>
+            <a:r>
+              <a:rPr b="0" lang="en" sz="900">
+                <a:solidFill>
+                  <a:schemeClr val="dk2"/>
+                </a:solidFill>
+              </a:rPr>
+              <a:t> </a:t>
+            </a:r>
+            <a:endParaRPr b="0" sz="900">
+              <a:solidFill>
+                <a:schemeClr val="dk2"/>
+              </a:solidFill>
+            </a:endParaRPr>
+          </a:p>
+        </p:txBody>
+      </p:sp>
+    </p:spTree>
+  </p:cSld>
+  <p:clrMapOvr>
+    <a:masterClrMapping/>
+  </p:clrMapOvr>
+</p:sld>
+</file>
+
+<file path=ppt/slides/slide21.xml><?xml version="1.0" encoding="utf-8"?>
+<p:sld xmlns:a="http://schemas.openxmlformats.org/drawingml/2006/main" xmlns:r="http://schemas.openxmlformats.org/officeDocument/2006/relationships" xmlns:mc="http://schemas.openxmlformats.org/markup-compatibility/2006" xmlns:mv="urn:schemas-microsoft-com:mac:vml" xmlns:p="http://schemas.openxmlformats.org/presentationml/2006/main" xmlns:c="http://schemas.openxmlformats.org/drawingml/2006/chart" xmlns:dgm="http://schemas.openxmlformats.org/drawingml/2006/diagram" xmlns:o="urn:schemas-microsoft-com:office:office" xmlns:v="urn:schemas-microsoft-com:vml" xmlns:pvml="urn:schemas-microsoft-com:office:powerpoint" xmlns:com="http://schemas.openxmlformats.org/drawingml/2006/compatibility" xmlns:p14="http://schemas.microsoft.com/office/powerpoint/2010/main" xmlns:p15="http://schemas.microsoft.com/office/powerpoint/2012/main" xmlns:ahyp="http://schemas.microsoft.com/office/drawing/2018/hyperlinkcolor">
+  <p:cSld>
+    <p:spTree>
+      <p:nvGrpSpPr>
+        <p:cNvPr id="178" name="Shape 178"/>
+        <p:cNvGrpSpPr/>
+        <p:nvPr/>
+      </p:nvGrpSpPr>
+      <p:grpSpPr>
+        <a:xfrm>
+          <a:off x="0" y="0"/>
+          <a:ext cx="0" cy="0"/>
+          <a:chOff x="0" y="0"/>
+          <a:chExt cx="0" cy="0"/>
+        </a:xfrm>
+      </p:grpSpPr>
+      <p:sp>
+        <p:nvSpPr>
+          <p:cNvPr id="179" name="Google Shape;179;p28"/>
+          <p:cNvSpPr txBox="1"/>
+          <p:nvPr>
             <p:ph type="ctrTitle"/>
           </p:nvPr>
         </p:nvSpPr>
@@ -10936,7 +11304,7 @@
       </p:sp>
       <p:sp>
         <p:nvSpPr>
-          <p:cNvPr id="173" name="Google Shape;173;p27"/>
+          <p:cNvPr id="180" name="Google Shape;180;p28"/>
           <p:cNvSpPr txBox="1"/>
           <p:nvPr>
             <p:ph idx="1" type="subTitle"/>
@@ -11061,12 +11429,12 @@
 </p:sld>
 </file>
 
-<file path=ppt/slides/slide21.xml><?xml version="1.0" encoding="utf-8"?>
+<file path=ppt/slides/slide22.xml><?xml version="1.0" encoding="utf-8"?>
 <p:sld xmlns:a="http://schemas.openxmlformats.org/drawingml/2006/main" xmlns:r="http://schemas.openxmlformats.org/officeDocument/2006/relationships" xmlns:mc="http://schemas.openxmlformats.org/markup-compatibility/2006" xmlns:mv="urn:schemas-microsoft-com:mac:vml" xmlns:p="http://schemas.openxmlformats.org/presentationml/2006/main" xmlns:c="http://schemas.openxmlformats.org/drawingml/2006/chart" xmlns:dgm="http://schemas.openxmlformats.org/drawingml/2006/diagram" xmlns:o="urn:schemas-microsoft-com:office:office" xmlns:v="urn:schemas-microsoft-com:vml" xmlns:pvml="urn:schemas-microsoft-com:office:powerpoint" xmlns:com="http://schemas.openxmlformats.org/drawingml/2006/compatibility" xmlns:p14="http://schemas.microsoft.com/office/powerpoint/2010/main" xmlns:p15="http://schemas.microsoft.com/office/powerpoint/2012/main" xmlns:ahyp="http://schemas.microsoft.com/office/drawing/2018/hyperlinkcolor">
   <p:cSld>
     <p:spTree>
       <p:nvGrpSpPr>
-        <p:cNvPr id="177" name="Shape 177"/>
+        <p:cNvPr id="184" name="Shape 184"/>
         <p:cNvGrpSpPr/>
         <p:nvPr/>
       </p:nvGrpSpPr>
@@ -11080,7 +11448,7 @@
       </p:grpSpPr>
       <p:sp>
         <p:nvSpPr>
-          <p:cNvPr id="178" name="Google Shape;178;p28"/>
+          <p:cNvPr id="185" name="Google Shape;185;p29"/>
           <p:cNvSpPr txBox="1"/>
           <p:nvPr>
             <p:ph type="title"/>
@@ -11120,7 +11488,7 @@
       </p:sp>
       <p:sp>
         <p:nvSpPr>
-          <p:cNvPr id="179" name="Google Shape;179;p28"/>
+          <p:cNvPr id="186" name="Google Shape;186;p29"/>
           <p:cNvSpPr txBox="1"/>
           <p:nvPr>
             <p:ph idx="12" type="sldNum"/>
@@ -11193,7 +11561,7 @@
       </p:sp>
       <p:sp>
         <p:nvSpPr>
-          <p:cNvPr id="180" name="Google Shape;180;p28"/>
+          <p:cNvPr id="187" name="Google Shape;187;p29"/>
           <p:cNvSpPr txBox="1"/>
           <p:nvPr>
             <p:ph idx="1" type="body"/>
@@ -11352,7 +11720,7 @@
           </a:prstGeom>
         </p:spPr>
         <p:txBody>
-          <a:bodyPr anchorCtr="0" anchor="ctr" bIns="91425" lIns="274300" spcFirstLastPara="1" rIns="91425" wrap="square" tIns="91425">
+          <a:bodyPr anchorCtr="0" anchor="ctr" bIns="0" lIns="274300" spcFirstLastPara="1" rIns="0" wrap="square" tIns="0">
             <a:noAutofit/>
           </a:bodyPr>
           <a:lstStyle/>
@@ -11379,7 +11747,7 @@
           <p:cNvPr id="50" name="Google Shape;50;p10"/>
           <p:cNvSpPr txBox="1"/>
           <p:nvPr>
-            <p:ph idx="1" type="body"/>
+            <p:ph idx="4294967295" type="body"/>
           </p:nvPr>
         </p:nvSpPr>
         <p:spPr>
@@ -11503,7 +11871,7 @@
               </a:rPr>
               <a:t> </a:t>
             </a:r>
-            <a:endParaRPr b="0" sz="900">
+            <a:endParaRPr>
               <a:solidFill>
                 <a:schemeClr val="dk2"/>
               </a:solidFill>
@@ -12303,7 +12671,7 @@
         <p:spPr>
           <a:xfrm>
             <a:off x="274320" y="914400"/>
-            <a:ext cx="8595361" cy="3648253"/>
+            <a:ext cx="8595359" cy="3629153"/>
           </a:xfrm>
           <a:prstGeom prst="rect">
             <a:avLst/>
@@ -12471,7 +12839,7 @@
             <a:tbl>
               <a:tblPr>
                 <a:noFill/>
-                <a:tableStyleId>{289D13A9-D2F7-4F60-86CA-BBA6726F6D71}</a:tableStyleId>
+                <a:tableStyleId>{067A0ED2-2E35-4495-812A-DB64C3BFA2AA}</a:tableStyleId>
               </a:tblPr>
               <a:tblGrid>
                 <a:gridCol w="1719075"/>

</xml_diff>

<commit_message>
Getting ready for summer 2024
</commit_message>
<xml_diff>
--- a/Lecture slides/NYT A01 - Introduction.pptx
+++ b/Lecture slides/NYT A01 - Introduction.pptx
@@ -710,7 +710,7 @@
       </p:grpSpPr>
       <p:sp>
         <p:nvSpPr>
-          <p:cNvPr id="33" name="Google Shape;33;g10386efa337_0_7:notes"/>
+          <p:cNvPr id="33" name="Google Shape;33;g2c21efa682d_0_67:notes"/>
           <p:cNvSpPr/>
           <p:nvPr>
             <p:ph idx="2" type="sldImg"/>
@@ -745,7 +745,7 @@
       </p:sp>
       <p:sp>
         <p:nvSpPr>
-          <p:cNvPr id="34" name="Google Shape;34;g10386efa337_0_7:notes"/>
+          <p:cNvPr id="34" name="Google Shape;34;g2c21efa682d_0_67:notes"/>
           <p:cNvSpPr txBox="1"/>
           <p:nvPr>
             <p:ph idx="1" type="body"/>
@@ -795,7 +795,7 @@
   <p:cSld>
     <p:spTree>
       <p:nvGrpSpPr>
-        <p:cNvPr id="96" name="Shape 96"/>
+        <p:cNvPr id="97" name="Shape 97"/>
         <p:cNvGrpSpPr/>
         <p:nvPr/>
       </p:nvGrpSpPr>
@@ -809,7 +809,7 @@
       </p:grpSpPr>
       <p:sp>
         <p:nvSpPr>
-          <p:cNvPr id="97" name="Google Shape;97;g2395919313b_0_82:notes"/>
+          <p:cNvPr id="98" name="Google Shape;98;g2395919313b_0_82:notes"/>
           <p:cNvSpPr/>
           <p:nvPr>
             <p:ph idx="2" type="sldImg"/>
@@ -844,7 +844,7 @@
       </p:sp>
       <p:sp>
         <p:nvSpPr>
-          <p:cNvPr id="98" name="Google Shape;98;g2395919313b_0_82:notes"/>
+          <p:cNvPr id="99" name="Google Shape;99;g2395919313b_0_82:notes"/>
           <p:cNvSpPr txBox="1"/>
           <p:nvPr>
             <p:ph idx="1" type="body"/>
@@ -894,7 +894,7 @@
   <p:cSld>
     <p:spTree>
       <p:nvGrpSpPr>
-        <p:cNvPr id="103" name="Shape 103"/>
+        <p:cNvPr id="104" name="Shape 104"/>
         <p:cNvGrpSpPr/>
         <p:nvPr/>
       </p:nvGrpSpPr>
@@ -908,7 +908,7 @@
       </p:grpSpPr>
       <p:sp>
         <p:nvSpPr>
-          <p:cNvPr id="104" name="Google Shape;104;g108fe332759_2_149:notes"/>
+          <p:cNvPr id="105" name="Google Shape;105;g108fe332759_2_149:notes"/>
           <p:cNvSpPr/>
           <p:nvPr>
             <p:ph idx="2" type="sldImg"/>
@@ -943,7 +943,7 @@
       </p:sp>
       <p:sp>
         <p:nvSpPr>
-          <p:cNvPr id="105" name="Google Shape;105;g108fe332759_2_149:notes"/>
+          <p:cNvPr id="106" name="Google Shape;106;g108fe332759_2_149:notes"/>
           <p:cNvSpPr txBox="1"/>
           <p:nvPr>
             <p:ph idx="1" type="body"/>
@@ -993,7 +993,7 @@
   <p:cSld>
     <p:spTree>
       <p:nvGrpSpPr>
-        <p:cNvPr id="110" name="Shape 110"/>
+        <p:cNvPr id="111" name="Shape 111"/>
         <p:cNvGrpSpPr/>
         <p:nvPr/>
       </p:nvGrpSpPr>
@@ -1007,7 +1007,7 @@
       </p:grpSpPr>
       <p:sp>
         <p:nvSpPr>
-          <p:cNvPr id="111" name="Google Shape;111;g108fe332759_2_133:notes"/>
+          <p:cNvPr id="112" name="Google Shape;112;g108fe332759_2_133:notes"/>
           <p:cNvSpPr/>
           <p:nvPr>
             <p:ph idx="2" type="sldImg"/>
@@ -1042,7 +1042,7 @@
       </p:sp>
       <p:sp>
         <p:nvSpPr>
-          <p:cNvPr id="112" name="Google Shape;112;g108fe332759_2_133:notes"/>
+          <p:cNvPr id="113" name="Google Shape;113;g108fe332759_2_133:notes"/>
           <p:cNvSpPr txBox="1"/>
           <p:nvPr>
             <p:ph idx="1" type="body"/>
@@ -1092,7 +1092,7 @@
   <p:cSld>
     <p:spTree>
       <p:nvGrpSpPr>
-        <p:cNvPr id="117" name="Shape 117"/>
+        <p:cNvPr id="118" name="Shape 118"/>
         <p:cNvGrpSpPr/>
         <p:nvPr/>
       </p:nvGrpSpPr>
@@ -1106,7 +1106,7 @@
       </p:grpSpPr>
       <p:sp>
         <p:nvSpPr>
-          <p:cNvPr id="118" name="Google Shape;118;g108fe332759_2_55:notes"/>
+          <p:cNvPr id="119" name="Google Shape;119;g108fe332759_2_55:notes"/>
           <p:cNvSpPr/>
           <p:nvPr>
             <p:ph idx="2" type="sldImg"/>
@@ -1141,7 +1141,7 @@
       </p:sp>
       <p:sp>
         <p:nvSpPr>
-          <p:cNvPr id="119" name="Google Shape;119;g108fe332759_2_55:notes"/>
+          <p:cNvPr id="120" name="Google Shape;120;g108fe332759_2_55:notes"/>
           <p:cNvSpPr txBox="1"/>
           <p:nvPr>
             <p:ph idx="1" type="body"/>
@@ -1191,7 +1191,7 @@
   <p:cSld>
     <p:spTree>
       <p:nvGrpSpPr>
-        <p:cNvPr id="124" name="Shape 124"/>
+        <p:cNvPr id="125" name="Shape 125"/>
         <p:cNvGrpSpPr/>
         <p:nvPr/>
       </p:nvGrpSpPr>
@@ -1205,7 +1205,7 @@
       </p:grpSpPr>
       <p:sp>
         <p:nvSpPr>
-          <p:cNvPr id="125" name="Google Shape;125;g2395919313b_0_88:notes"/>
+          <p:cNvPr id="126" name="Google Shape;126;g2395919313b_0_88:notes"/>
           <p:cNvSpPr/>
           <p:nvPr>
             <p:ph idx="2" type="sldImg"/>
@@ -1240,7 +1240,7 @@
       </p:sp>
       <p:sp>
         <p:nvSpPr>
-          <p:cNvPr id="126" name="Google Shape;126;g2395919313b_0_88:notes"/>
+          <p:cNvPr id="127" name="Google Shape;127;g2395919313b_0_88:notes"/>
           <p:cNvSpPr txBox="1"/>
           <p:nvPr>
             <p:ph idx="1" type="body"/>
@@ -1290,7 +1290,7 @@
   <p:cSld>
     <p:spTree>
       <p:nvGrpSpPr>
-        <p:cNvPr id="131" name="Shape 131"/>
+        <p:cNvPr id="132" name="Shape 132"/>
         <p:cNvGrpSpPr/>
         <p:nvPr/>
       </p:nvGrpSpPr>
@@ -1304,7 +1304,7 @@
       </p:grpSpPr>
       <p:sp>
         <p:nvSpPr>
-          <p:cNvPr id="132" name="Google Shape;132;g2395919313b_0_94:notes"/>
+          <p:cNvPr id="133" name="Google Shape;133;g2395919313b_0_94:notes"/>
           <p:cNvSpPr/>
           <p:nvPr>
             <p:ph idx="2" type="sldImg"/>
@@ -1339,7 +1339,7 @@
       </p:sp>
       <p:sp>
         <p:nvSpPr>
-          <p:cNvPr id="133" name="Google Shape;133;g2395919313b_0_94:notes"/>
+          <p:cNvPr id="134" name="Google Shape;134;g2395919313b_0_94:notes"/>
           <p:cNvSpPr txBox="1"/>
           <p:nvPr>
             <p:ph idx="1" type="body"/>
@@ -1389,7 +1389,7 @@
   <p:cSld>
     <p:spTree>
       <p:nvGrpSpPr>
-        <p:cNvPr id="138" name="Shape 138"/>
+        <p:cNvPr id="139" name="Shape 139"/>
         <p:cNvGrpSpPr/>
         <p:nvPr/>
       </p:nvGrpSpPr>
@@ -1403,7 +1403,7 @@
       </p:grpSpPr>
       <p:sp>
         <p:nvSpPr>
-          <p:cNvPr id="139" name="Google Shape;139;g2395919313b_0_100:notes"/>
+          <p:cNvPr id="140" name="Google Shape;140;g2395919313b_0_100:notes"/>
           <p:cNvSpPr/>
           <p:nvPr>
             <p:ph idx="2" type="sldImg"/>
@@ -1438,7 +1438,7 @@
       </p:sp>
       <p:sp>
         <p:nvSpPr>
-          <p:cNvPr id="140" name="Google Shape;140;g2395919313b_0_100:notes"/>
+          <p:cNvPr id="141" name="Google Shape;141;g2395919313b_0_100:notes"/>
           <p:cNvSpPr txBox="1"/>
           <p:nvPr>
             <p:ph idx="1" type="body"/>
@@ -1488,7 +1488,7 @@
   <p:cSld>
     <p:spTree>
       <p:nvGrpSpPr>
-        <p:cNvPr id="146" name="Shape 146"/>
+        <p:cNvPr id="147" name="Shape 147"/>
         <p:cNvGrpSpPr/>
         <p:nvPr/>
       </p:nvGrpSpPr>
@@ -1502,7 +1502,7 @@
       </p:grpSpPr>
       <p:sp>
         <p:nvSpPr>
-          <p:cNvPr id="147" name="Google Shape;147;g108fe332759_2_43:notes"/>
+          <p:cNvPr id="148" name="Google Shape;148;g108fe332759_2_43:notes"/>
           <p:cNvSpPr/>
           <p:nvPr>
             <p:ph idx="2" type="sldImg"/>
@@ -1537,7 +1537,7 @@
       </p:sp>
       <p:sp>
         <p:nvSpPr>
-          <p:cNvPr id="148" name="Google Shape;148;g108fe332759_2_43:notes"/>
+          <p:cNvPr id="149" name="Google Shape;149;g108fe332759_2_43:notes"/>
           <p:cNvSpPr txBox="1"/>
           <p:nvPr>
             <p:ph idx="1" type="body"/>
@@ -1587,7 +1587,7 @@
   <p:cSld>
     <p:spTree>
       <p:nvGrpSpPr>
-        <p:cNvPr id="154" name="Shape 154"/>
+        <p:cNvPr id="155" name="Shape 155"/>
         <p:cNvGrpSpPr/>
         <p:nvPr/>
       </p:nvGrpSpPr>
@@ -1601,7 +1601,7 @@
       </p:grpSpPr>
       <p:sp>
         <p:nvSpPr>
-          <p:cNvPr id="155" name="Google Shape;155;g108fe332759_2_49:notes"/>
+          <p:cNvPr id="156" name="Google Shape;156;g108fe332759_2_49:notes"/>
           <p:cNvSpPr/>
           <p:nvPr>
             <p:ph idx="2" type="sldImg"/>
@@ -1636,7 +1636,7 @@
       </p:sp>
       <p:sp>
         <p:nvSpPr>
-          <p:cNvPr id="156" name="Google Shape;156;g108fe332759_2_49:notes"/>
+          <p:cNvPr id="157" name="Google Shape;157;g108fe332759_2_49:notes"/>
           <p:cNvSpPr txBox="1"/>
           <p:nvPr>
             <p:ph idx="1" type="body"/>
@@ -1686,7 +1686,7 @@
   <p:cSld>
     <p:spTree>
       <p:nvGrpSpPr>
-        <p:cNvPr id="161" name="Shape 161"/>
+        <p:cNvPr id="162" name="Shape 162"/>
         <p:cNvGrpSpPr/>
         <p:nvPr/>
       </p:nvGrpSpPr>
@@ -1700,7 +1700,7 @@
       </p:grpSpPr>
       <p:sp>
         <p:nvSpPr>
-          <p:cNvPr id="162" name="Google Shape;162;g108fe332759_2_61:notes"/>
+          <p:cNvPr id="163" name="Google Shape;163;g108fe332759_2_61:notes"/>
           <p:cNvSpPr/>
           <p:nvPr>
             <p:ph idx="2" type="sldImg"/>
@@ -1735,7 +1735,7 @@
       </p:sp>
       <p:sp>
         <p:nvSpPr>
-          <p:cNvPr id="163" name="Google Shape;163;g108fe332759_2_61:notes"/>
+          <p:cNvPr id="164" name="Google Shape;164;g108fe332759_2_61:notes"/>
           <p:cNvSpPr txBox="1"/>
           <p:nvPr>
             <p:ph idx="1" type="body"/>
@@ -1884,7 +1884,7 @@
   <p:cSld>
     <p:spTree>
       <p:nvGrpSpPr>
-        <p:cNvPr id="168" name="Shape 168"/>
+        <p:cNvPr id="169" name="Shape 169"/>
         <p:cNvGrpSpPr/>
         <p:nvPr/>
       </p:nvGrpSpPr>
@@ -1898,7 +1898,7 @@
       </p:grpSpPr>
       <p:sp>
         <p:nvSpPr>
-          <p:cNvPr id="169" name="Google Shape;169;g2395919313b_0_107:notes"/>
+          <p:cNvPr id="170" name="Google Shape;170;g2395919313b_0_107:notes"/>
           <p:cNvSpPr/>
           <p:nvPr>
             <p:ph idx="2" type="sldImg"/>
@@ -1933,7 +1933,7 @@
       </p:sp>
       <p:sp>
         <p:nvSpPr>
-          <p:cNvPr id="170" name="Google Shape;170;g2395919313b_0_107:notes"/>
+          <p:cNvPr id="171" name="Google Shape;171;g2395919313b_0_107:notes"/>
           <p:cNvSpPr txBox="1"/>
           <p:nvPr>
             <p:ph idx="1" type="body"/>
@@ -1983,7 +1983,7 @@
   <p:cSld>
     <p:spTree>
       <p:nvGrpSpPr>
-        <p:cNvPr id="175" name="Shape 175"/>
+        <p:cNvPr id="176" name="Shape 176"/>
         <p:cNvGrpSpPr/>
         <p:nvPr/>
       </p:nvGrpSpPr>
@@ -1997,7 +1997,7 @@
       </p:grpSpPr>
       <p:sp>
         <p:nvSpPr>
-          <p:cNvPr id="176" name="Google Shape;176;g2395919313b_0_38:notes"/>
+          <p:cNvPr id="177" name="Google Shape;177;g2395919313b_0_38:notes"/>
           <p:cNvSpPr/>
           <p:nvPr>
             <p:ph idx="2" type="sldImg"/>
@@ -2032,7 +2032,7 @@
       </p:sp>
       <p:sp>
         <p:nvSpPr>
-          <p:cNvPr id="177" name="Google Shape;177;g2395919313b_0_38:notes"/>
+          <p:cNvPr id="178" name="Google Shape;178;g2395919313b_0_38:notes"/>
           <p:cNvSpPr txBox="1"/>
           <p:nvPr>
             <p:ph idx="1" type="body"/>
@@ -2082,7 +2082,7 @@
   <p:cSld>
     <p:spTree>
       <p:nvGrpSpPr>
-        <p:cNvPr id="181" name="Shape 181"/>
+        <p:cNvPr id="182" name="Shape 182"/>
         <p:cNvGrpSpPr/>
         <p:nvPr/>
       </p:nvGrpSpPr>
@@ -2096,7 +2096,7 @@
       </p:grpSpPr>
       <p:sp>
         <p:nvSpPr>
-          <p:cNvPr id="182" name="Google Shape;182;g2395919313b_0_43:notes"/>
+          <p:cNvPr id="183" name="Google Shape;183;g2395919313b_0_43:notes"/>
           <p:cNvSpPr/>
           <p:nvPr>
             <p:ph idx="2" type="sldImg"/>
@@ -2131,7 +2131,7 @@
       </p:sp>
       <p:sp>
         <p:nvSpPr>
-          <p:cNvPr id="183" name="Google Shape;183;g2395919313b_0_43:notes"/>
+          <p:cNvPr id="184" name="Google Shape;184;g2395919313b_0_43:notes"/>
           <p:cNvSpPr txBox="1"/>
           <p:nvPr>
             <p:ph idx="1" type="body"/>
@@ -2379,7 +2379,7 @@
   <p:cSld>
     <p:spTree>
       <p:nvGrpSpPr>
-        <p:cNvPr id="59" name="Shape 59"/>
+        <p:cNvPr id="60" name="Shape 60"/>
         <p:cNvGrpSpPr/>
         <p:nvPr/>
       </p:nvGrpSpPr>
@@ -2393,7 +2393,7 @@
       </p:grpSpPr>
       <p:sp>
         <p:nvSpPr>
-          <p:cNvPr id="60" name="Google Shape;60;g108fe332759_2_6:notes"/>
+          <p:cNvPr id="61" name="Google Shape;61;g108fe332759_2_6:notes"/>
           <p:cNvSpPr/>
           <p:nvPr>
             <p:ph idx="2" type="sldImg"/>
@@ -2428,7 +2428,7 @@
       </p:sp>
       <p:sp>
         <p:nvSpPr>
-          <p:cNvPr id="61" name="Google Shape;61;g108fe332759_2_6:notes"/>
+          <p:cNvPr id="62" name="Google Shape;62;g108fe332759_2_6:notes"/>
           <p:cNvSpPr txBox="1"/>
           <p:nvPr>
             <p:ph idx="1" type="body"/>
@@ -2478,7 +2478,7 @@
   <p:cSld>
     <p:spTree>
       <p:nvGrpSpPr>
-        <p:cNvPr id="66" name="Shape 66"/>
+        <p:cNvPr id="67" name="Shape 67"/>
         <p:cNvGrpSpPr/>
         <p:nvPr/>
       </p:nvGrpSpPr>
@@ -2492,7 +2492,7 @@
       </p:grpSpPr>
       <p:sp>
         <p:nvSpPr>
-          <p:cNvPr id="67" name="Google Shape;67;g10e7589f98e_0_40:notes"/>
+          <p:cNvPr id="68" name="Google Shape;68;g10e7589f98e_0_40:notes"/>
           <p:cNvSpPr/>
           <p:nvPr>
             <p:ph idx="2" type="sldImg"/>
@@ -2527,7 +2527,7 @@
       </p:sp>
       <p:sp>
         <p:nvSpPr>
-          <p:cNvPr id="68" name="Google Shape;68;g10e7589f98e_0_40:notes"/>
+          <p:cNvPr id="69" name="Google Shape;69;g10e7589f98e_0_40:notes"/>
           <p:cNvSpPr txBox="1"/>
           <p:nvPr>
             <p:ph idx="1" type="body"/>
@@ -2577,7 +2577,7 @@
   <p:cSld>
     <p:spTree>
       <p:nvGrpSpPr>
-        <p:cNvPr id="73" name="Shape 73"/>
+        <p:cNvPr id="74" name="Shape 74"/>
         <p:cNvGrpSpPr/>
         <p:nvPr/>
       </p:nvGrpSpPr>
@@ -2591,7 +2591,7 @@
       </p:grpSpPr>
       <p:sp>
         <p:nvSpPr>
-          <p:cNvPr id="74" name="Google Shape;74;g2395919313b_0_76:notes"/>
+          <p:cNvPr id="75" name="Google Shape;75;g2395919313b_0_76:notes"/>
           <p:cNvSpPr/>
           <p:nvPr>
             <p:ph idx="2" type="sldImg"/>
@@ -2626,7 +2626,7 @@
       </p:sp>
       <p:sp>
         <p:nvSpPr>
-          <p:cNvPr id="75" name="Google Shape;75;g2395919313b_0_76:notes"/>
+          <p:cNvPr id="76" name="Google Shape;76;g2395919313b_0_76:notes"/>
           <p:cNvSpPr txBox="1"/>
           <p:nvPr>
             <p:ph idx="1" type="body"/>
@@ -2676,7 +2676,7 @@
   <p:cSld>
     <p:spTree>
       <p:nvGrpSpPr>
-        <p:cNvPr id="80" name="Shape 80"/>
+        <p:cNvPr id="81" name="Shape 81"/>
         <p:cNvGrpSpPr/>
         <p:nvPr/>
       </p:nvGrpSpPr>
@@ -2690,7 +2690,7 @@
       </p:grpSpPr>
       <p:sp>
         <p:nvSpPr>
-          <p:cNvPr id="81" name="Google Shape;81;g108fe332759_2_18:notes"/>
+          <p:cNvPr id="82" name="Google Shape;82;g108fe332759_2_18:notes"/>
           <p:cNvSpPr/>
           <p:nvPr>
             <p:ph idx="2" type="sldImg"/>
@@ -2725,7 +2725,7 @@
       </p:sp>
       <p:sp>
         <p:nvSpPr>
-          <p:cNvPr id="82" name="Google Shape;82;g108fe332759_2_18:notes"/>
+          <p:cNvPr id="83" name="Google Shape;83;g108fe332759_2_18:notes"/>
           <p:cNvSpPr txBox="1"/>
           <p:nvPr>
             <p:ph idx="1" type="body"/>
@@ -2775,7 +2775,7 @@
   <p:cSld>
     <p:spTree>
       <p:nvGrpSpPr>
-        <p:cNvPr id="88" name="Shape 88"/>
+        <p:cNvPr id="89" name="Shape 89"/>
         <p:cNvGrpSpPr/>
         <p:nvPr/>
       </p:nvGrpSpPr>
@@ -2789,7 +2789,7 @@
       </p:grpSpPr>
       <p:sp>
         <p:nvSpPr>
-          <p:cNvPr id="89" name="Google Shape;89;g108fe332759_2_24:notes"/>
+          <p:cNvPr id="90" name="Google Shape;90;g108fe332759_2_24:notes"/>
           <p:cNvSpPr/>
           <p:nvPr>
             <p:ph idx="2" type="sldImg"/>
@@ -2824,7 +2824,7 @@
       </p:sp>
       <p:sp>
         <p:nvSpPr>
-          <p:cNvPr id="90" name="Google Shape;90;g108fe332759_2_24:notes"/>
+          <p:cNvPr id="91" name="Google Shape;91;g108fe332759_2_24:notes"/>
           <p:cNvSpPr txBox="1"/>
           <p:nvPr>
             <p:ph idx="1" type="body"/>
@@ -6163,6 +6163,11 @@
               <a:spcAft>
                 <a:spcPts val="0"/>
               </a:spcAft>
+              <a:buClr>
+                <a:schemeClr val="dk1"/>
+              </a:buClr>
+              <a:buSzPts val="1100"/>
+              <a:buFont typeface="Arial"/>
               <a:buNone/>
             </a:pPr>
             <a:r>
@@ -6219,11 +6224,6 @@
               <a:spcAft>
                 <a:spcPts val="0"/>
               </a:spcAft>
-              <a:buClr>
-                <a:schemeClr val="dk1"/>
-              </a:buClr>
-              <a:buSzPts val="1100"/>
-              <a:buFont typeface="Arial"/>
               <a:buNone/>
             </a:pPr>
             <a:r>
@@ -6240,11 +6240,6 @@
               <a:spcAft>
                 <a:spcPts val="0"/>
               </a:spcAft>
-              <a:buClr>
-                <a:schemeClr val="dk1"/>
-              </a:buClr>
-              <a:buSzPts val="1100"/>
-              <a:buFont typeface="Arial"/>
               <a:buNone/>
             </a:pPr>
             <a:r>
@@ -6260,11 +6255,6 @@
               <a:spcAft>
                 <a:spcPts val="0"/>
               </a:spcAft>
-              <a:buClr>
-                <a:schemeClr val="dk1"/>
-              </a:buClr>
-              <a:buSzPts val="1100"/>
-              <a:buFont typeface="Arial"/>
               <a:buNone/>
             </a:pPr>
             <a:r>
@@ -6313,7 +6303,7 @@
   <p:cSld>
     <p:spTree>
       <p:nvGrpSpPr>
-        <p:cNvPr id="99" name="Shape 99"/>
+        <p:cNvPr id="100" name="Shape 100"/>
         <p:cNvGrpSpPr/>
         <p:nvPr/>
       </p:nvGrpSpPr>
@@ -6327,7 +6317,7 @@
       </p:grpSpPr>
       <p:sp>
         <p:nvSpPr>
-          <p:cNvPr id="100" name="Google Shape;100;p17"/>
+          <p:cNvPr id="101" name="Google Shape;101;p17"/>
           <p:cNvSpPr txBox="1"/>
           <p:nvPr>
             <p:ph type="title"/>
@@ -6367,7 +6357,7 @@
       </p:sp>
       <p:sp>
         <p:nvSpPr>
-          <p:cNvPr id="101" name="Google Shape;101;p17"/>
+          <p:cNvPr id="102" name="Google Shape;102;p17"/>
           <p:cNvSpPr txBox="1"/>
           <p:nvPr>
             <p:ph idx="1" type="body"/>
@@ -6555,7 +6545,7 @@
       </p:sp>
       <p:sp>
         <p:nvSpPr>
-          <p:cNvPr id="102" name="Google Shape;102;p17"/>
+          <p:cNvPr id="103" name="Google Shape;103;p17"/>
           <p:cNvSpPr txBox="1"/>
           <p:nvPr>
             <p:ph idx="12" type="sldNum"/>
@@ -6639,7 +6629,7 @@
   <p:cSld>
     <p:spTree>
       <p:nvGrpSpPr>
-        <p:cNvPr id="106" name="Shape 106"/>
+        <p:cNvPr id="107" name="Shape 107"/>
         <p:cNvGrpSpPr/>
         <p:nvPr/>
       </p:nvGrpSpPr>
@@ -6653,7 +6643,7 @@
       </p:grpSpPr>
       <p:sp>
         <p:nvSpPr>
-          <p:cNvPr id="107" name="Google Shape;107;p18"/>
+          <p:cNvPr id="108" name="Google Shape;108;p18"/>
           <p:cNvSpPr txBox="1"/>
           <p:nvPr>
             <p:ph type="title"/>
@@ -6693,7 +6683,7 @@
       </p:sp>
       <p:sp>
         <p:nvSpPr>
-          <p:cNvPr id="108" name="Google Shape;108;p18"/>
+          <p:cNvPr id="109" name="Google Shape;109;p18"/>
           <p:cNvSpPr txBox="1"/>
           <p:nvPr>
             <p:ph idx="12" type="sldNum"/>
@@ -6766,7 +6756,7 @@
       </p:sp>
       <p:graphicFrame>
         <p:nvGraphicFramePr>
-          <p:cNvPr id="109" name="Google Shape;109;p18"/>
+          <p:cNvPr id="110" name="Google Shape;110;p18"/>
           <p:cNvGraphicFramePr/>
           <p:nvPr/>
         </p:nvGraphicFramePr>
@@ -6779,7 +6769,7 @@
             <a:tbl>
               <a:tblPr>
                 <a:noFill/>
-                <a:tableStyleId>{067A0ED2-2E35-4495-812A-DB64C3BFA2AA}</a:tableStyleId>
+                <a:tableStyleId>{DDE2DAFE-37E4-4289-9B02-062B57317037}</a:tableStyleId>
               </a:tblPr>
               <a:tblGrid>
                 <a:gridCol w="1227850"/>
@@ -8354,7 +8344,7 @@
   <p:cSld>
     <p:spTree>
       <p:nvGrpSpPr>
-        <p:cNvPr id="113" name="Shape 113"/>
+        <p:cNvPr id="114" name="Shape 114"/>
         <p:cNvGrpSpPr/>
         <p:nvPr/>
       </p:nvGrpSpPr>
@@ -8368,7 +8358,7 @@
       </p:grpSpPr>
       <p:sp>
         <p:nvSpPr>
-          <p:cNvPr id="114" name="Google Shape;114;p19"/>
+          <p:cNvPr id="115" name="Google Shape;115;p19"/>
           <p:cNvSpPr txBox="1"/>
           <p:nvPr>
             <p:ph type="title"/>
@@ -8408,7 +8398,7 @@
       </p:sp>
       <p:sp>
         <p:nvSpPr>
-          <p:cNvPr id="115" name="Google Shape;115;p19"/>
+          <p:cNvPr id="116" name="Google Shape;116;p19"/>
           <p:cNvSpPr txBox="1"/>
           <p:nvPr>
             <p:ph idx="1" type="body"/>
@@ -8582,7 +8572,7 @@
       </p:sp>
       <p:sp>
         <p:nvSpPr>
-          <p:cNvPr id="116" name="Google Shape;116;p19"/>
+          <p:cNvPr id="117" name="Google Shape;117;p19"/>
           <p:cNvSpPr txBox="1"/>
           <p:nvPr>
             <p:ph idx="12" type="sldNum"/>
@@ -8666,7 +8656,7 @@
   <p:cSld>
     <p:spTree>
       <p:nvGrpSpPr>
-        <p:cNvPr id="120" name="Shape 120"/>
+        <p:cNvPr id="121" name="Shape 121"/>
         <p:cNvGrpSpPr/>
         <p:nvPr/>
       </p:nvGrpSpPr>
@@ -8680,7 +8670,7 @@
       </p:grpSpPr>
       <p:sp>
         <p:nvSpPr>
-          <p:cNvPr id="121" name="Google Shape;121;p20"/>
+          <p:cNvPr id="122" name="Google Shape;122;p20"/>
           <p:cNvSpPr txBox="1"/>
           <p:nvPr>
             <p:ph type="title"/>
@@ -8720,7 +8710,7 @@
       </p:sp>
       <p:sp>
         <p:nvSpPr>
-          <p:cNvPr id="122" name="Google Shape;122;p20"/>
+          <p:cNvPr id="123" name="Google Shape;123;p20"/>
           <p:cNvSpPr txBox="1"/>
           <p:nvPr>
             <p:ph idx="1" type="body"/>
@@ -8752,7 +8742,20 @@
             </a:pPr>
             <a:r>
               <a:rPr lang="en"/>
-              <a:t>Let’s see…</a:t>
+              <a:t>Let’s see… </a:t>
+            </a:r>
+            <a:r>
+              <a:rPr lang="en" u="sng">
+                <a:solidFill>
+                  <a:schemeClr val="hlink"/>
+                </a:solidFill>
+                <a:hlinkClick r:id="rId3"/>
+              </a:rPr>
+              <a:t>https://nyt.uni1.de</a:t>
+            </a:r>
+            <a:r>
+              <a:rPr lang="en"/>
+              <a:t> </a:t>
             </a:r>
             <a:endParaRPr/>
           </a:p>
@@ -8760,7 +8763,7 @@
       </p:sp>
       <p:sp>
         <p:nvSpPr>
-          <p:cNvPr id="123" name="Google Shape;123;p20"/>
+          <p:cNvPr id="124" name="Google Shape;124;p20"/>
           <p:cNvSpPr txBox="1"/>
           <p:nvPr>
             <p:ph idx="12" type="sldNum"/>
@@ -8811,7 +8814,7 @@
                 <a:solidFill>
                   <a:schemeClr val="hlink"/>
                 </a:solidFill>
-                <a:hlinkClick r:id="rId3"/>
+                <a:hlinkClick r:id="rId4"/>
               </a:rPr>
               <a:t>https://profriehle.com</a:t>
             </a:r>
@@ -8844,7 +8847,7 @@
   <p:cSld>
     <p:spTree>
       <p:nvGrpSpPr>
-        <p:cNvPr id="127" name="Shape 127"/>
+        <p:cNvPr id="128" name="Shape 128"/>
         <p:cNvGrpSpPr/>
         <p:nvPr/>
       </p:nvGrpSpPr>
@@ -8858,7 +8861,7 @@
       </p:grpSpPr>
       <p:sp>
         <p:nvSpPr>
-          <p:cNvPr id="128" name="Google Shape;128;p21"/>
+          <p:cNvPr id="129" name="Google Shape;129;p21"/>
           <p:cNvSpPr txBox="1"/>
           <p:nvPr>
             <p:ph type="title"/>
@@ -8898,7 +8901,7 @@
       </p:sp>
       <p:sp>
         <p:nvSpPr>
-          <p:cNvPr id="129" name="Google Shape;129;p21"/>
+          <p:cNvPr id="130" name="Google Shape;130;p21"/>
           <p:cNvSpPr txBox="1"/>
           <p:nvPr>
             <p:ph idx="1" type="body"/>
@@ -9064,7 +9067,7 @@
       </p:sp>
       <p:sp>
         <p:nvSpPr>
-          <p:cNvPr id="130" name="Google Shape;130;p21"/>
+          <p:cNvPr id="131" name="Google Shape;131;p21"/>
           <p:cNvSpPr txBox="1"/>
           <p:nvPr>
             <p:ph idx="12" type="sldNum"/>
@@ -9148,7 +9151,7 @@
   <p:cSld>
     <p:spTree>
       <p:nvGrpSpPr>
-        <p:cNvPr id="134" name="Shape 134"/>
+        <p:cNvPr id="135" name="Shape 135"/>
         <p:cNvGrpSpPr/>
         <p:nvPr/>
       </p:nvGrpSpPr>
@@ -9162,7 +9165,7 @@
       </p:grpSpPr>
       <p:sp>
         <p:nvSpPr>
-          <p:cNvPr id="135" name="Google Shape;135;p22"/>
+          <p:cNvPr id="136" name="Google Shape;136;p22"/>
           <p:cNvSpPr txBox="1"/>
           <p:nvPr>
             <p:ph type="title"/>
@@ -9202,7 +9205,7 @@
       </p:sp>
       <p:sp>
         <p:nvSpPr>
-          <p:cNvPr id="136" name="Google Shape;136;p22"/>
+          <p:cNvPr id="137" name="Google Shape;137;p22"/>
           <p:cNvSpPr txBox="1"/>
           <p:nvPr>
             <p:ph idx="1" type="body"/>
@@ -9371,7 +9374,7 @@
       </p:sp>
       <p:sp>
         <p:nvSpPr>
-          <p:cNvPr id="137" name="Google Shape;137;p22"/>
+          <p:cNvPr id="138" name="Google Shape;138;p22"/>
           <p:cNvSpPr txBox="1"/>
           <p:nvPr>
             <p:ph idx="12" type="sldNum"/>
@@ -9455,7 +9458,7 @@
   <p:cSld>
     <p:spTree>
       <p:nvGrpSpPr>
-        <p:cNvPr id="141" name="Shape 141"/>
+        <p:cNvPr id="142" name="Shape 142"/>
         <p:cNvGrpSpPr/>
         <p:nvPr/>
       </p:nvGrpSpPr>
@@ -9469,7 +9472,7 @@
       </p:grpSpPr>
       <p:sp>
         <p:nvSpPr>
-          <p:cNvPr id="142" name="Google Shape;142;p23"/>
+          <p:cNvPr id="143" name="Google Shape;143;p23"/>
           <p:cNvSpPr txBox="1"/>
           <p:nvPr>
             <p:ph type="title"/>
@@ -9509,7 +9512,7 @@
       </p:sp>
       <p:pic>
         <p:nvPicPr>
-          <p:cNvPr id="143" name="Google Shape;143;p23"/>
+          <p:cNvPr id="144" name="Google Shape;144;p23"/>
           <p:cNvPicPr preferRelativeResize="0"/>
           <p:nvPr/>
         </p:nvPicPr>
@@ -9537,14 +9540,14 @@
       </p:pic>
       <p:sp>
         <p:nvSpPr>
-          <p:cNvPr id="144" name="Google Shape;144;p23"/>
+          <p:cNvPr id="145" name="Google Shape;145;p23"/>
           <p:cNvSpPr txBox="1"/>
           <p:nvPr/>
         </p:nvSpPr>
         <p:spPr>
           <a:xfrm>
-            <a:off x="0" y="4233672"/>
-            <a:ext cx="9144000" cy="914400"/>
+            <a:off x="0" y="4233675"/>
+            <a:ext cx="7315200" cy="914400"/>
           </a:xfrm>
           <a:prstGeom prst="rect">
             <a:avLst/>
@@ -9595,7 +9598,7 @@
       </p:sp>
       <p:sp>
         <p:nvSpPr>
-          <p:cNvPr id="145" name="Google Shape;145;p23"/>
+          <p:cNvPr id="146" name="Google Shape;146;p23"/>
           <p:cNvSpPr txBox="1"/>
           <p:nvPr>
             <p:ph idx="12" type="sldNum"/>
@@ -9679,7 +9682,7 @@
   <p:cSld>
     <p:spTree>
       <p:nvGrpSpPr>
-        <p:cNvPr id="149" name="Shape 149"/>
+        <p:cNvPr id="150" name="Shape 150"/>
         <p:cNvGrpSpPr/>
         <p:nvPr/>
       </p:nvGrpSpPr>
@@ -9693,7 +9696,7 @@
       </p:grpSpPr>
       <p:sp>
         <p:nvSpPr>
-          <p:cNvPr id="150" name="Google Shape;150;p24"/>
+          <p:cNvPr id="151" name="Google Shape;151;p24"/>
           <p:cNvSpPr txBox="1"/>
           <p:nvPr>
             <p:ph type="title"/>
@@ -9733,7 +9736,7 @@
       </p:sp>
       <p:sp>
         <p:nvSpPr>
-          <p:cNvPr id="151" name="Google Shape;151;p24"/>
+          <p:cNvPr id="152" name="Google Shape;152;p24"/>
           <p:cNvSpPr txBox="1"/>
           <p:nvPr>
             <p:ph idx="12" type="sldNum"/>
@@ -9806,14 +9809,14 @@
       </p:sp>
       <p:sp>
         <p:nvSpPr>
-          <p:cNvPr id="152" name="Google Shape;152;p24"/>
+          <p:cNvPr id="153" name="Google Shape;153;p24"/>
           <p:cNvSpPr txBox="1"/>
           <p:nvPr/>
         </p:nvSpPr>
         <p:spPr>
           <a:xfrm>
             <a:off x="0" y="4229100"/>
-            <a:ext cx="9144000" cy="914400"/>
+            <a:ext cx="7315200" cy="914400"/>
           </a:xfrm>
           <a:prstGeom prst="rect">
             <a:avLst/>
@@ -9861,7 +9864,7 @@
       </p:sp>
       <p:sp>
         <p:nvSpPr>
-          <p:cNvPr id="153" name="Google Shape;153;p24"/>
+          <p:cNvPr id="154" name="Google Shape;154;p24"/>
           <p:cNvSpPr txBox="1"/>
           <p:nvPr>
             <p:ph idx="1" type="body"/>
@@ -10039,7 +10042,7 @@
   <p:cSld>
     <p:spTree>
       <p:nvGrpSpPr>
-        <p:cNvPr id="157" name="Shape 157"/>
+        <p:cNvPr id="158" name="Shape 158"/>
         <p:cNvGrpSpPr/>
         <p:nvPr/>
       </p:nvGrpSpPr>
@@ -10053,7 +10056,7 @@
       </p:grpSpPr>
       <p:sp>
         <p:nvSpPr>
-          <p:cNvPr id="158" name="Google Shape;158;p25"/>
+          <p:cNvPr id="159" name="Google Shape;159;p25"/>
           <p:cNvSpPr txBox="1"/>
           <p:nvPr>
             <p:ph type="title"/>
@@ -10093,7 +10096,7 @@
       </p:sp>
       <p:sp>
         <p:nvSpPr>
-          <p:cNvPr id="159" name="Google Shape;159;p25"/>
+          <p:cNvPr id="160" name="Google Shape;160;p25"/>
           <p:cNvSpPr txBox="1"/>
           <p:nvPr>
             <p:ph idx="1" type="body"/>
@@ -10260,7 +10263,7 @@
       </p:sp>
       <p:sp>
         <p:nvSpPr>
-          <p:cNvPr id="160" name="Google Shape;160;p25"/>
+          <p:cNvPr id="161" name="Google Shape;161;p25"/>
           <p:cNvSpPr txBox="1"/>
           <p:nvPr>
             <p:ph idx="12" type="sldNum"/>
@@ -10344,7 +10347,7 @@
   <p:cSld>
     <p:spTree>
       <p:nvGrpSpPr>
-        <p:cNvPr id="164" name="Shape 164"/>
+        <p:cNvPr id="165" name="Shape 165"/>
         <p:cNvGrpSpPr/>
         <p:nvPr/>
       </p:nvGrpSpPr>
@@ -10358,7 +10361,7 @@
       </p:grpSpPr>
       <p:sp>
         <p:nvSpPr>
-          <p:cNvPr id="165" name="Google Shape;165;p26"/>
+          <p:cNvPr id="166" name="Google Shape;166;p26"/>
           <p:cNvSpPr txBox="1"/>
           <p:nvPr>
             <p:ph type="title"/>
@@ -10398,7 +10401,7 @@
       </p:sp>
       <p:sp>
         <p:nvSpPr>
-          <p:cNvPr id="166" name="Google Shape;166;p26"/>
+          <p:cNvPr id="167" name="Google Shape;167;p26"/>
           <p:cNvSpPr txBox="1"/>
           <p:nvPr>
             <p:ph idx="12" type="sldNum"/>
@@ -10471,7 +10474,7 @@
       </p:sp>
       <p:sp>
         <p:nvSpPr>
-          <p:cNvPr id="167" name="Google Shape;167;p26"/>
+          <p:cNvPr id="168" name="Google Shape;168;p26"/>
           <p:cNvSpPr txBox="1"/>
           <p:nvPr>
             <p:ph idx="1" type="body"/>
@@ -10984,7 +10987,7 @@
   <p:cSld>
     <p:spTree>
       <p:nvGrpSpPr>
-        <p:cNvPr id="171" name="Shape 171"/>
+        <p:cNvPr id="172" name="Shape 172"/>
         <p:cNvGrpSpPr/>
         <p:nvPr/>
       </p:nvGrpSpPr>
@@ -10998,7 +11001,7 @@
       </p:grpSpPr>
       <p:sp>
         <p:nvSpPr>
-          <p:cNvPr id="172" name="Google Shape;172;p27"/>
+          <p:cNvPr id="173" name="Google Shape;173;p27"/>
           <p:cNvSpPr txBox="1"/>
           <p:nvPr>
             <p:ph type="title"/>
@@ -11038,7 +11041,7 @@
       </p:sp>
       <p:sp>
         <p:nvSpPr>
-          <p:cNvPr id="173" name="Google Shape;173;p27"/>
+          <p:cNvPr id="174" name="Google Shape;174;p27"/>
           <p:cNvSpPr txBox="1"/>
           <p:nvPr>
             <p:ph idx="1" type="body"/>
@@ -11166,7 +11169,7 @@
       </p:sp>
       <p:sp>
         <p:nvSpPr>
-          <p:cNvPr id="174" name="Google Shape;174;p27"/>
+          <p:cNvPr id="175" name="Google Shape;175;p27"/>
           <p:cNvSpPr txBox="1"/>
           <p:nvPr>
             <p:ph idx="12" type="sldNum"/>
@@ -11250,7 +11253,7 @@
   <p:cSld>
     <p:spTree>
       <p:nvGrpSpPr>
-        <p:cNvPr id="178" name="Shape 178"/>
+        <p:cNvPr id="179" name="Shape 179"/>
         <p:cNvGrpSpPr/>
         <p:nvPr/>
       </p:nvGrpSpPr>
@@ -11264,7 +11267,7 @@
       </p:grpSpPr>
       <p:sp>
         <p:nvSpPr>
-          <p:cNvPr id="179" name="Google Shape;179;p28"/>
+          <p:cNvPr id="180" name="Google Shape;180;p28"/>
           <p:cNvSpPr txBox="1"/>
           <p:nvPr>
             <p:ph type="ctrTitle"/>
@@ -11304,7 +11307,7 @@
       </p:sp>
       <p:sp>
         <p:nvSpPr>
-          <p:cNvPr id="180" name="Google Shape;180;p28"/>
+          <p:cNvPr id="181" name="Google Shape;181;p28"/>
           <p:cNvSpPr txBox="1"/>
           <p:nvPr>
             <p:ph idx="1" type="subTitle"/>
@@ -11434,7 +11437,7 @@
   <p:cSld>
     <p:spTree>
       <p:nvGrpSpPr>
-        <p:cNvPr id="184" name="Shape 184"/>
+        <p:cNvPr id="185" name="Shape 185"/>
         <p:cNvGrpSpPr/>
         <p:nvPr/>
       </p:nvGrpSpPr>
@@ -11448,7 +11451,7 @@
       </p:grpSpPr>
       <p:sp>
         <p:nvSpPr>
-          <p:cNvPr id="185" name="Google Shape;185;p29"/>
+          <p:cNvPr id="186" name="Google Shape;186;p29"/>
           <p:cNvSpPr txBox="1"/>
           <p:nvPr>
             <p:ph type="title"/>
@@ -11488,7 +11491,7 @@
       </p:sp>
       <p:sp>
         <p:nvSpPr>
-          <p:cNvPr id="186" name="Google Shape;186;p29"/>
+          <p:cNvPr id="187" name="Google Shape;187;p29"/>
           <p:cNvSpPr txBox="1"/>
           <p:nvPr>
             <p:ph idx="12" type="sldNum"/>
@@ -11561,7 +11564,7 @@
       </p:sp>
       <p:sp>
         <p:nvSpPr>
-          <p:cNvPr id="187" name="Google Shape;187;p29"/>
+          <p:cNvPr id="188" name="Google Shape;188;p29"/>
           <p:cNvSpPr txBox="1"/>
           <p:nvPr>
             <p:ph idx="1" type="body"/>
@@ -11656,7 +11659,7 @@
             </a:pPr>
             <a:r>
               <a:rPr lang="en"/>
-              <a:t>© 2012-2023 Dirk Riehle, some rights reserved</a:t>
+              <a:t>© 2012, 2023 Dirk Riehle, some rights reserved</a:t>
             </a:r>
             <a:endParaRPr/>
           </a:p>
@@ -12017,34 +12020,338 @@
           </a:p>
         </p:txBody>
       </p:sp>
-      <p:pic>
-        <p:nvPicPr>
+      <p:sp>
+        <p:nvSpPr>
           <p:cNvPr id="58" name="Google Shape;58;p11"/>
-          <p:cNvPicPr preferRelativeResize="0"/>
-          <p:nvPr/>
-        </p:nvPicPr>
-        <p:blipFill>
-          <a:blip r:embed="rId4">
-            <a:alphaModFix/>
-          </a:blip>
-          <a:stretch>
-            <a:fillRect/>
-          </a:stretch>
-        </p:blipFill>
+          <p:cNvSpPr txBox="1"/>
+          <p:nvPr>
+            <p:ph idx="1" type="body"/>
+          </p:nvPr>
+        </p:nvSpPr>
         <p:spPr>
           <a:xfrm>
             <a:off x="274320" y="914400"/>
-            <a:ext cx="8595360" cy="3502840"/>
+            <a:ext cx="4114800" cy="4114800"/>
           </a:xfrm>
           <a:prstGeom prst="rect">
             <a:avLst/>
           </a:prstGeom>
-          <a:noFill/>
-          <a:ln>
-            <a:noFill/>
-          </a:ln>
         </p:spPr>
-      </p:pic>
+        <p:txBody>
+          <a:bodyPr anchorCtr="0" anchor="t" bIns="91425" lIns="0" spcFirstLastPara="1" rIns="91425" wrap="square" tIns="0">
+            <a:noAutofit/>
+          </a:bodyPr>
+          <a:lstStyle/>
+          <a:p>
+            <a:pPr indent="0" lvl="0" marL="0" rtl="0" algn="l">
+              <a:spcBef>
+                <a:spcPts val="0"/>
+              </a:spcBef>
+              <a:spcAft>
+                <a:spcPts val="0"/>
+              </a:spcAft>
+              <a:buNone/>
+            </a:pPr>
+            <a:r>
+              <a:rPr b="1" lang="en"/>
+              <a:t>Overview</a:t>
+            </a:r>
+            <a:endParaRPr b="1"/>
+          </a:p>
+          <a:p>
+            <a:pPr indent="-342900" lvl="0" marL="457200" rtl="0" algn="l">
+              <a:spcBef>
+                <a:spcPts val="1200"/>
+              </a:spcBef>
+              <a:spcAft>
+                <a:spcPts val="0"/>
+              </a:spcAft>
+              <a:buSzPts val="1800"/>
+              <a:buAutoNum type="arabicPeriod"/>
+            </a:pPr>
+            <a:r>
+              <a:rPr lang="en"/>
+              <a:t>What is science?</a:t>
+            </a:r>
+            <a:endParaRPr/>
+          </a:p>
+          <a:p>
+            <a:pPr indent="-342900" lvl="0" marL="457200" rtl="0" algn="l">
+              <a:spcBef>
+                <a:spcPts val="0"/>
+              </a:spcBef>
+              <a:spcAft>
+                <a:spcPts val="0"/>
+              </a:spcAft>
+              <a:buSzPts val="1800"/>
+              <a:buAutoNum type="arabicPeriod"/>
+            </a:pPr>
+            <a:r>
+              <a:rPr lang="en"/>
+              <a:t>Scientific research</a:t>
+            </a:r>
+            <a:endParaRPr/>
+          </a:p>
+          <a:p>
+            <a:pPr indent="0" lvl="0" marL="0" rtl="0" algn="l">
+              <a:spcBef>
+                <a:spcPts val="1200"/>
+              </a:spcBef>
+              <a:spcAft>
+                <a:spcPts val="0"/>
+              </a:spcAft>
+              <a:buNone/>
+            </a:pPr>
+            <a:r>
+              <a:rPr b="1" lang="en"/>
+              <a:t>Theory building</a:t>
+            </a:r>
+            <a:endParaRPr b="1"/>
+          </a:p>
+          <a:p>
+            <a:pPr indent="-342900" lvl="0" marL="457200" rtl="0" algn="l">
+              <a:spcBef>
+                <a:spcPts val="1200"/>
+              </a:spcBef>
+              <a:spcAft>
+                <a:spcPts val="0"/>
+              </a:spcAft>
+              <a:buSzPts val="1800"/>
+              <a:buAutoNum type="arabicPeriod" startAt="3"/>
+            </a:pPr>
+            <a:r>
+              <a:rPr lang="en"/>
+              <a:t>Qualitative data analysis</a:t>
+            </a:r>
+            <a:endParaRPr/>
+          </a:p>
+          <a:p>
+            <a:pPr indent="-342900" lvl="0" marL="457200" rtl="0" algn="l">
+              <a:spcBef>
+                <a:spcPts val="0"/>
+              </a:spcBef>
+              <a:spcAft>
+                <a:spcPts val="0"/>
+              </a:spcAft>
+              <a:buSzPts val="1800"/>
+              <a:buAutoNum type="arabicPeriod" startAt="3"/>
+            </a:pPr>
+            <a:r>
+              <a:rPr lang="en"/>
+              <a:t>Systematic reviews</a:t>
+            </a:r>
+            <a:endParaRPr/>
+          </a:p>
+          <a:p>
+            <a:pPr indent="-342900" lvl="0" marL="457200" rtl="0" algn="l">
+              <a:spcBef>
+                <a:spcPts val="0"/>
+              </a:spcBef>
+              <a:spcAft>
+                <a:spcPts val="0"/>
+              </a:spcAft>
+              <a:buSzPts val="1800"/>
+              <a:buAutoNum type="arabicPeriod" startAt="3"/>
+            </a:pPr>
+            <a:r>
+              <a:rPr lang="en"/>
+              <a:t>Qualitative surveys</a:t>
+            </a:r>
+            <a:endParaRPr/>
+          </a:p>
+          <a:p>
+            <a:pPr indent="-342900" lvl="0" marL="457200" rtl="0" algn="l">
+              <a:spcBef>
+                <a:spcPts val="0"/>
+              </a:spcBef>
+              <a:spcAft>
+                <a:spcPts val="0"/>
+              </a:spcAft>
+              <a:buSzPts val="1800"/>
+              <a:buAutoNum type="arabicPeriod" startAt="3"/>
+            </a:pPr>
+            <a:r>
+              <a:rPr lang="en"/>
+              <a:t>Action research</a:t>
+            </a:r>
+            <a:endParaRPr/>
+          </a:p>
+          <a:p>
+            <a:pPr indent="-342900" lvl="0" marL="457200" rtl="0" algn="l">
+              <a:spcBef>
+                <a:spcPts val="0"/>
+              </a:spcBef>
+              <a:spcAft>
+                <a:spcPts val="0"/>
+              </a:spcAft>
+              <a:buSzPts val="1800"/>
+              <a:buAutoNum type="arabicPeriod" startAt="3"/>
+            </a:pPr>
+            <a:r>
+              <a:rPr lang="en"/>
+              <a:t>Case study research</a:t>
+            </a:r>
+            <a:endParaRPr/>
+          </a:p>
+        </p:txBody>
+      </p:sp>
+      <p:sp>
+        <p:nvSpPr>
+          <p:cNvPr id="59" name="Google Shape;59;p11"/>
+          <p:cNvSpPr txBox="1"/>
+          <p:nvPr>
+            <p:ph idx="2" type="body"/>
+          </p:nvPr>
+        </p:nvSpPr>
+        <p:spPr>
+          <a:xfrm>
+            <a:off x="4846320" y="914400"/>
+            <a:ext cx="4114800" cy="4114800"/>
+          </a:xfrm>
+          <a:prstGeom prst="rect">
+            <a:avLst/>
+          </a:prstGeom>
+        </p:spPr>
+        <p:txBody>
+          <a:bodyPr anchorCtr="0" anchor="t" bIns="0" lIns="0" spcFirstLastPara="1" rIns="0" wrap="square" tIns="0">
+            <a:noAutofit/>
+          </a:bodyPr>
+          <a:lstStyle/>
+          <a:p>
+            <a:pPr indent="0" lvl="0" marL="0" rtl="0" algn="l">
+              <a:spcBef>
+                <a:spcPts val="0"/>
+              </a:spcBef>
+              <a:spcAft>
+                <a:spcPts val="0"/>
+              </a:spcAft>
+              <a:buNone/>
+            </a:pPr>
+            <a:r>
+              <a:rPr b="1" lang="en"/>
+              <a:t>Theory validation</a:t>
+            </a:r>
+            <a:endParaRPr b="1"/>
+          </a:p>
+          <a:p>
+            <a:pPr indent="-342900" lvl="0" marL="457200" rtl="0" algn="l">
+              <a:spcBef>
+                <a:spcPts val="1200"/>
+              </a:spcBef>
+              <a:spcAft>
+                <a:spcPts val="0"/>
+              </a:spcAft>
+              <a:buSzPts val="1800"/>
+              <a:buAutoNum type="arabicPeriod" startAt="8"/>
+            </a:pPr>
+            <a:r>
+              <a:rPr lang="en"/>
+              <a:t>Survey research</a:t>
+            </a:r>
+            <a:endParaRPr/>
+          </a:p>
+          <a:p>
+            <a:pPr indent="-342900" lvl="0" marL="457200" rtl="0" algn="l">
+              <a:spcBef>
+                <a:spcPts val="0"/>
+              </a:spcBef>
+              <a:spcAft>
+                <a:spcPts val="0"/>
+              </a:spcAft>
+              <a:buSzPts val="1800"/>
+              <a:buAutoNum type="arabicPeriod" startAt="8"/>
+            </a:pPr>
+            <a:r>
+              <a:rPr lang="en"/>
+              <a:t>Controlled experiments</a:t>
+            </a:r>
+            <a:endParaRPr/>
+          </a:p>
+          <a:p>
+            <a:pPr indent="0" lvl="0" marL="0" rtl="0" algn="l">
+              <a:spcBef>
+                <a:spcPts val="1200"/>
+              </a:spcBef>
+              <a:spcAft>
+                <a:spcPts val="0"/>
+              </a:spcAft>
+              <a:buNone/>
+            </a:pPr>
+            <a:r>
+              <a:rPr b="1" lang="en"/>
+              <a:t>Comprehensive</a:t>
+            </a:r>
+            <a:endParaRPr b="1"/>
+          </a:p>
+          <a:p>
+            <a:pPr indent="-342900" lvl="0" marL="457200" rtl="0" algn="l">
+              <a:spcBef>
+                <a:spcPts val="1200"/>
+              </a:spcBef>
+              <a:spcAft>
+                <a:spcPts val="0"/>
+              </a:spcAft>
+              <a:buSzPts val="1800"/>
+              <a:buAutoNum type="arabicPeriod" startAt="10"/>
+            </a:pPr>
+            <a:r>
+              <a:rPr lang="en"/>
+              <a:t>Design science</a:t>
+            </a:r>
+            <a:endParaRPr/>
+          </a:p>
+          <a:p>
+            <a:pPr indent="0" lvl="0" marL="0" rtl="0" algn="l">
+              <a:spcBef>
+                <a:spcPts val="1200"/>
+              </a:spcBef>
+              <a:spcAft>
+                <a:spcPts val="0"/>
+              </a:spcAft>
+              <a:buNone/>
+            </a:pPr>
+            <a:r>
+              <a:rPr b="1" lang="en"/>
+              <a:t>Academia</a:t>
+            </a:r>
+            <a:endParaRPr b="1"/>
+          </a:p>
+          <a:p>
+            <a:pPr indent="-342900" lvl="0" marL="457200" rtl="0" algn="l">
+              <a:spcBef>
+                <a:spcPts val="1200"/>
+              </a:spcBef>
+              <a:spcAft>
+                <a:spcPts val="0"/>
+              </a:spcAft>
+              <a:buSzPts val="1800"/>
+              <a:buAutoNum type="arabicPeriod" startAt="11"/>
+            </a:pPr>
+            <a:r>
+              <a:rPr lang="en"/>
+              <a:t>Academic writing</a:t>
+            </a:r>
+            <a:endParaRPr/>
+          </a:p>
+          <a:p>
+            <a:pPr indent="-342900" lvl="0" marL="457200" rtl="0" algn="l">
+              <a:spcBef>
+                <a:spcPts val="0"/>
+              </a:spcBef>
+              <a:spcAft>
+                <a:spcPts val="0"/>
+              </a:spcAft>
+              <a:buSzPts val="1800"/>
+              <a:buAutoNum type="arabicPeriod" startAt="11"/>
+            </a:pPr>
+            <a:r>
+              <a:rPr lang="en"/>
+              <a:t>Academic publishing</a:t>
+            </a:r>
+            <a:endParaRPr/>
+          </a:p>
+        </p:txBody>
+      </p:sp>
     </p:spTree>
   </p:cSld>
   <p:clrMapOvr>
@@ -12058,7 +12365,7 @@
   <p:cSld>
     <p:spTree>
       <p:nvGrpSpPr>
-        <p:cNvPr id="62" name="Shape 62"/>
+        <p:cNvPr id="63" name="Shape 63"/>
         <p:cNvGrpSpPr/>
         <p:nvPr/>
       </p:nvGrpSpPr>
@@ -12072,7 +12379,7 @@
       </p:grpSpPr>
       <p:sp>
         <p:nvSpPr>
-          <p:cNvPr id="63" name="Google Shape;63;p12"/>
+          <p:cNvPr id="64" name="Google Shape;64;p12"/>
           <p:cNvSpPr txBox="1"/>
           <p:nvPr>
             <p:ph type="title"/>
@@ -12112,7 +12419,7 @@
       </p:sp>
       <p:sp>
         <p:nvSpPr>
-          <p:cNvPr id="64" name="Google Shape;64;p12"/>
+          <p:cNvPr id="65" name="Google Shape;65;p12"/>
           <p:cNvSpPr txBox="1"/>
           <p:nvPr>
             <p:ph idx="1" type="body"/>
@@ -12169,7 +12476,7 @@
       </p:sp>
       <p:sp>
         <p:nvSpPr>
-          <p:cNvPr id="65" name="Google Shape;65;p12"/>
+          <p:cNvPr id="66" name="Google Shape;66;p12"/>
           <p:cNvSpPr txBox="1"/>
           <p:nvPr>
             <p:ph idx="12" type="sldNum"/>
@@ -12253,7 +12560,7 @@
   <p:cSld>
     <p:spTree>
       <p:nvGrpSpPr>
-        <p:cNvPr id="69" name="Shape 69"/>
+        <p:cNvPr id="70" name="Shape 70"/>
         <p:cNvGrpSpPr/>
         <p:nvPr/>
       </p:nvGrpSpPr>
@@ -12267,7 +12574,7 @@
       </p:grpSpPr>
       <p:sp>
         <p:nvSpPr>
-          <p:cNvPr id="70" name="Google Shape;70;p13"/>
+          <p:cNvPr id="71" name="Google Shape;71;p13"/>
           <p:cNvSpPr txBox="1"/>
           <p:nvPr>
             <p:ph type="title"/>
@@ -12307,7 +12614,7 @@
       </p:sp>
       <p:sp>
         <p:nvSpPr>
-          <p:cNvPr id="71" name="Google Shape;71;p13"/>
+          <p:cNvPr id="72" name="Google Shape;72;p13"/>
           <p:cNvSpPr txBox="1"/>
           <p:nvPr>
             <p:ph idx="1" type="body"/>
@@ -12445,7 +12752,7 @@
       </p:sp>
       <p:sp>
         <p:nvSpPr>
-          <p:cNvPr id="72" name="Google Shape;72;p13"/>
+          <p:cNvPr id="73" name="Google Shape;73;p13"/>
           <p:cNvSpPr txBox="1"/>
           <p:nvPr>
             <p:ph idx="12" type="sldNum"/>
@@ -12529,7 +12836,7 @@
   <p:cSld>
     <p:spTree>
       <p:nvGrpSpPr>
-        <p:cNvPr id="76" name="Shape 76"/>
+        <p:cNvPr id="77" name="Shape 77"/>
         <p:cNvGrpSpPr/>
         <p:nvPr/>
       </p:nvGrpSpPr>
@@ -12543,7 +12850,7 @@
       </p:grpSpPr>
       <p:sp>
         <p:nvSpPr>
-          <p:cNvPr id="77" name="Google Shape;77;p14"/>
+          <p:cNvPr id="78" name="Google Shape;78;p14"/>
           <p:cNvSpPr txBox="1"/>
           <p:nvPr>
             <p:ph type="title"/>
@@ -12583,7 +12890,7 @@
       </p:sp>
       <p:sp>
         <p:nvSpPr>
-          <p:cNvPr id="78" name="Google Shape;78;p14"/>
+          <p:cNvPr id="79" name="Google Shape;79;p14"/>
           <p:cNvSpPr txBox="1"/>
           <p:nvPr>
             <p:ph idx="12" type="sldNum"/>
@@ -12656,7 +12963,7 @@
       </p:sp>
       <p:pic>
         <p:nvPicPr>
-          <p:cNvPr id="79" name="Google Shape;79;p14"/>
+          <p:cNvPr id="80" name="Google Shape;80;p14"/>
           <p:cNvPicPr preferRelativeResize="0"/>
           <p:nvPr/>
         </p:nvPicPr>
@@ -12671,7 +12978,7 @@
         <p:spPr>
           <a:xfrm>
             <a:off x="274320" y="914400"/>
-            <a:ext cx="8595359" cy="3629153"/>
+            <a:ext cx="8595358" cy="3613749"/>
           </a:xfrm>
           <a:prstGeom prst="rect">
             <a:avLst/>
@@ -12695,7 +13002,7 @@
   <p:cSld>
     <p:spTree>
       <p:nvGrpSpPr>
-        <p:cNvPr id="83" name="Shape 83"/>
+        <p:cNvPr id="84" name="Shape 84"/>
         <p:cNvGrpSpPr/>
         <p:nvPr/>
       </p:nvGrpSpPr>
@@ -12709,7 +13016,7 @@
       </p:grpSpPr>
       <p:sp>
         <p:nvSpPr>
-          <p:cNvPr id="84" name="Google Shape;84;p15"/>
+          <p:cNvPr id="85" name="Google Shape;85;p15"/>
           <p:cNvSpPr txBox="1"/>
           <p:nvPr>
             <p:ph type="title"/>
@@ -12753,7 +13060,7 @@
       </p:sp>
       <p:sp>
         <p:nvSpPr>
-          <p:cNvPr id="85" name="Google Shape;85;p15"/>
+          <p:cNvPr id="86" name="Google Shape;86;p15"/>
           <p:cNvSpPr txBox="1"/>
           <p:nvPr>
             <p:ph idx="12" type="sldNum"/>
@@ -12826,7 +13133,7 @@
       </p:sp>
       <p:graphicFrame>
         <p:nvGraphicFramePr>
-          <p:cNvPr id="86" name="Google Shape;86;p15"/>
+          <p:cNvPr id="87" name="Google Shape;87;p15"/>
           <p:cNvGraphicFramePr/>
           <p:nvPr/>
         </p:nvGraphicFramePr>
@@ -12839,7 +13146,7 @@
             <a:tbl>
               <a:tblPr>
                 <a:noFill/>
-                <a:tableStyleId>{067A0ED2-2E35-4495-812A-DB64C3BFA2AA}</a:tableStyleId>
+                <a:tableStyleId>{DDE2DAFE-37E4-4289-9B02-062B57317037}</a:tableStyleId>
               </a:tblPr>
               <a:tblGrid>
                 <a:gridCol w="1719075"/>
@@ -14075,14 +14382,14 @@
       </p:graphicFrame>
       <p:sp>
         <p:nvSpPr>
-          <p:cNvPr id="87" name="Google Shape;87;p15"/>
+          <p:cNvPr id="88" name="Google Shape;88;p15"/>
           <p:cNvSpPr txBox="1"/>
           <p:nvPr/>
         </p:nvSpPr>
         <p:spPr>
           <a:xfrm>
-            <a:off x="0" y="4503350"/>
-            <a:ext cx="9144000" cy="640200"/>
+            <a:off x="0" y="4233672"/>
+            <a:ext cx="7315200" cy="914400"/>
           </a:xfrm>
           <a:prstGeom prst="rect">
             <a:avLst/>
@@ -14144,7 +14451,7 @@
   <p:cSld>
     <p:spTree>
       <p:nvGrpSpPr>
-        <p:cNvPr id="91" name="Shape 91"/>
+        <p:cNvPr id="92" name="Shape 92"/>
         <p:cNvGrpSpPr/>
         <p:nvPr/>
       </p:nvGrpSpPr>
@@ -14158,7 +14465,7 @@
       </p:grpSpPr>
       <p:sp>
         <p:nvSpPr>
-          <p:cNvPr id="92" name="Google Shape;92;p16"/>
+          <p:cNvPr id="93" name="Google Shape;93;p16"/>
           <p:cNvSpPr txBox="1"/>
           <p:nvPr>
             <p:ph type="title"/>
@@ -14198,7 +14505,7 @@
       </p:sp>
       <p:sp>
         <p:nvSpPr>
-          <p:cNvPr id="93" name="Google Shape;93;p16"/>
+          <p:cNvPr id="94" name="Google Shape;94;p16"/>
           <p:cNvSpPr txBox="1"/>
           <p:nvPr>
             <p:ph idx="12" type="sldNum"/>
@@ -14271,7 +14578,7 @@
       </p:sp>
       <p:sp>
         <p:nvSpPr>
-          <p:cNvPr id="94" name="Google Shape;94;p16"/>
+          <p:cNvPr id="95" name="Google Shape;95;p16"/>
           <p:cNvSpPr txBox="1"/>
           <p:nvPr>
             <p:ph idx="1" type="body"/>
@@ -14454,14 +14761,14 @@
       </p:sp>
       <p:sp>
         <p:nvSpPr>
-          <p:cNvPr id="95" name="Google Shape;95;p16"/>
+          <p:cNvPr id="96" name="Google Shape;96;p16"/>
           <p:cNvSpPr txBox="1"/>
           <p:nvPr/>
         </p:nvSpPr>
         <p:spPr>
           <a:xfrm>
             <a:off x="0" y="4233672"/>
-            <a:ext cx="9144000" cy="914400"/>
+            <a:ext cx="7315200" cy="914400"/>
           </a:xfrm>
           <a:prstGeom prst="rect">
             <a:avLst/>
@@ -14516,6 +14823,285 @@
 </file>
 
 <file path=ppt/theme/theme1.xml><?xml version="1.0" encoding="utf-8"?>
+<a:theme xmlns:a="http://schemas.openxmlformats.org/drawingml/2006/main" xmlns:r="http://schemas.openxmlformats.org/officeDocument/2006/relationships" name="NYT Slides Template">
+  <a:themeElements>
+    <a:clrScheme name="Simple Light">
+      <a:dk1>
+        <a:srgbClr val="000000"/>
+      </a:dk1>
+      <a:lt1>
+        <a:srgbClr val="FFFFFF"/>
+      </a:lt1>
+      <a:dk2>
+        <a:srgbClr val="404040"/>
+      </a:dk2>
+      <a:lt2>
+        <a:srgbClr val="808080"/>
+      </a:lt2>
+      <a:accent1>
+        <a:srgbClr val="D0D0D0"/>
+      </a:accent1>
+      <a:accent2>
+        <a:srgbClr val="4169E1"/>
+      </a:accent2>
+      <a:accent3>
+        <a:srgbClr val="D50D01"/>
+      </a:accent3>
+      <a:accent4>
+        <a:srgbClr val="FEB612"/>
+      </a:accent4>
+      <a:accent5>
+        <a:srgbClr val="4CAF50"/>
+      </a:accent5>
+      <a:accent6>
+        <a:srgbClr val="8E44AD"/>
+      </a:accent6>
+      <a:hlink>
+        <a:srgbClr val="34A3C5"/>
+      </a:hlink>
+      <a:folHlink>
+        <a:srgbClr val="0097A7"/>
+      </a:folHlink>
+    </a:clrScheme>
+    <a:fontScheme name="Office">
+      <a:majorFont>
+        <a:latin typeface="Arial"/>
+        <a:ea typeface=""/>
+        <a:cs typeface=""/>
+        <a:font script="Jpan" typeface="ＭＳ Ｐゴシック"/>
+        <a:font script="Hang" typeface="맑은 고딕"/>
+        <a:font script="Hans" typeface="宋体"/>
+        <a:font script="Hant" typeface="新細明體"/>
+        <a:font script="Arab" typeface="Times New Roman"/>
+        <a:font script="Hebr" typeface="Times New Roman"/>
+        <a:font script="Thai" typeface="Angsana New"/>
+        <a:font script="Ethi" typeface="Nyala"/>
+        <a:font script="Beng" typeface="Vrinda"/>
+        <a:font script="Gujr" typeface="Shruti"/>
+        <a:font script="Khmr" typeface="MoolBoran"/>
+        <a:font script="Knda" typeface="Tunga"/>
+        <a:font script="Guru" typeface="Raavi"/>
+        <a:font script="Cans" typeface="Euphemia"/>
+        <a:font script="Cher" typeface="Plantagenet Cherokee"/>
+        <a:font script="Yiii" typeface="Microsoft Yi Baiti"/>
+        <a:font script="Tibt" typeface="Microsoft Himalaya"/>
+        <a:font script="Thaa" typeface="MV Boli"/>
+        <a:font script="Deva" typeface="Mangal"/>
+        <a:font script="Telu" typeface="Gautami"/>
+        <a:font script="Taml" typeface="Latha"/>
+        <a:font script="Syrc" typeface="Estrangelo Edessa"/>
+        <a:font script="Orya" typeface="Kalinga"/>
+        <a:font script="Mlym" typeface="Kartika"/>
+        <a:font script="Laoo" typeface="DokChampa"/>
+        <a:font script="Sinh" typeface="Iskoola Pota"/>
+        <a:font script="Mong" typeface="Mongolian Baiti"/>
+        <a:font script="Viet" typeface="Times New Roman"/>
+        <a:font script="Uigh" typeface="Microsoft Uighur"/>
+        <a:font script="Geor" typeface="Sylfaen"/>
+      </a:majorFont>
+      <a:minorFont>
+        <a:latin typeface="Arial"/>
+        <a:ea typeface=""/>
+        <a:cs typeface=""/>
+        <a:font script="Jpan" typeface="ＭＳ Ｐゴシック"/>
+        <a:font script="Hang" typeface="맑은 고딕"/>
+        <a:font script="Hans" typeface="宋体"/>
+        <a:font script="Hant" typeface="新細明體"/>
+        <a:font script="Arab" typeface="Arial"/>
+        <a:font script="Hebr" typeface="Arial"/>
+        <a:font script="Thai" typeface="Cordia New"/>
+        <a:font script="Ethi" typeface="Nyala"/>
+        <a:font script="Beng" typeface="Vrinda"/>
+        <a:font script="Gujr" typeface="Shruti"/>
+        <a:font script="Khmr" typeface="DaunPenh"/>
+        <a:font script="Knda" typeface="Tunga"/>
+        <a:font script="Guru" typeface="Raavi"/>
+        <a:font script="Cans" typeface="Euphemia"/>
+        <a:font script="Cher" typeface="Plantagenet Cherokee"/>
+        <a:font script="Yiii" typeface="Microsoft Yi Baiti"/>
+        <a:font script="Tibt" typeface="Microsoft Himalaya"/>
+        <a:font script="Thaa" typeface="MV Boli"/>
+        <a:font script="Deva" typeface="Mangal"/>
+        <a:font script="Telu" typeface="Gautami"/>
+        <a:font script="Taml" typeface="Latha"/>
+        <a:font script="Syrc" typeface="Estrangelo Edessa"/>
+        <a:font script="Orya" typeface="Kalinga"/>
+        <a:font script="Mlym" typeface="Kartika"/>
+        <a:font script="Laoo" typeface="DokChampa"/>
+        <a:font script="Sinh" typeface="Iskoola Pota"/>
+        <a:font script="Mong" typeface="Mongolian Baiti"/>
+        <a:font script="Viet" typeface="Arial"/>
+        <a:font script="Uigh" typeface="Microsoft Uighur"/>
+        <a:font script="Geor" typeface="Sylfaen"/>
+      </a:minorFont>
+    </a:fontScheme>
+    <a:fmtScheme name="Office">
+      <a:fillStyleLst>
+        <a:solidFill>
+          <a:schemeClr val="phClr"/>
+        </a:solidFill>
+        <a:gradFill rotWithShape="1">
+          <a:gsLst>
+            <a:gs pos="0">
+              <a:schemeClr val="phClr">
+                <a:tint val="50000"/>
+                <a:satMod val="300000"/>
+              </a:schemeClr>
+            </a:gs>
+            <a:gs pos="35000">
+              <a:schemeClr val="phClr">
+                <a:tint val="37000"/>
+                <a:satMod val="300000"/>
+              </a:schemeClr>
+            </a:gs>
+            <a:gs pos="100000">
+              <a:schemeClr val="phClr">
+                <a:tint val="15000"/>
+                <a:satMod val="350000"/>
+              </a:schemeClr>
+            </a:gs>
+          </a:gsLst>
+          <a:lin ang="16200000" scaled="1"/>
+        </a:gradFill>
+        <a:gradFill rotWithShape="1">
+          <a:gsLst>
+            <a:gs pos="0">
+              <a:schemeClr val="phClr">
+                <a:tint val="100000"/>
+                <a:shade val="100000"/>
+                <a:satMod val="130000"/>
+              </a:schemeClr>
+            </a:gs>
+            <a:gs pos="100000">
+              <a:schemeClr val="phClr">
+                <a:tint val="50000"/>
+                <a:shade val="100000"/>
+                <a:satMod val="350000"/>
+              </a:schemeClr>
+            </a:gs>
+          </a:gsLst>
+          <a:lin ang="16200000" scaled="0"/>
+        </a:gradFill>
+      </a:fillStyleLst>
+      <a:lnStyleLst>
+        <a:ln w="9525" cap="flat" cmpd="sng" algn="ctr">
+          <a:solidFill>
+            <a:schemeClr val="phClr">
+              <a:shade val="95000"/>
+              <a:satMod val="105000"/>
+            </a:schemeClr>
+          </a:solidFill>
+          <a:prstDash val="solid"/>
+        </a:ln>
+        <a:ln w="25400" cap="flat" cmpd="sng" algn="ctr">
+          <a:solidFill>
+            <a:schemeClr val="phClr"/>
+          </a:solidFill>
+          <a:prstDash val="solid"/>
+        </a:ln>
+        <a:ln w="38100" cap="flat" cmpd="sng" algn="ctr">
+          <a:solidFill>
+            <a:schemeClr val="phClr"/>
+          </a:solidFill>
+          <a:prstDash val="solid"/>
+        </a:ln>
+      </a:lnStyleLst>
+      <a:effectStyleLst>
+        <a:effectStyle>
+          <a:effectLst>
+            <a:outerShdw blurRad="40000" dist="20000" dir="5400000" rotWithShape="0">
+              <a:srgbClr val="000000">
+                <a:alpha val="38000"/>
+              </a:srgbClr>
+            </a:outerShdw>
+          </a:effectLst>
+        </a:effectStyle>
+        <a:effectStyle>
+          <a:effectLst>
+            <a:outerShdw blurRad="40000" dist="23000" dir="5400000" rotWithShape="0">
+              <a:srgbClr val="000000">
+                <a:alpha val="35000"/>
+              </a:srgbClr>
+            </a:outerShdw>
+          </a:effectLst>
+        </a:effectStyle>
+        <a:effectStyle>
+          <a:effectLst>
+            <a:outerShdw blurRad="40000" dist="23000" dir="5400000" rotWithShape="0">
+              <a:srgbClr val="000000">
+                <a:alpha val="35000"/>
+              </a:srgbClr>
+            </a:outerShdw>
+          </a:effectLst>
+          <a:scene3d>
+            <a:camera prst="orthographicFront">
+              <a:rot lat="0" lon="0" rev="0"/>
+            </a:camera>
+            <a:lightRig rig="threePt" dir="t">
+              <a:rot lat="0" lon="0" rev="1200000"/>
+            </a:lightRig>
+          </a:scene3d>
+          <a:sp3d>
+            <a:bevelT w="63500" h="25400"/>
+          </a:sp3d>
+        </a:effectStyle>
+      </a:effectStyleLst>
+      <a:bgFillStyleLst>
+        <a:solidFill>
+          <a:schemeClr val="phClr"/>
+        </a:solidFill>
+        <a:gradFill rotWithShape="1">
+          <a:gsLst>
+            <a:gs pos="0">
+              <a:schemeClr val="phClr">
+                <a:tint val="40000"/>
+                <a:satMod val="350000"/>
+              </a:schemeClr>
+            </a:gs>
+            <a:gs pos="40000">
+              <a:schemeClr val="phClr">
+                <a:tint val="45000"/>
+                <a:shade val="99000"/>
+                <a:satMod val="350000"/>
+              </a:schemeClr>
+            </a:gs>
+            <a:gs pos="100000">
+              <a:schemeClr val="phClr">
+                <a:shade val="20000"/>
+                <a:satMod val="255000"/>
+              </a:schemeClr>
+            </a:gs>
+          </a:gsLst>
+          <a:path path="circle">
+            <a:fillToRect l="50000" t="-80000" r="50000" b="180000"/>
+          </a:path>
+        </a:gradFill>
+        <a:gradFill rotWithShape="1">
+          <a:gsLst>
+            <a:gs pos="0">
+              <a:schemeClr val="phClr">
+                <a:tint val="80000"/>
+                <a:satMod val="300000"/>
+              </a:schemeClr>
+            </a:gs>
+            <a:gs pos="100000">
+              <a:schemeClr val="phClr">
+                <a:shade val="30000"/>
+                <a:satMod val="200000"/>
+              </a:schemeClr>
+            </a:gs>
+          </a:gsLst>
+          <a:path path="circle">
+            <a:fillToRect l="50000" t="50000" r="50000" b="50000"/>
+          </a:path>
+        </a:gradFill>
+      </a:bgFillStyleLst>
+    </a:fmtScheme>
+  </a:themeElements>
+</a:theme>
+</file>
+
+<file path=ppt/theme/theme2.xml><?xml version="1.0" encoding="utf-8"?>
 <a:theme xmlns:a="http://schemas.openxmlformats.org/drawingml/2006/main" xmlns:r="http://schemas.openxmlformats.org/officeDocument/2006/relationships">
   <a:themeElements>
     <a:clrScheme name="Default">
@@ -14792,283 +15378,4 @@
     </a:fmtScheme>
   </a:themeElements>
 </a:theme>
-</file>
-
-<file path=ppt/theme/theme2.xml><?xml version="1.0" encoding="utf-8"?>
-<a:theme xmlns:a="http://schemas.openxmlformats.org/drawingml/2006/main" xmlns:r="http://schemas.openxmlformats.org/officeDocument/2006/relationships" name="NYT Slides Template">
-  <a:themeElements>
-    <a:clrScheme name="Simple Light">
-      <a:dk1>
-        <a:srgbClr val="000000"/>
-      </a:dk1>
-      <a:lt1>
-        <a:srgbClr val="FFFFFF"/>
-      </a:lt1>
-      <a:dk2>
-        <a:srgbClr val="404040"/>
-      </a:dk2>
-      <a:lt2>
-        <a:srgbClr val="808080"/>
-      </a:lt2>
-      <a:accent1>
-        <a:srgbClr val="D0D0D0"/>
-      </a:accent1>
-      <a:accent2>
-        <a:srgbClr val="4169E1"/>
-      </a:accent2>
-      <a:accent3>
-        <a:srgbClr val="D50D01"/>
-      </a:accent3>
-      <a:accent4>
-        <a:srgbClr val="FEB612"/>
-      </a:accent4>
-      <a:accent5>
-        <a:srgbClr val="4CAF50"/>
-      </a:accent5>
-      <a:accent6>
-        <a:srgbClr val="8E44AD"/>
-      </a:accent6>
-      <a:hlink>
-        <a:srgbClr val="34A3C5"/>
-      </a:hlink>
-      <a:folHlink>
-        <a:srgbClr val="0097A7"/>
-      </a:folHlink>
-    </a:clrScheme>
-    <a:fontScheme name="Office">
-      <a:majorFont>
-        <a:latin typeface="Arial"/>
-        <a:ea typeface=""/>
-        <a:cs typeface=""/>
-        <a:font script="Jpan" typeface="ＭＳ Ｐゴシック"/>
-        <a:font script="Hang" typeface="맑은 고딕"/>
-        <a:font script="Hans" typeface="宋体"/>
-        <a:font script="Hant" typeface="新細明體"/>
-        <a:font script="Arab" typeface="Times New Roman"/>
-        <a:font script="Hebr" typeface="Times New Roman"/>
-        <a:font script="Thai" typeface="Angsana New"/>
-        <a:font script="Ethi" typeface="Nyala"/>
-        <a:font script="Beng" typeface="Vrinda"/>
-        <a:font script="Gujr" typeface="Shruti"/>
-        <a:font script="Khmr" typeface="MoolBoran"/>
-        <a:font script="Knda" typeface="Tunga"/>
-        <a:font script="Guru" typeface="Raavi"/>
-        <a:font script="Cans" typeface="Euphemia"/>
-        <a:font script="Cher" typeface="Plantagenet Cherokee"/>
-        <a:font script="Yiii" typeface="Microsoft Yi Baiti"/>
-        <a:font script="Tibt" typeface="Microsoft Himalaya"/>
-        <a:font script="Thaa" typeface="MV Boli"/>
-        <a:font script="Deva" typeface="Mangal"/>
-        <a:font script="Telu" typeface="Gautami"/>
-        <a:font script="Taml" typeface="Latha"/>
-        <a:font script="Syrc" typeface="Estrangelo Edessa"/>
-        <a:font script="Orya" typeface="Kalinga"/>
-        <a:font script="Mlym" typeface="Kartika"/>
-        <a:font script="Laoo" typeface="DokChampa"/>
-        <a:font script="Sinh" typeface="Iskoola Pota"/>
-        <a:font script="Mong" typeface="Mongolian Baiti"/>
-        <a:font script="Viet" typeface="Times New Roman"/>
-        <a:font script="Uigh" typeface="Microsoft Uighur"/>
-        <a:font script="Geor" typeface="Sylfaen"/>
-      </a:majorFont>
-      <a:minorFont>
-        <a:latin typeface="Arial"/>
-        <a:ea typeface=""/>
-        <a:cs typeface=""/>
-        <a:font script="Jpan" typeface="ＭＳ Ｐゴシック"/>
-        <a:font script="Hang" typeface="맑은 고딕"/>
-        <a:font script="Hans" typeface="宋体"/>
-        <a:font script="Hant" typeface="新細明體"/>
-        <a:font script="Arab" typeface="Arial"/>
-        <a:font script="Hebr" typeface="Arial"/>
-        <a:font script="Thai" typeface="Cordia New"/>
-        <a:font script="Ethi" typeface="Nyala"/>
-        <a:font script="Beng" typeface="Vrinda"/>
-        <a:font script="Gujr" typeface="Shruti"/>
-        <a:font script="Khmr" typeface="DaunPenh"/>
-        <a:font script="Knda" typeface="Tunga"/>
-        <a:font script="Guru" typeface="Raavi"/>
-        <a:font script="Cans" typeface="Euphemia"/>
-        <a:font script="Cher" typeface="Plantagenet Cherokee"/>
-        <a:font script="Yiii" typeface="Microsoft Yi Baiti"/>
-        <a:font script="Tibt" typeface="Microsoft Himalaya"/>
-        <a:font script="Thaa" typeface="MV Boli"/>
-        <a:font script="Deva" typeface="Mangal"/>
-        <a:font script="Telu" typeface="Gautami"/>
-        <a:font script="Taml" typeface="Latha"/>
-        <a:font script="Syrc" typeface="Estrangelo Edessa"/>
-        <a:font script="Orya" typeface="Kalinga"/>
-        <a:font script="Mlym" typeface="Kartika"/>
-        <a:font script="Laoo" typeface="DokChampa"/>
-        <a:font script="Sinh" typeface="Iskoola Pota"/>
-        <a:font script="Mong" typeface="Mongolian Baiti"/>
-        <a:font script="Viet" typeface="Arial"/>
-        <a:font script="Uigh" typeface="Microsoft Uighur"/>
-        <a:font script="Geor" typeface="Sylfaen"/>
-      </a:minorFont>
-    </a:fontScheme>
-    <a:fmtScheme name="Office">
-      <a:fillStyleLst>
-        <a:solidFill>
-          <a:schemeClr val="phClr"/>
-        </a:solidFill>
-        <a:gradFill rotWithShape="1">
-          <a:gsLst>
-            <a:gs pos="0">
-              <a:schemeClr val="phClr">
-                <a:tint val="50000"/>
-                <a:satMod val="300000"/>
-              </a:schemeClr>
-            </a:gs>
-            <a:gs pos="35000">
-              <a:schemeClr val="phClr">
-                <a:tint val="37000"/>
-                <a:satMod val="300000"/>
-              </a:schemeClr>
-            </a:gs>
-            <a:gs pos="100000">
-              <a:schemeClr val="phClr">
-                <a:tint val="15000"/>
-                <a:satMod val="350000"/>
-              </a:schemeClr>
-            </a:gs>
-          </a:gsLst>
-          <a:lin ang="16200000" scaled="1"/>
-        </a:gradFill>
-        <a:gradFill rotWithShape="1">
-          <a:gsLst>
-            <a:gs pos="0">
-              <a:schemeClr val="phClr">
-                <a:tint val="100000"/>
-                <a:shade val="100000"/>
-                <a:satMod val="130000"/>
-              </a:schemeClr>
-            </a:gs>
-            <a:gs pos="100000">
-              <a:schemeClr val="phClr">
-                <a:tint val="50000"/>
-                <a:shade val="100000"/>
-                <a:satMod val="350000"/>
-              </a:schemeClr>
-            </a:gs>
-          </a:gsLst>
-          <a:lin ang="16200000" scaled="0"/>
-        </a:gradFill>
-      </a:fillStyleLst>
-      <a:lnStyleLst>
-        <a:ln w="9525" cap="flat" cmpd="sng" algn="ctr">
-          <a:solidFill>
-            <a:schemeClr val="phClr">
-              <a:shade val="95000"/>
-              <a:satMod val="105000"/>
-            </a:schemeClr>
-          </a:solidFill>
-          <a:prstDash val="solid"/>
-        </a:ln>
-        <a:ln w="25400" cap="flat" cmpd="sng" algn="ctr">
-          <a:solidFill>
-            <a:schemeClr val="phClr"/>
-          </a:solidFill>
-          <a:prstDash val="solid"/>
-        </a:ln>
-        <a:ln w="38100" cap="flat" cmpd="sng" algn="ctr">
-          <a:solidFill>
-            <a:schemeClr val="phClr"/>
-          </a:solidFill>
-          <a:prstDash val="solid"/>
-        </a:ln>
-      </a:lnStyleLst>
-      <a:effectStyleLst>
-        <a:effectStyle>
-          <a:effectLst>
-            <a:outerShdw blurRad="40000" dist="20000" dir="5400000" rotWithShape="0">
-              <a:srgbClr val="000000">
-                <a:alpha val="38000"/>
-              </a:srgbClr>
-            </a:outerShdw>
-          </a:effectLst>
-        </a:effectStyle>
-        <a:effectStyle>
-          <a:effectLst>
-            <a:outerShdw blurRad="40000" dist="23000" dir="5400000" rotWithShape="0">
-              <a:srgbClr val="000000">
-                <a:alpha val="35000"/>
-              </a:srgbClr>
-            </a:outerShdw>
-          </a:effectLst>
-        </a:effectStyle>
-        <a:effectStyle>
-          <a:effectLst>
-            <a:outerShdw blurRad="40000" dist="23000" dir="5400000" rotWithShape="0">
-              <a:srgbClr val="000000">
-                <a:alpha val="35000"/>
-              </a:srgbClr>
-            </a:outerShdw>
-          </a:effectLst>
-          <a:scene3d>
-            <a:camera prst="orthographicFront">
-              <a:rot lat="0" lon="0" rev="0"/>
-            </a:camera>
-            <a:lightRig rig="threePt" dir="t">
-              <a:rot lat="0" lon="0" rev="1200000"/>
-            </a:lightRig>
-          </a:scene3d>
-          <a:sp3d>
-            <a:bevelT w="63500" h="25400"/>
-          </a:sp3d>
-        </a:effectStyle>
-      </a:effectStyleLst>
-      <a:bgFillStyleLst>
-        <a:solidFill>
-          <a:schemeClr val="phClr"/>
-        </a:solidFill>
-        <a:gradFill rotWithShape="1">
-          <a:gsLst>
-            <a:gs pos="0">
-              <a:schemeClr val="phClr">
-                <a:tint val="40000"/>
-                <a:satMod val="350000"/>
-              </a:schemeClr>
-            </a:gs>
-            <a:gs pos="40000">
-              <a:schemeClr val="phClr">
-                <a:tint val="45000"/>
-                <a:shade val="99000"/>
-                <a:satMod val="350000"/>
-              </a:schemeClr>
-            </a:gs>
-            <a:gs pos="100000">
-              <a:schemeClr val="phClr">
-                <a:shade val="20000"/>
-                <a:satMod val="255000"/>
-              </a:schemeClr>
-            </a:gs>
-          </a:gsLst>
-          <a:path path="circle">
-            <a:fillToRect l="50000" t="-80000" r="50000" b="180000"/>
-          </a:path>
-        </a:gradFill>
-        <a:gradFill rotWithShape="1">
-          <a:gsLst>
-            <a:gs pos="0">
-              <a:schemeClr val="phClr">
-                <a:tint val="80000"/>
-                <a:satMod val="300000"/>
-              </a:schemeClr>
-            </a:gs>
-            <a:gs pos="100000">
-              <a:schemeClr val="phClr">
-                <a:shade val="30000"/>
-                <a:satMod val="200000"/>
-              </a:schemeClr>
-            </a:gs>
-          </a:gsLst>
-          <a:path path="circle">
-            <a:fillToRect l="50000" t="50000" r="50000" b="50000"/>
-          </a:path>
-        </a:gradFill>
-      </a:bgFillStyleLst>
-    </a:fmtScheme>
-  </a:themeElements>
-</a:theme>
 </file>
</xml_diff>

<commit_message>
Step by step, about to finish theory building part.
</commit_message>
<xml_diff>
--- a/Lecture slides/NYT A01 - Introduction.pptx
+++ b/Lecture slides/NYT A01 - Introduction.pptx
@@ -6764,7 +6764,7 @@
             <a:tbl>
               <a:tblPr>
                 <a:noFill/>
-                <a:tableStyleId>{6B1FA369-C12C-4A12-AD73-FDA2D61BF893}</a:tableStyleId>
+                <a:tableStyleId>{71A0B490-EB64-4E4A-B1CB-EED4A76580A7}</a:tableStyleId>
               </a:tblPr>
               <a:tblGrid>
                 <a:gridCol w="1227850"/>
@@ -13141,7 +13141,7 @@
             <a:tbl>
               <a:tblPr>
                 <a:noFill/>
-                <a:tableStyleId>{6B1FA369-C12C-4A12-AD73-FDA2D61BF893}</a:tableStyleId>
+                <a:tableStyleId>{71A0B490-EB64-4E4A-B1CB-EED4A76580A7}</a:tableStyleId>
               </a:tblPr>
               <a:tblGrid>
                 <a:gridCol w="1719075"/>
@@ -14818,6 +14818,285 @@
 </file>
 
 <file path=ppt/theme/theme1.xml><?xml version="1.0" encoding="utf-8"?>
+<a:theme xmlns:a="http://schemas.openxmlformats.org/drawingml/2006/main" xmlns:r="http://schemas.openxmlformats.org/officeDocument/2006/relationships">
+  <a:themeElements>
+    <a:clrScheme name="Default">
+      <a:dk1>
+        <a:srgbClr val="000000"/>
+      </a:dk1>
+      <a:lt1>
+        <a:srgbClr val="FFFFFF"/>
+      </a:lt1>
+      <a:dk2>
+        <a:srgbClr val="158158"/>
+      </a:dk2>
+      <a:lt2>
+        <a:srgbClr val="F3F3F3"/>
+      </a:lt2>
+      <a:accent1>
+        <a:srgbClr val="058DC7"/>
+      </a:accent1>
+      <a:accent2>
+        <a:srgbClr val="50B432"/>
+      </a:accent2>
+      <a:accent3>
+        <a:srgbClr val="ED561B"/>
+      </a:accent3>
+      <a:accent4>
+        <a:srgbClr val="EDEF00"/>
+      </a:accent4>
+      <a:accent5>
+        <a:srgbClr val="24CBE5"/>
+      </a:accent5>
+      <a:accent6>
+        <a:srgbClr val="64E572"/>
+      </a:accent6>
+      <a:hlink>
+        <a:srgbClr val="2200CC"/>
+      </a:hlink>
+      <a:folHlink>
+        <a:srgbClr val="551A8B"/>
+      </a:folHlink>
+    </a:clrScheme>
+    <a:fontScheme name="Office">
+      <a:majorFont>
+        <a:latin typeface="Arial"/>
+        <a:ea typeface=""/>
+        <a:cs typeface=""/>
+        <a:font script="Jpan" typeface="ＭＳ Ｐゴシック"/>
+        <a:font script="Hang" typeface="맑은 고딕"/>
+        <a:font script="Hans" typeface="宋体"/>
+        <a:font script="Hant" typeface="新細明體"/>
+        <a:font script="Arab" typeface="Times New Roman"/>
+        <a:font script="Hebr" typeface="Times New Roman"/>
+        <a:font script="Thai" typeface="Angsana New"/>
+        <a:font script="Ethi" typeface="Nyala"/>
+        <a:font script="Beng" typeface="Vrinda"/>
+        <a:font script="Gujr" typeface="Shruti"/>
+        <a:font script="Khmr" typeface="MoolBoran"/>
+        <a:font script="Knda" typeface="Tunga"/>
+        <a:font script="Guru" typeface="Raavi"/>
+        <a:font script="Cans" typeface="Euphemia"/>
+        <a:font script="Cher" typeface="Plantagenet Cherokee"/>
+        <a:font script="Yiii" typeface="Microsoft Yi Baiti"/>
+        <a:font script="Tibt" typeface="Microsoft Himalaya"/>
+        <a:font script="Thaa" typeface="MV Boli"/>
+        <a:font script="Deva" typeface="Mangal"/>
+        <a:font script="Telu" typeface="Gautami"/>
+        <a:font script="Taml" typeface="Latha"/>
+        <a:font script="Syrc" typeface="Estrangelo Edessa"/>
+        <a:font script="Orya" typeface="Kalinga"/>
+        <a:font script="Mlym" typeface="Kartika"/>
+        <a:font script="Laoo" typeface="DokChampa"/>
+        <a:font script="Sinh" typeface="Iskoola Pota"/>
+        <a:font script="Mong" typeface="Mongolian Baiti"/>
+        <a:font script="Viet" typeface="Times New Roman"/>
+        <a:font script="Uigh" typeface="Microsoft Uighur"/>
+        <a:font script="Geor" typeface="Sylfaen"/>
+      </a:majorFont>
+      <a:minorFont>
+        <a:latin typeface="Arial"/>
+        <a:ea typeface=""/>
+        <a:cs typeface=""/>
+        <a:font script="Jpan" typeface="ＭＳ Ｐゴシック"/>
+        <a:font script="Hang" typeface="맑은 고딕"/>
+        <a:font script="Hans" typeface="宋体"/>
+        <a:font script="Hant" typeface="新細明體"/>
+        <a:font script="Arab" typeface="Arial"/>
+        <a:font script="Hebr" typeface="Arial"/>
+        <a:font script="Thai" typeface="Cordia New"/>
+        <a:font script="Ethi" typeface="Nyala"/>
+        <a:font script="Beng" typeface="Vrinda"/>
+        <a:font script="Gujr" typeface="Shruti"/>
+        <a:font script="Khmr" typeface="DaunPenh"/>
+        <a:font script="Knda" typeface="Tunga"/>
+        <a:font script="Guru" typeface="Raavi"/>
+        <a:font script="Cans" typeface="Euphemia"/>
+        <a:font script="Cher" typeface="Plantagenet Cherokee"/>
+        <a:font script="Yiii" typeface="Microsoft Yi Baiti"/>
+        <a:font script="Tibt" typeface="Microsoft Himalaya"/>
+        <a:font script="Thaa" typeface="MV Boli"/>
+        <a:font script="Deva" typeface="Mangal"/>
+        <a:font script="Telu" typeface="Gautami"/>
+        <a:font script="Taml" typeface="Latha"/>
+        <a:font script="Syrc" typeface="Estrangelo Edessa"/>
+        <a:font script="Orya" typeface="Kalinga"/>
+        <a:font script="Mlym" typeface="Kartika"/>
+        <a:font script="Laoo" typeface="DokChampa"/>
+        <a:font script="Sinh" typeface="Iskoola Pota"/>
+        <a:font script="Mong" typeface="Mongolian Baiti"/>
+        <a:font script="Viet" typeface="Arial"/>
+        <a:font script="Uigh" typeface="Microsoft Uighur"/>
+        <a:font script="Geor" typeface="Sylfaen"/>
+      </a:minorFont>
+    </a:fontScheme>
+    <a:fmtScheme name="Office">
+      <a:fillStyleLst>
+        <a:solidFill>
+          <a:schemeClr val="phClr"/>
+        </a:solidFill>
+        <a:gradFill rotWithShape="1">
+          <a:gsLst>
+            <a:gs pos="0">
+              <a:schemeClr val="phClr">
+                <a:tint val="50000"/>
+                <a:satMod val="300000"/>
+              </a:schemeClr>
+            </a:gs>
+            <a:gs pos="35000">
+              <a:schemeClr val="phClr">
+                <a:tint val="37000"/>
+                <a:satMod val="300000"/>
+              </a:schemeClr>
+            </a:gs>
+            <a:gs pos="100000">
+              <a:schemeClr val="phClr">
+                <a:tint val="15000"/>
+                <a:satMod val="350000"/>
+              </a:schemeClr>
+            </a:gs>
+          </a:gsLst>
+          <a:lin ang="16200000" scaled="1"/>
+        </a:gradFill>
+        <a:gradFill rotWithShape="1">
+          <a:gsLst>
+            <a:gs pos="0">
+              <a:schemeClr val="phClr">
+                <a:tint val="100000"/>
+                <a:shade val="100000"/>
+                <a:satMod val="130000"/>
+              </a:schemeClr>
+            </a:gs>
+            <a:gs pos="100000">
+              <a:schemeClr val="phClr">
+                <a:tint val="50000"/>
+                <a:shade val="100000"/>
+                <a:satMod val="350000"/>
+              </a:schemeClr>
+            </a:gs>
+          </a:gsLst>
+          <a:lin ang="16200000" scaled="0"/>
+        </a:gradFill>
+      </a:fillStyleLst>
+      <a:lnStyleLst>
+        <a:ln w="9525" cap="flat" cmpd="sng" algn="ctr">
+          <a:solidFill>
+            <a:schemeClr val="phClr">
+              <a:shade val="95000"/>
+              <a:satMod val="105000"/>
+            </a:schemeClr>
+          </a:solidFill>
+          <a:prstDash val="solid"/>
+        </a:ln>
+        <a:ln w="25400" cap="flat" cmpd="sng" algn="ctr">
+          <a:solidFill>
+            <a:schemeClr val="phClr"/>
+          </a:solidFill>
+          <a:prstDash val="solid"/>
+        </a:ln>
+        <a:ln w="38100" cap="flat" cmpd="sng" algn="ctr">
+          <a:solidFill>
+            <a:schemeClr val="phClr"/>
+          </a:solidFill>
+          <a:prstDash val="solid"/>
+        </a:ln>
+      </a:lnStyleLst>
+      <a:effectStyleLst>
+        <a:effectStyle>
+          <a:effectLst>
+            <a:outerShdw blurRad="40000" dist="20000" dir="5400000" rotWithShape="0">
+              <a:srgbClr val="000000">
+                <a:alpha val="38000"/>
+              </a:srgbClr>
+            </a:outerShdw>
+          </a:effectLst>
+        </a:effectStyle>
+        <a:effectStyle>
+          <a:effectLst>
+            <a:outerShdw blurRad="40000" dist="23000" dir="5400000" rotWithShape="0">
+              <a:srgbClr val="000000">
+                <a:alpha val="35000"/>
+              </a:srgbClr>
+            </a:outerShdw>
+          </a:effectLst>
+        </a:effectStyle>
+        <a:effectStyle>
+          <a:effectLst>
+            <a:outerShdw blurRad="40000" dist="23000" dir="5400000" rotWithShape="0">
+              <a:srgbClr val="000000">
+                <a:alpha val="35000"/>
+              </a:srgbClr>
+            </a:outerShdw>
+          </a:effectLst>
+          <a:scene3d>
+            <a:camera prst="orthographicFront">
+              <a:rot lat="0" lon="0" rev="0"/>
+            </a:camera>
+            <a:lightRig rig="threePt" dir="t">
+              <a:rot lat="0" lon="0" rev="1200000"/>
+            </a:lightRig>
+          </a:scene3d>
+          <a:sp3d>
+            <a:bevelT w="63500" h="25400"/>
+          </a:sp3d>
+        </a:effectStyle>
+      </a:effectStyleLst>
+      <a:bgFillStyleLst>
+        <a:solidFill>
+          <a:schemeClr val="phClr"/>
+        </a:solidFill>
+        <a:gradFill rotWithShape="1">
+          <a:gsLst>
+            <a:gs pos="0">
+              <a:schemeClr val="phClr">
+                <a:tint val="40000"/>
+                <a:satMod val="350000"/>
+              </a:schemeClr>
+            </a:gs>
+            <a:gs pos="40000">
+              <a:schemeClr val="phClr">
+                <a:tint val="45000"/>
+                <a:shade val="99000"/>
+                <a:satMod val="350000"/>
+              </a:schemeClr>
+            </a:gs>
+            <a:gs pos="100000">
+              <a:schemeClr val="phClr">
+                <a:shade val="20000"/>
+                <a:satMod val="255000"/>
+              </a:schemeClr>
+            </a:gs>
+          </a:gsLst>
+          <a:path path="circle">
+            <a:fillToRect l="50000" t="-80000" r="50000" b="180000"/>
+          </a:path>
+        </a:gradFill>
+        <a:gradFill rotWithShape="1">
+          <a:gsLst>
+            <a:gs pos="0">
+              <a:schemeClr val="phClr">
+                <a:tint val="80000"/>
+                <a:satMod val="300000"/>
+              </a:schemeClr>
+            </a:gs>
+            <a:gs pos="100000">
+              <a:schemeClr val="phClr">
+                <a:shade val="30000"/>
+                <a:satMod val="200000"/>
+              </a:schemeClr>
+            </a:gs>
+          </a:gsLst>
+          <a:path path="circle">
+            <a:fillToRect l="50000" t="50000" r="50000" b="50000"/>
+          </a:path>
+        </a:gradFill>
+      </a:bgFillStyleLst>
+    </a:fmtScheme>
+  </a:themeElements>
+</a:theme>
+</file>
+
+<file path=ppt/theme/theme2.xml><?xml version="1.0" encoding="utf-8"?>
 <a:theme xmlns:a="http://schemas.openxmlformats.org/drawingml/2006/main" xmlns:r="http://schemas.openxmlformats.org/officeDocument/2006/relationships" name="NYT Slides Template">
   <a:themeElements>
     <a:clrScheme name="Simple Light">
@@ -15094,283 +15373,4 @@
     </a:fmtScheme>
   </a:themeElements>
 </a:theme>
-</file>
-
-<file path=ppt/theme/theme2.xml><?xml version="1.0" encoding="utf-8"?>
-<a:theme xmlns:a="http://schemas.openxmlformats.org/drawingml/2006/main" xmlns:r="http://schemas.openxmlformats.org/officeDocument/2006/relationships">
-  <a:themeElements>
-    <a:clrScheme name="Default">
-      <a:dk1>
-        <a:srgbClr val="000000"/>
-      </a:dk1>
-      <a:lt1>
-        <a:srgbClr val="FFFFFF"/>
-      </a:lt1>
-      <a:dk2>
-        <a:srgbClr val="158158"/>
-      </a:dk2>
-      <a:lt2>
-        <a:srgbClr val="F3F3F3"/>
-      </a:lt2>
-      <a:accent1>
-        <a:srgbClr val="058DC7"/>
-      </a:accent1>
-      <a:accent2>
-        <a:srgbClr val="50B432"/>
-      </a:accent2>
-      <a:accent3>
-        <a:srgbClr val="ED561B"/>
-      </a:accent3>
-      <a:accent4>
-        <a:srgbClr val="EDEF00"/>
-      </a:accent4>
-      <a:accent5>
-        <a:srgbClr val="24CBE5"/>
-      </a:accent5>
-      <a:accent6>
-        <a:srgbClr val="64E572"/>
-      </a:accent6>
-      <a:hlink>
-        <a:srgbClr val="2200CC"/>
-      </a:hlink>
-      <a:folHlink>
-        <a:srgbClr val="551A8B"/>
-      </a:folHlink>
-    </a:clrScheme>
-    <a:fontScheme name="Office">
-      <a:majorFont>
-        <a:latin typeface="Arial"/>
-        <a:ea typeface=""/>
-        <a:cs typeface=""/>
-        <a:font script="Jpan" typeface="ＭＳ Ｐゴシック"/>
-        <a:font script="Hang" typeface="맑은 고딕"/>
-        <a:font script="Hans" typeface="宋体"/>
-        <a:font script="Hant" typeface="新細明體"/>
-        <a:font script="Arab" typeface="Times New Roman"/>
-        <a:font script="Hebr" typeface="Times New Roman"/>
-        <a:font script="Thai" typeface="Angsana New"/>
-        <a:font script="Ethi" typeface="Nyala"/>
-        <a:font script="Beng" typeface="Vrinda"/>
-        <a:font script="Gujr" typeface="Shruti"/>
-        <a:font script="Khmr" typeface="MoolBoran"/>
-        <a:font script="Knda" typeface="Tunga"/>
-        <a:font script="Guru" typeface="Raavi"/>
-        <a:font script="Cans" typeface="Euphemia"/>
-        <a:font script="Cher" typeface="Plantagenet Cherokee"/>
-        <a:font script="Yiii" typeface="Microsoft Yi Baiti"/>
-        <a:font script="Tibt" typeface="Microsoft Himalaya"/>
-        <a:font script="Thaa" typeface="MV Boli"/>
-        <a:font script="Deva" typeface="Mangal"/>
-        <a:font script="Telu" typeface="Gautami"/>
-        <a:font script="Taml" typeface="Latha"/>
-        <a:font script="Syrc" typeface="Estrangelo Edessa"/>
-        <a:font script="Orya" typeface="Kalinga"/>
-        <a:font script="Mlym" typeface="Kartika"/>
-        <a:font script="Laoo" typeface="DokChampa"/>
-        <a:font script="Sinh" typeface="Iskoola Pota"/>
-        <a:font script="Mong" typeface="Mongolian Baiti"/>
-        <a:font script="Viet" typeface="Times New Roman"/>
-        <a:font script="Uigh" typeface="Microsoft Uighur"/>
-        <a:font script="Geor" typeface="Sylfaen"/>
-      </a:majorFont>
-      <a:minorFont>
-        <a:latin typeface="Arial"/>
-        <a:ea typeface=""/>
-        <a:cs typeface=""/>
-        <a:font script="Jpan" typeface="ＭＳ Ｐゴシック"/>
-        <a:font script="Hang" typeface="맑은 고딕"/>
-        <a:font script="Hans" typeface="宋体"/>
-        <a:font script="Hant" typeface="新細明體"/>
-        <a:font script="Arab" typeface="Arial"/>
-        <a:font script="Hebr" typeface="Arial"/>
-        <a:font script="Thai" typeface="Cordia New"/>
-        <a:font script="Ethi" typeface="Nyala"/>
-        <a:font script="Beng" typeface="Vrinda"/>
-        <a:font script="Gujr" typeface="Shruti"/>
-        <a:font script="Khmr" typeface="DaunPenh"/>
-        <a:font script="Knda" typeface="Tunga"/>
-        <a:font script="Guru" typeface="Raavi"/>
-        <a:font script="Cans" typeface="Euphemia"/>
-        <a:font script="Cher" typeface="Plantagenet Cherokee"/>
-        <a:font script="Yiii" typeface="Microsoft Yi Baiti"/>
-        <a:font script="Tibt" typeface="Microsoft Himalaya"/>
-        <a:font script="Thaa" typeface="MV Boli"/>
-        <a:font script="Deva" typeface="Mangal"/>
-        <a:font script="Telu" typeface="Gautami"/>
-        <a:font script="Taml" typeface="Latha"/>
-        <a:font script="Syrc" typeface="Estrangelo Edessa"/>
-        <a:font script="Orya" typeface="Kalinga"/>
-        <a:font script="Mlym" typeface="Kartika"/>
-        <a:font script="Laoo" typeface="DokChampa"/>
-        <a:font script="Sinh" typeface="Iskoola Pota"/>
-        <a:font script="Mong" typeface="Mongolian Baiti"/>
-        <a:font script="Viet" typeface="Arial"/>
-        <a:font script="Uigh" typeface="Microsoft Uighur"/>
-        <a:font script="Geor" typeface="Sylfaen"/>
-      </a:minorFont>
-    </a:fontScheme>
-    <a:fmtScheme name="Office">
-      <a:fillStyleLst>
-        <a:solidFill>
-          <a:schemeClr val="phClr"/>
-        </a:solidFill>
-        <a:gradFill rotWithShape="1">
-          <a:gsLst>
-            <a:gs pos="0">
-              <a:schemeClr val="phClr">
-                <a:tint val="50000"/>
-                <a:satMod val="300000"/>
-              </a:schemeClr>
-            </a:gs>
-            <a:gs pos="35000">
-              <a:schemeClr val="phClr">
-                <a:tint val="37000"/>
-                <a:satMod val="300000"/>
-              </a:schemeClr>
-            </a:gs>
-            <a:gs pos="100000">
-              <a:schemeClr val="phClr">
-                <a:tint val="15000"/>
-                <a:satMod val="350000"/>
-              </a:schemeClr>
-            </a:gs>
-          </a:gsLst>
-          <a:lin ang="16200000" scaled="1"/>
-        </a:gradFill>
-        <a:gradFill rotWithShape="1">
-          <a:gsLst>
-            <a:gs pos="0">
-              <a:schemeClr val="phClr">
-                <a:tint val="100000"/>
-                <a:shade val="100000"/>
-                <a:satMod val="130000"/>
-              </a:schemeClr>
-            </a:gs>
-            <a:gs pos="100000">
-              <a:schemeClr val="phClr">
-                <a:tint val="50000"/>
-                <a:shade val="100000"/>
-                <a:satMod val="350000"/>
-              </a:schemeClr>
-            </a:gs>
-          </a:gsLst>
-          <a:lin ang="16200000" scaled="0"/>
-        </a:gradFill>
-      </a:fillStyleLst>
-      <a:lnStyleLst>
-        <a:ln w="9525" cap="flat" cmpd="sng" algn="ctr">
-          <a:solidFill>
-            <a:schemeClr val="phClr">
-              <a:shade val="95000"/>
-              <a:satMod val="105000"/>
-            </a:schemeClr>
-          </a:solidFill>
-          <a:prstDash val="solid"/>
-        </a:ln>
-        <a:ln w="25400" cap="flat" cmpd="sng" algn="ctr">
-          <a:solidFill>
-            <a:schemeClr val="phClr"/>
-          </a:solidFill>
-          <a:prstDash val="solid"/>
-        </a:ln>
-        <a:ln w="38100" cap="flat" cmpd="sng" algn="ctr">
-          <a:solidFill>
-            <a:schemeClr val="phClr"/>
-          </a:solidFill>
-          <a:prstDash val="solid"/>
-        </a:ln>
-      </a:lnStyleLst>
-      <a:effectStyleLst>
-        <a:effectStyle>
-          <a:effectLst>
-            <a:outerShdw blurRad="40000" dist="20000" dir="5400000" rotWithShape="0">
-              <a:srgbClr val="000000">
-                <a:alpha val="38000"/>
-              </a:srgbClr>
-            </a:outerShdw>
-          </a:effectLst>
-        </a:effectStyle>
-        <a:effectStyle>
-          <a:effectLst>
-            <a:outerShdw blurRad="40000" dist="23000" dir="5400000" rotWithShape="0">
-              <a:srgbClr val="000000">
-                <a:alpha val="35000"/>
-              </a:srgbClr>
-            </a:outerShdw>
-          </a:effectLst>
-        </a:effectStyle>
-        <a:effectStyle>
-          <a:effectLst>
-            <a:outerShdw blurRad="40000" dist="23000" dir="5400000" rotWithShape="0">
-              <a:srgbClr val="000000">
-                <a:alpha val="35000"/>
-              </a:srgbClr>
-            </a:outerShdw>
-          </a:effectLst>
-          <a:scene3d>
-            <a:camera prst="orthographicFront">
-              <a:rot lat="0" lon="0" rev="0"/>
-            </a:camera>
-            <a:lightRig rig="threePt" dir="t">
-              <a:rot lat="0" lon="0" rev="1200000"/>
-            </a:lightRig>
-          </a:scene3d>
-          <a:sp3d>
-            <a:bevelT w="63500" h="25400"/>
-          </a:sp3d>
-        </a:effectStyle>
-      </a:effectStyleLst>
-      <a:bgFillStyleLst>
-        <a:solidFill>
-          <a:schemeClr val="phClr"/>
-        </a:solidFill>
-        <a:gradFill rotWithShape="1">
-          <a:gsLst>
-            <a:gs pos="0">
-              <a:schemeClr val="phClr">
-                <a:tint val="40000"/>
-                <a:satMod val="350000"/>
-              </a:schemeClr>
-            </a:gs>
-            <a:gs pos="40000">
-              <a:schemeClr val="phClr">
-                <a:tint val="45000"/>
-                <a:shade val="99000"/>
-                <a:satMod val="350000"/>
-              </a:schemeClr>
-            </a:gs>
-            <a:gs pos="100000">
-              <a:schemeClr val="phClr">
-                <a:shade val="20000"/>
-                <a:satMod val="255000"/>
-              </a:schemeClr>
-            </a:gs>
-          </a:gsLst>
-          <a:path path="circle">
-            <a:fillToRect l="50000" t="-80000" r="50000" b="180000"/>
-          </a:path>
-        </a:gradFill>
-        <a:gradFill rotWithShape="1">
-          <a:gsLst>
-            <a:gs pos="0">
-              <a:schemeClr val="phClr">
-                <a:tint val="80000"/>
-                <a:satMod val="300000"/>
-              </a:schemeClr>
-            </a:gs>
-            <a:gs pos="100000">
-              <a:schemeClr val="phClr">
-                <a:shade val="30000"/>
-                <a:satMod val="200000"/>
-              </a:schemeClr>
-            </a:gs>
-          </a:gsLst>
-          <a:path path="circle">
-            <a:fillToRect l="50000" t="50000" r="50000" b="50000"/>
-          </a:path>
-        </a:gradFill>
-      </a:bgFillStyleLst>
-    </a:fmtScheme>
-  </a:themeElements>
-</a:theme>
 </file>
</xml_diff>